<commit_message>
LW poster commit, will finish rest morning of 12/3
</commit_message>
<xml_diff>
--- a/Bayesian COVID Hospitalizations.pptx
+++ b/Bayesian COVID Hospitalizations.pptx
@@ -129,10 +129,42 @@
 </p:presentation>
 </file>
 
+<file path=ppt/authors.xml><?xml version="1.0" encoding="utf-8"?>
+<p188:authorLst xmlns:a="http://schemas.openxmlformats.org/drawingml/2006/main" xmlns:r="http://schemas.openxmlformats.org/officeDocument/2006/relationships" xmlns:p188="http://schemas.microsoft.com/office/powerpoint/2018/8/main">
+  <p188:author id="{74906A6B-110F-D067-7BFC-521FF3E147DB}" name="Luke Wilsen" initials="LW" userId="S::lwilsen@umass.edu::bcce7b85-2946-40bd-a49c-4b42c07c9900" providerId="AD"/>
+</p188:authorLst>
+</file>
+
 <file path=ppt/commentAuthors.xml><?xml version="1.0" encoding="utf-8"?>
 <p:cmAuthorLst xmlns:a="http://schemas.openxmlformats.org/drawingml/2006/main" xmlns:r="http://schemas.openxmlformats.org/officeDocument/2006/relationships" xmlns:p="http://schemas.openxmlformats.org/presentationml/2006/main">
   <p:cmAuthor id="0" name="alperc" initials="ca" lastIdx="10" clrIdx="0"/>
 </p:cmAuthorLst>
+</file>
+
+<file path=ppt/comments/modernComment_100_0.xml><?xml version="1.0" encoding="utf-8"?>
+<p188:cmLst xmlns:a="http://schemas.openxmlformats.org/drawingml/2006/main" xmlns:r="http://schemas.openxmlformats.org/officeDocument/2006/relationships" xmlns:p188="http://schemas.microsoft.com/office/powerpoint/2018/8/main">
+  <p188:cm id="{B8722735-AE5B-3D45-A59C-5706E6F970D0}" authorId="{74906A6B-110F-D067-7BFC-521FF3E147DB}" created="2024-12-02T23:48:29.800">
+    <ac:txMkLst xmlns:ac="http://schemas.microsoft.com/office/drawing/2013/main/command">
+      <pc:docMk xmlns:pc="http://schemas.microsoft.com/office/powerpoint/2013/main/command"/>
+      <pc:sldMk xmlns:pc="http://schemas.microsoft.com/office/powerpoint/2013/main/command" cId="0" sldId="256"/>
+      <ac:spMk id="60" creationId="{613C2190-55DE-4ECE-ACBA-8B99338B994D}"/>
+      <ac:txMk cp="60" len="113">
+        <ac:context len="190" hash="3832306614"/>
+      </ac:txMk>
+    </ac:txMkLst>
+    <p188:pos x="6726763" y="1905518"/>
+    <p188:txBody>
+      <a:bodyPr/>
+      <a:lstStyle/>
+      <a:p>
+        <a:r>
+          <a:rPr lang="en-US"/>
+          <a:t>Need a citation/s for this</a:t>
+        </a:r>
+      </a:p>
+    </p188:txBody>
+  </p188:cm>
+</p188:cmLst>
 </file>
 
 <file path=ppt/notesMasters/notesMaster1.xml><?xml version="1.0" encoding="utf-8"?>
@@ -218,7 +250,7 @@
             <a:fld id="{311E81F8-90E2-2945-9ED7-A6A90A37CF21}" type="datetimeFigureOut">
               <a:rPr lang="en-US" smtClean="0"/>
               <a:pPr/>
-              <a:t>12/1/24</a:t>
+              <a:t>12/2/24</a:t>
             </a:fld>
             <a:endParaRPr lang="en-US"/>
           </a:p>
@@ -787,7 +819,7 @@
             <a:fld id="{84FD1F27-616A-3542-91BB-C34E14AE38CD}" type="datetimeFigureOut">
               <a:rPr lang="en-US" smtClean="0"/>
               <a:pPr/>
-              <a:t>12/1/24</a:t>
+              <a:t>12/2/24</a:t>
             </a:fld>
             <a:endParaRPr lang="en-US"/>
           </a:p>
@@ -959,7 +991,7 @@
             <a:fld id="{84FD1F27-616A-3542-91BB-C34E14AE38CD}" type="datetimeFigureOut">
               <a:rPr lang="en-US" smtClean="0"/>
               <a:pPr/>
-              <a:t>12/1/24</a:t>
+              <a:t>12/2/24</a:t>
             </a:fld>
             <a:endParaRPr lang="en-US"/>
           </a:p>
@@ -1825,7 +1857,7 @@
             <a:fld id="{84FD1F27-616A-3542-91BB-C34E14AE38CD}" type="datetimeFigureOut">
               <a:rPr lang="en-US" smtClean="0"/>
               <a:pPr/>
-              <a:t>12/1/24</a:t>
+              <a:t>12/2/24</a:t>
             </a:fld>
             <a:endParaRPr lang="en-US"/>
           </a:p>
@@ -2249,7 +2281,7 @@
             <a:fld id="{84FD1F27-616A-3542-91BB-C34E14AE38CD}" type="datetimeFigureOut">
               <a:rPr lang="en-US" smtClean="0"/>
               <a:pPr/>
-              <a:t>12/1/24</a:t>
+              <a:t>12/2/24</a:t>
             </a:fld>
             <a:endParaRPr lang="en-US"/>
           </a:p>
@@ -2369,7 +2401,7 @@
             <a:fld id="{84FD1F27-616A-3542-91BB-C34E14AE38CD}" type="datetimeFigureOut">
               <a:rPr lang="en-US" smtClean="0"/>
               <a:pPr/>
-              <a:t>12/1/24</a:t>
+              <a:t>12/2/24</a:t>
             </a:fld>
             <a:endParaRPr lang="en-US"/>
           </a:p>
@@ -2466,7 +2498,7 @@
             <a:fld id="{84FD1F27-616A-3542-91BB-C34E14AE38CD}" type="datetimeFigureOut">
               <a:rPr lang="en-US" smtClean="0"/>
               <a:pPr/>
-              <a:t>12/1/24</a:t>
+              <a:t>12/2/24</a:t>
             </a:fld>
             <a:endParaRPr lang="en-US"/>
           </a:p>
@@ -2745,7 +2777,7 @@
             <a:fld id="{84FD1F27-616A-3542-91BB-C34E14AE38CD}" type="datetimeFigureOut">
               <a:rPr lang="en-US" smtClean="0"/>
               <a:pPr/>
-              <a:t>12/1/24</a:t>
+              <a:t>12/2/24</a:t>
             </a:fld>
             <a:endParaRPr lang="en-US"/>
           </a:p>
@@ -3004,7 +3036,7 @@
             <a:fld id="{84FD1F27-616A-3542-91BB-C34E14AE38CD}" type="datetimeFigureOut">
               <a:rPr lang="en-US" smtClean="0"/>
               <a:pPr/>
-              <a:t>12/1/24</a:t>
+              <a:t>12/2/24</a:t>
             </a:fld>
             <a:endParaRPr lang="en-US"/>
           </a:p>
@@ -3215,7 +3247,7 @@
             <a:fld id="{84FD1F27-616A-3542-91BB-C34E14AE38CD}" type="datetimeFigureOut">
               <a:rPr lang="en-US" smtClean="0"/>
               <a:pPr/>
-              <a:t>12/1/24</a:t>
+              <a:t>12/2/24</a:t>
             </a:fld>
             <a:endParaRPr lang="en-US"/>
           </a:p>
@@ -3745,7 +3777,7 @@
             <a:fld id="{84FD1F27-616A-3542-91BB-C34E14AE38CD}" type="datetimeFigureOut">
               <a:rPr lang="en-US" smtClean="0"/>
               <a:pPr/>
-              <a:t>12/1/24</a:t>
+              <a:t>12/2/24</a:t>
             </a:fld>
             <a:endParaRPr lang="en-US"/>
           </a:p>
@@ -4128,11 +4160,11 @@
           <p:nvPr/>
         </p:nvPicPr>
         <p:blipFill>
-          <a:blip r:embed="rId3">
+          <a:blip r:embed="rId4">
             <a:extLst>
               <a:ext uri="{BEBA8EAE-BF5A-486C-A8C5-ECC9F3942E4B}">
                 <a14:imgProps xmlns:a14="http://schemas.microsoft.com/office/drawing/2010/main">
-                  <a14:imgLayer r:embed="rId4">
+                  <a14:imgLayer r:embed="rId5">
                     <a14:imgEffect>
                       <a14:artisticBlur/>
                     </a14:imgEffect>
@@ -4162,6 +4194,86 @@
           </a:ln>
         </p:spPr>
       </p:pic>
+      <p:sp>
+        <p:nvSpPr>
+          <p:cNvPr id="65" name="TextBox 64">
+            <a:extLst>
+              <a:ext uri="{FF2B5EF4-FFF2-40B4-BE49-F238E27FC236}">
+                <a16:creationId xmlns:a16="http://schemas.microsoft.com/office/drawing/2014/main" id="{2D02221F-4DAE-8521-6230-1E0812CC4B5A}"/>
+              </a:ext>
+            </a:extLst>
+          </p:cNvPr>
+          <p:cNvSpPr txBox="1"/>
+          <p:nvPr/>
+        </p:nvSpPr>
+        <p:spPr>
+          <a:xfrm>
+            <a:off x="18325645" y="26934991"/>
+            <a:ext cx="14720346" cy="2439129"/>
+          </a:xfrm>
+          <a:prstGeom prst="rect">
+            <a:avLst/>
+          </a:prstGeom>
+          <a:noFill/>
+        </p:spPr>
+        <p:txBody>
+          <a:bodyPr wrap="square">
+            <a:spAutoFit/>
+          </a:bodyPr>
+          <a:lstStyle/>
+          <a:p>
+            <a:pPr marL="932994" indent="-457200">
+              <a:buFont typeface="Arial" panose="020B0604020202020204" pitchFamily="34" charset="0"/>
+              <a:buChar char="•"/>
+            </a:pPr>
+            <a:r>
+              <a:rPr lang="en-US" sz="3050" b="0" dirty="0">
+                <a:latin typeface="+mn-lt"/>
+              </a:rPr>
+              <a:t>Final predictors: </a:t>
+            </a:r>
+          </a:p>
+          <a:p>
+            <a:pPr marL="932994" indent="-457200">
+              <a:buFont typeface="Arial" panose="020B0604020202020204" pitchFamily="34" charset="0"/>
+              <a:buChar char="•"/>
+            </a:pPr>
+            <a:endParaRPr lang="en-US" sz="3050" b="0" dirty="0">
+              <a:latin typeface="+mn-lt"/>
+            </a:endParaRPr>
+          </a:p>
+          <a:p>
+            <a:pPr marL="932994" indent="-457200">
+              <a:buFont typeface="Arial" panose="020B0604020202020204" pitchFamily="34" charset="0"/>
+              <a:buChar char="•"/>
+            </a:pPr>
+            <a:endParaRPr lang="en-US" sz="3050" b="0" dirty="0">
+              <a:latin typeface="+mn-lt"/>
+            </a:endParaRPr>
+          </a:p>
+          <a:p>
+            <a:pPr marL="932994" indent="-457200">
+              <a:buFont typeface="Arial" panose="020B0604020202020204" pitchFamily="34" charset="0"/>
+              <a:buChar char="•"/>
+            </a:pPr>
+            <a:endParaRPr lang="en-US" sz="3050" b="0" dirty="0">
+              <a:latin typeface="+mn-lt"/>
+            </a:endParaRPr>
+          </a:p>
+          <a:p>
+            <a:pPr marL="932994" indent="-457200">
+              <a:buFont typeface="Arial" panose="020B0604020202020204" pitchFamily="34" charset="0"/>
+              <a:buChar char="•"/>
+            </a:pPr>
+            <a:r>
+              <a:rPr lang="en-US" sz="3050" b="0" dirty="0">
+                <a:latin typeface="+mn-lt"/>
+              </a:rPr>
+              <a:t>Final Model:</a:t>
+            </a:r>
+          </a:p>
+        </p:txBody>
+      </p:sp>
       <p:sp>
         <p:nvSpPr>
           <p:cNvPr id="6" name="Title 5"/>
@@ -4574,95 +4686,6 @@
       </p:grpSp>
       <p:sp>
         <p:nvSpPr>
-          <p:cNvPr id="58" name="Rectangle 57"/>
-          <p:cNvSpPr/>
-          <p:nvPr/>
-        </p:nvSpPr>
-        <p:spPr>
-          <a:xfrm>
-            <a:off x="59707416" y="46771672"/>
-            <a:ext cx="13440890" cy="1392668"/>
-          </a:xfrm>
-          <a:prstGeom prst="rect">
-            <a:avLst/>
-          </a:prstGeom>
-          <a:gradFill flip="none" rotWithShape="1">
-            <a:gsLst>
-              <a:gs pos="0">
-                <a:schemeClr val="accent1">
-                  <a:lumMod val="60000"/>
-                  <a:lumOff val="40000"/>
-                </a:schemeClr>
-              </a:gs>
-              <a:gs pos="50000">
-                <a:schemeClr val="accent1">
-                  <a:tint val="44500"/>
-                  <a:satMod val="160000"/>
-                </a:schemeClr>
-              </a:gs>
-              <a:gs pos="100000">
-                <a:schemeClr val="accent1">
-                  <a:tint val="23500"/>
-                  <a:satMod val="160000"/>
-                </a:schemeClr>
-              </a:gs>
-            </a:gsLst>
-            <a:lin ang="5400000" scaled="1"/>
-            <a:tileRect/>
-          </a:gradFill>
-          <a:ln>
-            <a:gradFill>
-              <a:gsLst>
-                <a:gs pos="0">
-                  <a:schemeClr val="accent1">
-                    <a:tint val="66000"/>
-                    <a:satMod val="160000"/>
-                  </a:schemeClr>
-                </a:gs>
-                <a:gs pos="50000">
-                  <a:schemeClr val="accent1">
-                    <a:tint val="44500"/>
-                    <a:satMod val="160000"/>
-                  </a:schemeClr>
-                </a:gs>
-                <a:gs pos="100000">
-                  <a:schemeClr val="accent1">
-                    <a:tint val="23500"/>
-                    <a:satMod val="160000"/>
-                  </a:schemeClr>
-                </a:gs>
-              </a:gsLst>
-              <a:lin ang="5400000" scaled="0"/>
-            </a:gradFill>
-          </a:ln>
-        </p:spPr>
-        <p:style>
-          <a:lnRef idx="2">
-            <a:schemeClr val="accent1">
-              <a:shade val="50000"/>
-            </a:schemeClr>
-          </a:lnRef>
-          <a:fillRef idx="1">
-            <a:schemeClr val="accent1"/>
-          </a:fillRef>
-          <a:effectRef idx="0">
-            <a:schemeClr val="accent1"/>
-          </a:effectRef>
-          <a:fontRef idx="minor">
-            <a:schemeClr val="lt1"/>
-          </a:fontRef>
-        </p:style>
-        <p:txBody>
-          <a:bodyPr rtlCol="0" anchor="ctr"/>
-          <a:lstStyle/>
-          <a:p>
-            <a:pPr algn="ctr"/>
-            <a:endParaRPr lang="en-US" sz="9068"/>
-          </a:p>
-        </p:txBody>
-      </p:sp>
-      <p:sp>
-        <p:nvSpPr>
           <p:cNvPr id="44" name="TextBox 43"/>
           <p:cNvSpPr txBox="1"/>
           <p:nvPr/>
@@ -4918,32 +4941,6 @@
       </p:sp>
       <p:sp>
         <p:nvSpPr>
-          <p:cNvPr id="17" name="TextBox 16"/>
-          <p:cNvSpPr txBox="1"/>
-          <p:nvPr/>
-        </p:nvSpPr>
-        <p:spPr>
-          <a:xfrm>
-            <a:off x="3319278" y="24683544"/>
-            <a:ext cx="184731" cy="1487780"/>
-          </a:xfrm>
-          <a:prstGeom prst="rect">
-            <a:avLst/>
-          </a:prstGeom>
-          <a:noFill/>
-        </p:spPr>
-        <p:txBody>
-          <a:bodyPr wrap="none" rtlCol="0">
-            <a:spAutoFit/>
-          </a:bodyPr>
-          <a:lstStyle/>
-          <a:p>
-            <a:endParaRPr lang="en-US" sz="9068" dirty="0"/>
-          </a:p>
-        </p:txBody>
-      </p:sp>
-      <p:sp>
-        <p:nvSpPr>
           <p:cNvPr id="50" name="Text Placeholder 6"/>
           <p:cNvSpPr>
             <a:spLocks noGrp="1"/>
@@ -4954,8 +4951,8 @@
         </p:nvSpPr>
         <p:spPr>
           <a:xfrm>
-            <a:off x="2236816" y="25796766"/>
-            <a:ext cx="14838218" cy="5404163"/>
+            <a:off x="2236815" y="23396435"/>
+            <a:ext cx="14838218" cy="6857828"/>
           </a:xfrm>
         </p:spPr>
         <p:txBody>
@@ -4964,12 +4961,105 @@
           </a:bodyPr>
           <a:lstStyle/>
           <a:p>
-            <a:pPr marL="384878"/>
-            <a:r>
-              <a:rPr lang="en-US" sz="3054" b="0" dirty="0">
+            <a:pPr marL="932994" indent="-457200">
+              <a:buFont typeface="Arial" panose="020B0604020202020204" pitchFamily="34" charset="0"/>
+              <a:buChar char="•"/>
+            </a:pPr>
+            <a:r>
+              <a:rPr lang="en-US" sz="3050" b="0" dirty="0">
                 <a:latin typeface="+mn-lt"/>
               </a:rPr>
-              <a:t>			</a:t>
+              <a:t>Outcome variable:</a:t>
+            </a:r>
+          </a:p>
+          <a:p>
+            <a:pPr marL="932994" indent="-457200">
+              <a:buFont typeface="Arial" panose="020B0604020202020204" pitchFamily="34" charset="0"/>
+              <a:buChar char="•"/>
+            </a:pPr>
+            <a:endParaRPr lang="en-US" sz="3050" b="0" dirty="0">
+              <a:latin typeface="+mn-lt"/>
+            </a:endParaRPr>
+          </a:p>
+          <a:p>
+            <a:pPr marL="932994" indent="-457200">
+              <a:buFont typeface="Arial" panose="020B0604020202020204" pitchFamily="34" charset="0"/>
+              <a:buChar char="•"/>
+            </a:pPr>
+            <a:r>
+              <a:rPr lang="en-US" sz="3050" b="0" dirty="0">
+                <a:latin typeface="+mn-lt"/>
+              </a:rPr>
+              <a:t>Initial predictors:</a:t>
+            </a:r>
+          </a:p>
+          <a:p>
+            <a:pPr marL="932994" indent="-457200">
+              <a:buFont typeface="Arial" panose="020B0604020202020204" pitchFamily="34" charset="0"/>
+              <a:buChar char="•"/>
+            </a:pPr>
+            <a:endParaRPr lang="en-US" sz="3050" b="0" dirty="0">
+              <a:latin typeface="+mn-lt"/>
+            </a:endParaRPr>
+          </a:p>
+          <a:p>
+            <a:pPr marL="932994" indent="-457200">
+              <a:buFont typeface="Arial" panose="020B0604020202020204" pitchFamily="34" charset="0"/>
+              <a:buChar char="•"/>
+            </a:pPr>
+            <a:endParaRPr lang="en-US" sz="3050" b="0" dirty="0">
+              <a:latin typeface="+mn-lt"/>
+            </a:endParaRPr>
+          </a:p>
+          <a:p>
+            <a:pPr marL="932994" indent="-457200">
+              <a:buFont typeface="Arial" panose="020B0604020202020204" pitchFamily="34" charset="0"/>
+              <a:buChar char="•"/>
+            </a:pPr>
+            <a:endParaRPr lang="en-US" sz="3050" b="0" dirty="0">
+              <a:latin typeface="+mn-lt"/>
+            </a:endParaRPr>
+          </a:p>
+          <a:p>
+            <a:pPr marL="932994" indent="-457200">
+              <a:buFont typeface="Arial" panose="020B0604020202020204" pitchFamily="34" charset="0"/>
+              <a:buChar char="•"/>
+            </a:pPr>
+            <a:r>
+              <a:rPr lang="en-US" sz="3050" b="0" dirty="0">
+                <a:latin typeface="+mn-lt"/>
+              </a:rPr>
+              <a:t>Initial Model:</a:t>
+            </a:r>
+          </a:p>
+          <a:p>
+            <a:pPr marL="932994" indent="-457200">
+              <a:buFont typeface="Arial" panose="020B0604020202020204" pitchFamily="34" charset="0"/>
+              <a:buChar char="•"/>
+            </a:pPr>
+            <a:endParaRPr lang="en-US" sz="3050" b="0" dirty="0">
+              <a:latin typeface="+mn-lt"/>
+            </a:endParaRPr>
+          </a:p>
+          <a:p>
+            <a:pPr marL="475794"/>
+            <a:r>
+              <a:rPr lang="en-US" sz="3050" b="0" dirty="0">
+                <a:latin typeface="+mn-lt"/>
+              </a:rPr>
+              <a:t>Model Exploration</a:t>
+            </a:r>
+          </a:p>
+          <a:p>
+            <a:pPr marL="932994" indent="-457200">
+              <a:buFont typeface="Arial" panose="020B0604020202020204" pitchFamily="34" charset="0"/>
+              <a:buChar char="•"/>
+            </a:pPr>
+            <a:r>
+              <a:rPr lang="en-US" sz="3050" b="0" dirty="0">
+                <a:latin typeface="+mn-lt"/>
+              </a:rPr>
+              <a:t>We considered recoding the age group variable as the mean of the age group boundaries</a:t>
             </a:r>
           </a:p>
         </p:txBody>
@@ -5709,11 +5799,11 @@
               <a:buChar char="•"/>
             </a:pPr>
             <a:r>
-              <a:rPr lang="en-US" sz="3054" dirty="0">
+              <a:rPr lang="en-US" sz="3054" b="1" dirty="0">
                 <a:latin typeface="+mj-lt"/>
                 <a:cs typeface="Times New Roman" panose="02020603050405020304" pitchFamily="18" charset="0"/>
               </a:rPr>
-              <a:t>Text</a:t>
+              <a:t>Base model vs hierarchical model</a:t>
             </a:r>
           </a:p>
         </p:txBody>
@@ -6000,12 +6090,12 @@
           <a:graphicData uri="http://schemas.openxmlformats.org/presentationml/2006/ole">
             <mc:AlternateContent xmlns:mc="http://schemas.openxmlformats.org/markup-compatibility/2006">
               <mc:Choice xmlns:v="urn:schemas-microsoft-com:vml" Requires="v">
-                <p:oleObj name="Equation" r:id="rId5" imgW="114120" imgH="215640" progId="Equation.3">
+                <p:oleObj name="Equation" r:id="rId6" imgW="114120" imgH="215640" progId="Equation.3">
                   <p:embed/>
                 </p:oleObj>
               </mc:Choice>
               <mc:Fallback>
-                <p:oleObj name="Equation" r:id="rId5" imgW="114120" imgH="215640" progId="Equation.3">
+                <p:oleObj name="Equation" r:id="rId6" imgW="114120" imgH="215640" progId="Equation.3">
                   <p:embed/>
                   <p:pic>
                     <p:nvPicPr>
@@ -6016,7 +6106,7 @@
                       <p:nvPr/>
                     </p:nvPicPr>
                     <p:blipFill>
-                      <a:blip r:embed="rId6">
+                      <a:blip r:embed="rId7">
                         <a:extLst>
                           <a:ext uri="{28A0092B-C50C-407E-A947-70E740481C1C}">
                             <a14:useLocalDpi xmlns:a14="http://schemas.microsoft.com/office/drawing/2010/main" val="0"/>
@@ -7091,7 +7181,7 @@
         <p:spPr>
           <a:xfrm>
             <a:off x="34414477" y="15992466"/>
-            <a:ext cx="14838218" cy="562333"/>
+            <a:ext cx="14838218" cy="1032334"/>
           </a:xfrm>
           <a:prstGeom prst="rect">
             <a:avLst/>
@@ -7108,12 +7198,22 @@
               <a:buChar char="•"/>
             </a:pPr>
             <a:r>
-              <a:rPr lang="en-US" sz="3054" dirty="0">
+              <a:rPr lang="en-US" sz="3054" b="1" dirty="0">
                 <a:latin typeface="+mj-lt"/>
                 <a:cs typeface="Times New Roman" panose="02020603050405020304" pitchFamily="18" charset="0"/>
               </a:rPr>
-              <a:t>Text</a:t>
-            </a:r>
+              <a:t>Map</a:t>
+            </a:r>
+          </a:p>
+          <a:p>
+            <a:pPr marL="933406" indent="-451550">
+              <a:buFont typeface="Arial" pitchFamily="34" charset="0"/>
+              <a:buChar char="•"/>
+            </a:pPr>
+            <a:endParaRPr lang="en-US" sz="3054" b="1" dirty="0">
+              <a:latin typeface="+mj-lt"/>
+              <a:cs typeface="Times New Roman" panose="02020603050405020304" pitchFamily="18" charset="0"/>
+            </a:endParaRPr>
           </a:p>
         </p:txBody>
       </p:sp>
@@ -7132,7 +7232,7 @@
           <p:nvPr/>
         </p:nvPicPr>
         <p:blipFill>
-          <a:blip r:embed="rId7"/>
+          <a:blip r:embed="rId8"/>
           <a:srcRect l="25817" r="26649"/>
           <a:stretch/>
         </p:blipFill>
@@ -7393,7 +7493,7 @@
           <p:nvPr/>
         </p:nvPicPr>
         <p:blipFill>
-          <a:blip r:embed="rId8"/>
+          <a:blip r:embed="rId9"/>
           <a:stretch>
             <a:fillRect/>
           </a:stretch>
@@ -7496,11 +7596,296 @@
           </a:p>
         </p:txBody>
       </p:sp>
+      <p:pic>
+        <p:nvPicPr>
+          <p:cNvPr id="31" name="Picture 30" descr="A black text on a white background&#10;&#10;Description automatically generated">
+            <a:extLst>
+              <a:ext uri="{FF2B5EF4-FFF2-40B4-BE49-F238E27FC236}">
+                <a16:creationId xmlns:a16="http://schemas.microsoft.com/office/drawing/2014/main" id="{A05651BD-D430-C253-6E02-3185AFD8B361}"/>
+              </a:ext>
+            </a:extLst>
+          </p:cNvPr>
+          <p:cNvPicPr>
+            <a:picLocks noChangeAspect="1"/>
+          </p:cNvPicPr>
+          <p:nvPr/>
+        </p:nvPicPr>
+        <p:blipFill>
+          <a:blip r:embed="rId10"/>
+          <a:stretch>
+            <a:fillRect/>
+          </a:stretch>
+        </p:blipFill>
+        <p:spPr>
+          <a:xfrm>
+            <a:off x="6236431" y="22842900"/>
+            <a:ext cx="7307816" cy="1429790"/>
+          </a:xfrm>
+          <a:prstGeom prst="rect">
+            <a:avLst/>
+          </a:prstGeom>
+        </p:spPr>
+      </p:pic>
+      <p:pic>
+        <p:nvPicPr>
+          <p:cNvPr id="36" name="Picture 35" descr="A close-up of black text&#10;&#10;Description automatically generated">
+            <a:extLst>
+              <a:ext uri="{FF2B5EF4-FFF2-40B4-BE49-F238E27FC236}">
+                <a16:creationId xmlns:a16="http://schemas.microsoft.com/office/drawing/2014/main" id="{D730D150-A99F-F319-BB80-0415DA221D03}"/>
+              </a:ext>
+            </a:extLst>
+          </p:cNvPr>
+          <p:cNvPicPr>
+            <a:picLocks noChangeAspect="1"/>
+          </p:cNvPicPr>
+          <p:nvPr/>
+        </p:nvPicPr>
+        <p:blipFill>
+          <a:blip r:embed="rId11"/>
+          <a:stretch>
+            <a:fillRect/>
+          </a:stretch>
+        </p:blipFill>
+        <p:spPr>
+          <a:xfrm>
+            <a:off x="6236431" y="24356931"/>
+            <a:ext cx="4871975" cy="1963897"/>
+          </a:xfrm>
+          <a:prstGeom prst="rect">
+            <a:avLst/>
+          </a:prstGeom>
+        </p:spPr>
+      </p:pic>
+      <p:pic>
+        <p:nvPicPr>
+          <p:cNvPr id="40" name="Picture 39">
+            <a:extLst>
+              <a:ext uri="{FF2B5EF4-FFF2-40B4-BE49-F238E27FC236}">
+                <a16:creationId xmlns:a16="http://schemas.microsoft.com/office/drawing/2014/main" id="{561C5FE4-9249-2A41-BA37-044223A59553}"/>
+              </a:ext>
+            </a:extLst>
+          </p:cNvPr>
+          <p:cNvPicPr>
+            <a:picLocks noChangeAspect="1"/>
+          </p:cNvPicPr>
+          <p:nvPr/>
+        </p:nvPicPr>
+        <p:blipFill>
+          <a:blip r:embed="rId12"/>
+          <a:stretch>
+            <a:fillRect/>
+          </a:stretch>
+        </p:blipFill>
+        <p:spPr>
+          <a:xfrm>
+            <a:off x="5729836" y="26282291"/>
+            <a:ext cx="12240150" cy="1224015"/>
+          </a:xfrm>
+          <a:prstGeom prst="rect">
+            <a:avLst/>
+          </a:prstGeom>
+        </p:spPr>
+      </p:pic>
+      <p:pic>
+        <p:nvPicPr>
+          <p:cNvPr id="46" name="Picture 45" descr="A close-up of a sign&#10;&#10;Description automatically generated">
+            <a:extLst>
+              <a:ext uri="{FF2B5EF4-FFF2-40B4-BE49-F238E27FC236}">
+                <a16:creationId xmlns:a16="http://schemas.microsoft.com/office/drawing/2014/main" id="{347A5C05-6D0D-4C91-4004-8A9B47776A65}"/>
+              </a:ext>
+            </a:extLst>
+          </p:cNvPr>
+          <p:cNvPicPr>
+            <a:picLocks noChangeAspect="1"/>
+          </p:cNvPicPr>
+          <p:nvPr/>
+        </p:nvPicPr>
+        <p:blipFill>
+          <a:blip r:embed="rId13"/>
+          <a:stretch>
+            <a:fillRect/>
+          </a:stretch>
+        </p:blipFill>
+        <p:spPr>
+          <a:xfrm>
+            <a:off x="22088009" y="26779206"/>
+            <a:ext cx="4213855" cy="1546369"/>
+          </a:xfrm>
+          <a:prstGeom prst="rect">
+            <a:avLst/>
+          </a:prstGeom>
+        </p:spPr>
+      </p:pic>
+      <p:pic>
+        <p:nvPicPr>
+          <p:cNvPr id="55" name="Picture 54">
+            <a:extLst>
+              <a:ext uri="{FF2B5EF4-FFF2-40B4-BE49-F238E27FC236}">
+                <a16:creationId xmlns:a16="http://schemas.microsoft.com/office/drawing/2014/main" id="{6B5E7224-EDDA-1134-23DC-69FF0ED4CC0D}"/>
+              </a:ext>
+            </a:extLst>
+          </p:cNvPr>
+          <p:cNvPicPr>
+            <a:picLocks noChangeAspect="1"/>
+          </p:cNvPicPr>
+          <p:nvPr/>
+        </p:nvPicPr>
+        <p:blipFill>
+          <a:blip r:embed="rId14"/>
+          <a:stretch>
+            <a:fillRect/>
+          </a:stretch>
+        </p:blipFill>
+        <p:spPr>
+          <a:xfrm>
+            <a:off x="21311525" y="28280356"/>
+            <a:ext cx="12074928" cy="1454348"/>
+          </a:xfrm>
+          <a:prstGeom prst="rect">
+            <a:avLst/>
+          </a:prstGeom>
+        </p:spPr>
+      </p:pic>
+      <p:sp>
+        <p:nvSpPr>
+          <p:cNvPr id="60" name="TextBox 59">
+            <a:extLst>
+              <a:ext uri="{FF2B5EF4-FFF2-40B4-BE49-F238E27FC236}">
+                <a16:creationId xmlns:a16="http://schemas.microsoft.com/office/drawing/2014/main" id="{613C2190-55DE-4ECE-ACBA-8B99338B994D}"/>
+              </a:ext>
+            </a:extLst>
+          </p:cNvPr>
+          <p:cNvSpPr txBox="1"/>
+          <p:nvPr/>
+        </p:nvSpPr>
+        <p:spPr>
+          <a:xfrm>
+            <a:off x="11482860" y="23802185"/>
+            <a:ext cx="7179122" cy="2908489"/>
+          </a:xfrm>
+          <a:prstGeom prst="rect">
+            <a:avLst/>
+          </a:prstGeom>
+          <a:noFill/>
+        </p:spPr>
+        <p:txBody>
+          <a:bodyPr wrap="square" rtlCol="0">
+            <a:spAutoFit/>
+          </a:bodyPr>
+          <a:lstStyle/>
+          <a:p>
+            <a:pPr marL="457200" indent="-457200">
+              <a:buFont typeface="Arial" panose="020B0604020202020204" pitchFamily="34" charset="0"/>
+              <a:buChar char="•"/>
+            </a:pPr>
+            <a:r>
+              <a:rPr lang="en-US" sz="3050" dirty="0"/>
+              <a:t>Dropped Underlying Conditions (Missing data for 95% of </a:t>
+            </a:r>
+            <a:r>
+              <a:rPr lang="en-US" sz="3050" dirty="0" err="1"/>
+              <a:t>obs</a:t>
+            </a:r>
+            <a:r>
+              <a:rPr lang="en-US" sz="3050" dirty="0"/>
+              <a:t>)</a:t>
+            </a:r>
+          </a:p>
+          <a:p>
+            <a:pPr marL="457200" indent="-457200">
+              <a:buFont typeface="Arial" panose="020B0604020202020204" pitchFamily="34" charset="0"/>
+              <a:buChar char="•"/>
+            </a:pPr>
+            <a:r>
+              <a:rPr lang="en-US" sz="3050" dirty="0"/>
+              <a:t>Dropped Symptoms (95% of </a:t>
+            </a:r>
+            <a:r>
+              <a:rPr lang="en-US" sz="3050" dirty="0" err="1"/>
+              <a:t>obs</a:t>
+            </a:r>
+            <a:r>
+              <a:rPr lang="en-US" sz="3050" dirty="0"/>
+              <a:t> had symptoms, and literature says that symptoms are not a good predictor of severity </a:t>
+            </a:r>
+            <a:r>
+              <a:rPr lang="en-US" sz="3050" b="1" dirty="0"/>
+              <a:t>(need citation)</a:t>
+            </a:r>
+            <a:endParaRPr lang="en-US" sz="3050" dirty="0"/>
+          </a:p>
+        </p:txBody>
+      </p:sp>
+      <p:pic>
+        <p:nvPicPr>
+          <p:cNvPr id="67" name="Picture 66" descr="A graph with black and white lines&#10;&#10;Description automatically generated">
+            <a:extLst>
+              <a:ext uri="{FF2B5EF4-FFF2-40B4-BE49-F238E27FC236}">
+                <a16:creationId xmlns:a16="http://schemas.microsoft.com/office/drawing/2014/main" id="{FC8A4AC8-57DA-3DAF-346F-2B4A874166EB}"/>
+              </a:ext>
+            </a:extLst>
+          </p:cNvPr>
+          <p:cNvPicPr>
+            <a:picLocks noChangeAspect="1"/>
+          </p:cNvPicPr>
+          <p:nvPr/>
+        </p:nvPicPr>
+        <p:blipFill>
+          <a:blip r:embed="rId15"/>
+          <a:stretch>
+            <a:fillRect/>
+          </a:stretch>
+        </p:blipFill>
+        <p:spPr>
+          <a:xfrm>
+            <a:off x="2733106" y="29311986"/>
+            <a:ext cx="6368364" cy="3918993"/>
+          </a:xfrm>
+          <a:prstGeom prst="rect">
+            <a:avLst/>
+          </a:prstGeom>
+        </p:spPr>
+      </p:pic>
+      <p:pic>
+        <p:nvPicPr>
+          <p:cNvPr id="69" name="Picture 68" descr="A graph with a blue line&#10;&#10;Description automatically generated">
+            <a:extLst>
+              <a:ext uri="{FF2B5EF4-FFF2-40B4-BE49-F238E27FC236}">
+                <a16:creationId xmlns:a16="http://schemas.microsoft.com/office/drawing/2014/main" id="{7D5A26DE-45D0-411D-6073-D4C177E42747}"/>
+              </a:ext>
+            </a:extLst>
+          </p:cNvPr>
+          <p:cNvPicPr>
+            <a:picLocks noChangeAspect="1"/>
+          </p:cNvPicPr>
+          <p:nvPr/>
+        </p:nvPicPr>
+        <p:blipFill>
+          <a:blip r:embed="rId16"/>
+          <a:stretch>
+            <a:fillRect/>
+          </a:stretch>
+        </p:blipFill>
+        <p:spPr>
+          <a:xfrm>
+            <a:off x="9504974" y="29417010"/>
+            <a:ext cx="6368365" cy="3908165"/>
+          </a:xfrm>
+          <a:prstGeom prst="rect">
+            <a:avLst/>
+          </a:prstGeom>
+        </p:spPr>
+      </p:pic>
     </p:spTree>
   </p:cSld>
   <p:clrMapOvr>
     <a:masterClrMapping/>
   </p:clrMapOvr>
+  <p:extLst>
+    <p:ext uri="{6950BFC3-D8DA-4A85-94F7-54DA5524770B}">
+      <p188:commentRel xmlns:p188="http://schemas.microsoft.com/office/powerpoint/2018/8/main" r:id="rId3"/>
+    </p:ext>
+  </p:extLst>
 </p:sld>
 </file>
 
@@ -8126,6 +8511,15 @@
 </file>
 
 <file path=customXml/item2.xml><?xml version="1.0" encoding="utf-8"?>
+<?mso-contentType ?>
+<FormTemplates xmlns="http://schemas.microsoft.com/sharepoint/v3/contenttype/forms">
+  <Display>DocumentLibraryForm</Display>
+  <Edit>DocumentLibraryForm</Edit>
+  <New>DocumentLibraryForm</New>
+</FormTemplates>
+</file>
+
+<file path=customXml/item3.xml><?xml version="1.0" encoding="utf-8"?>
 <ct:contentTypeSchema xmlns:ct="http://schemas.microsoft.com/office/2006/metadata/contentType" xmlns:ma="http://schemas.microsoft.com/office/2006/metadata/properties/metaAttributes" ct:_="" ma:_="" ma:contentTypeName="Document" ma:contentTypeID="0x01010068AAF71F4C9F8A469843294D15689A95" ma:contentTypeVersion="16" ma:contentTypeDescription="Create a new document." ma:contentTypeScope="" ma:versionID="61a44de3166297b41cbd6804616a22bb">
   <xsd:schema xmlns:xsd="http://www.w3.org/2001/XMLSchema" xmlns:xs="http://www.w3.org/2001/XMLSchema" xmlns:p="http://schemas.microsoft.com/office/2006/metadata/properties" xmlns:ns2="fc36ba27-577a-4cf7-85a7-ffa139955d90" xmlns:ns3="c3db7926-add9-4beb-a254-75a5b4de93b0" targetNamespace="http://schemas.microsoft.com/office/2006/metadata/properties" ma:root="true" ma:fieldsID="4eb1d2923da68e8db0b98d8ea7c3f3e9" ns2:_="" ns3:_="">
     <xsd:import namespace="fc36ba27-577a-4cf7-85a7-ffa139955d90"/>
@@ -8362,15 +8756,6 @@
 </ct:contentTypeSchema>
 </file>
 
-<file path=customXml/item3.xml><?xml version="1.0" encoding="utf-8"?>
-<?mso-contentType ?>
-<FormTemplates xmlns="http://schemas.microsoft.com/sharepoint/v3/contenttype/forms">
-  <Display>DocumentLibraryForm</Display>
-  <Edit>DocumentLibraryForm</Edit>
-  <New>DocumentLibraryForm</New>
-</FormTemplates>
-</file>
-
 <file path=customXml/itemProps1.xml><?xml version="1.0" encoding="utf-8"?>
 <ds:datastoreItem xmlns:ds="http://schemas.openxmlformats.org/officeDocument/2006/customXml" ds:itemID="{C3D6C4CD-CFA3-41A1-A9D1-BFAF122A51A5}">
   <ds:schemaRefs>
@@ -8389,6 +8774,14 @@
 </file>
 
 <file path=customXml/itemProps2.xml><?xml version="1.0" encoding="utf-8"?>
+<ds:datastoreItem xmlns:ds="http://schemas.openxmlformats.org/officeDocument/2006/customXml" ds:itemID="{6D1ED908-36CA-47DE-9D02-6709ABA06A3B}">
+  <ds:schemaRefs>
+    <ds:schemaRef ds:uri="http://schemas.microsoft.com/sharepoint/v3/contenttype/forms"/>
+  </ds:schemaRefs>
+</ds:datastoreItem>
+</file>
+
+<file path=customXml/itemProps3.xml><?xml version="1.0" encoding="utf-8"?>
 <ds:datastoreItem xmlns:ds="http://schemas.openxmlformats.org/officeDocument/2006/customXml" ds:itemID="{1F6B1DF0-A52A-40B5-B285-0AE80744836E}">
   <ds:schemaRefs>
     <ds:schemaRef ds:uri="http://schemas.microsoft.com/office/2006/metadata/contentType"/>
@@ -8405,12 +8798,4 @@
     <ds:schemaRef ds:uri="http://schemas.microsoft.com/internal/obd"/>
   </ds:schemaRefs>
 </ds:datastoreItem>
-</file>
-
-<file path=customXml/itemProps3.xml><?xml version="1.0" encoding="utf-8"?>
-<ds:datastoreItem xmlns:ds="http://schemas.openxmlformats.org/officeDocument/2006/customXml" ds:itemID="{6D1ED908-36CA-47DE-9D02-6709ABA06A3B}">
-  <ds:schemaRefs>
-    <ds:schemaRef ds:uri="http://schemas.microsoft.com/sharepoint/v3/contenttype/forms"/>
-  </ds:schemaRefs>
-</ds:datastoreItem>
 </file>
</xml_diff>

<commit_message>
Renamed x-axis of histogram
</commit_message>
<xml_diff>
--- a/Bayesian COVID Hospitalizations.pptx
+++ b/Bayesian COVID Hospitalizations.pptx
@@ -7416,7 +7416,7 @@
         <p:spPr>
           <a:xfrm>
             <a:off x="22388997" y="25319142"/>
-            <a:ext cx="4213855" cy="1546369"/>
+            <a:ext cx="4213855" cy="1517319"/>
           </a:xfrm>
           <a:prstGeom prst="rect">
             <a:avLst/>
@@ -8014,10 +8014,10 @@
       </p:sp>
       <p:pic>
         <p:nvPicPr>
-          <p:cNvPr id="45" name="Picture 44">
+          <p:cNvPr id="70" name="Picture 69">
             <a:extLst>
               <a:ext uri="{FF2B5EF4-FFF2-40B4-BE49-F238E27FC236}">
-                <a16:creationId xmlns:a16="http://schemas.microsoft.com/office/drawing/2014/main" id="{DBD25D92-0C0A-7573-C149-C698EDCC6786}"/>
+                <a16:creationId xmlns:a16="http://schemas.microsoft.com/office/drawing/2014/main" id="{9C9A5C35-3C1C-E298-B9B0-5065EBE01F8A}"/>
               </a:ext>
             </a:extLst>
           </p:cNvPr>
@@ -8034,8 +8034,8 @@
         </p:blipFill>
         <p:spPr>
           <a:xfrm>
-            <a:off x="19094837" y="8033036"/>
-            <a:ext cx="6975576" cy="4304927"/>
+            <a:off x="19188149" y="8060370"/>
+            <a:ext cx="6989231" cy="4313354"/>
           </a:xfrm>
           <a:prstGeom prst="rect">
             <a:avLst/>

</xml_diff>

<commit_message>
Included limitation about imputed data
</commit_message>
<xml_diff>
--- a/Bayesian COVID Hospitalizations.pptx
+++ b/Bayesian COVID Hospitalizations.pptx
@@ -376,7 +376,7 @@
       <pc:sldMk xmlns:pc="http://schemas.microsoft.com/office/powerpoint/2013/main/command" cId="0" sldId="256"/>
       <ac:spMk id="10" creationId="{025B411F-C30D-3458-EC06-AD109C00A7A3}"/>
       <ac:txMk cp="75" len="39">
-        <ac:context len="115" hash="3813382397"/>
+        <ac:context len="1583" hash="3103544310"/>
       </ac:txMk>
     </ac:txMkLst>
     <p188:pos x="6895310" y="896434"/>
@@ -525,7 +525,7 @@
             <a:fld id="{311E81F8-90E2-2945-9ED7-A6A90A37CF21}" type="datetimeFigureOut">
               <a:rPr lang="en-US" smtClean="0"/>
               <a:pPr/>
-              <a:t>12/5/24</a:t>
+              <a:t>12/3/2024</a:t>
             </a:fld>
             <a:endParaRPr lang="en-US"/>
           </a:p>
@@ -1094,7 +1094,7 @@
             <a:fld id="{84FD1F27-616A-3542-91BB-C34E14AE38CD}" type="datetimeFigureOut">
               <a:rPr lang="en-US" smtClean="0"/>
               <a:pPr/>
-              <a:t>12/5/24</a:t>
+              <a:t>12/3/2024</a:t>
             </a:fld>
             <a:endParaRPr lang="en-US"/>
           </a:p>
@@ -1266,7 +1266,7 @@
             <a:fld id="{84FD1F27-616A-3542-91BB-C34E14AE38CD}" type="datetimeFigureOut">
               <a:rPr lang="en-US" smtClean="0"/>
               <a:pPr/>
-              <a:t>12/5/24</a:t>
+              <a:t>12/3/2024</a:t>
             </a:fld>
             <a:endParaRPr lang="en-US"/>
           </a:p>
@@ -2132,7 +2132,7 @@
             <a:fld id="{84FD1F27-616A-3542-91BB-C34E14AE38CD}" type="datetimeFigureOut">
               <a:rPr lang="en-US" smtClean="0"/>
               <a:pPr/>
-              <a:t>12/5/24</a:t>
+              <a:t>12/3/2024</a:t>
             </a:fld>
             <a:endParaRPr lang="en-US"/>
           </a:p>
@@ -2556,7 +2556,7 @@
             <a:fld id="{84FD1F27-616A-3542-91BB-C34E14AE38CD}" type="datetimeFigureOut">
               <a:rPr lang="en-US" smtClean="0"/>
               <a:pPr/>
-              <a:t>12/5/24</a:t>
+              <a:t>12/3/2024</a:t>
             </a:fld>
             <a:endParaRPr lang="en-US"/>
           </a:p>
@@ -2676,7 +2676,7 @@
             <a:fld id="{84FD1F27-616A-3542-91BB-C34E14AE38CD}" type="datetimeFigureOut">
               <a:rPr lang="en-US" smtClean="0"/>
               <a:pPr/>
-              <a:t>12/5/24</a:t>
+              <a:t>12/3/2024</a:t>
             </a:fld>
             <a:endParaRPr lang="en-US"/>
           </a:p>
@@ -2773,7 +2773,7 @@
             <a:fld id="{84FD1F27-616A-3542-91BB-C34E14AE38CD}" type="datetimeFigureOut">
               <a:rPr lang="en-US" smtClean="0"/>
               <a:pPr/>
-              <a:t>12/5/24</a:t>
+              <a:t>12/3/2024</a:t>
             </a:fld>
             <a:endParaRPr lang="en-US"/>
           </a:p>
@@ -3052,7 +3052,7 @@
             <a:fld id="{84FD1F27-616A-3542-91BB-C34E14AE38CD}" type="datetimeFigureOut">
               <a:rPr lang="en-US" smtClean="0"/>
               <a:pPr/>
-              <a:t>12/5/24</a:t>
+              <a:t>12/3/2024</a:t>
             </a:fld>
             <a:endParaRPr lang="en-US"/>
           </a:p>
@@ -3311,7 +3311,7 @@
             <a:fld id="{84FD1F27-616A-3542-91BB-C34E14AE38CD}" type="datetimeFigureOut">
               <a:rPr lang="en-US" smtClean="0"/>
               <a:pPr/>
-              <a:t>12/5/24</a:t>
+              <a:t>12/3/2024</a:t>
             </a:fld>
             <a:endParaRPr lang="en-US"/>
           </a:p>
@@ -3522,7 +3522,7 @@
             <a:fld id="{84FD1F27-616A-3542-91BB-C34E14AE38CD}" type="datetimeFigureOut">
               <a:rPr lang="en-US" smtClean="0"/>
               <a:pPr/>
-              <a:t>12/5/24</a:t>
+              <a:t>12/3/2024</a:t>
             </a:fld>
             <a:endParaRPr lang="en-US"/>
           </a:p>
@@ -4052,7 +4052,7 @@
             <a:fld id="{84FD1F27-616A-3542-91BB-C34E14AE38CD}" type="datetimeFigureOut">
               <a:rPr lang="en-US" smtClean="0"/>
               <a:pPr/>
-              <a:t>12/5/24</a:t>
+              <a:t>12/3/2024</a:t>
             </a:fld>
             <a:endParaRPr lang="en-US"/>
           </a:p>
@@ -5748,8 +5748,8 @@
         </p:nvSpPr>
         <p:spPr>
           <a:xfrm>
-            <a:off x="34414477" y="33007401"/>
-            <a:ext cx="14838218" cy="3382336"/>
+            <a:off x="34795989" y="32988414"/>
+            <a:ext cx="14838218" cy="5228996"/>
           </a:xfrm>
           <a:prstGeom prst="rect">
             <a:avLst/>
@@ -5783,6 +5783,26 @@
               </a:rPr>
               <a:t>Missing data is a substantial limitation</a:t>
             </a:r>
+          </a:p>
+          <a:p>
+            <a:pPr marL="893597" lvl="1" indent="-457200">
+              <a:buFont typeface="Arial" panose="020B0604020202020204" pitchFamily="34" charset="0"/>
+              <a:buChar char="•"/>
+            </a:pPr>
+            <a:r>
+              <a:rPr lang="en-US" sz="3000" b="0" i="0" u="none" strike="noStrike" dirty="0">
+                <a:solidFill>
+                  <a:srgbClr val="000000"/>
+                </a:solidFill>
+                <a:effectLst/>
+                <a:latin typeface="+mj-lt"/>
+              </a:rPr>
+              <a:t>When we combined the models trained on multiple imputed datasets, they performed poorly, indicating that our model could be overly sensitive to the specific data patterns introduced during imputation. Consequently, the imputed models fail to generalize well to the underlying data structure.</a:t>
+            </a:r>
+            <a:endParaRPr lang="en-US" sz="3000" dirty="0">
+              <a:latin typeface="+mj-lt"/>
+              <a:cs typeface="Times New Roman" panose="02020603050405020304" pitchFamily="18" charset="0"/>
+            </a:endParaRPr>
           </a:p>
           <a:p>
             <a:pPr marL="893597" lvl="1" indent="-457200">
@@ -6161,6 +6181,430 @@
                 <a:latin typeface="+mn-lt"/>
               </a:rPr>
               <a:t>Data structure (individual case level):</a:t>
+            </a:r>
+          </a:p>
+          <a:p>
+            <a:pPr marL="475794"/>
+            <a:r>
+              <a:rPr lang="en-US" sz="1400" b="0" dirty="0">
+                <a:latin typeface="Courier New" panose="02070309020205020404" pitchFamily="49" charset="0"/>
+                <a:cs typeface="Courier New" panose="02070309020205020404" pitchFamily="49" charset="0"/>
+              </a:rPr>
+              <a:t>'</a:t>
+            </a:r>
+            <a:r>
+              <a:rPr lang="en-US" sz="1400" b="0" dirty="0" err="1">
+                <a:latin typeface="Courier New" panose="02070309020205020404" pitchFamily="49" charset="0"/>
+                <a:cs typeface="Courier New" panose="02070309020205020404" pitchFamily="49" charset="0"/>
+              </a:rPr>
+              <a:t>data.frame</a:t>
+            </a:r>
+            <a:r>
+              <a:rPr lang="en-US" sz="1400" b="0" dirty="0">
+                <a:latin typeface="Courier New" panose="02070309020205020404" pitchFamily="49" charset="0"/>
+                <a:cs typeface="Courier New" panose="02070309020205020404" pitchFamily="49" charset="0"/>
+              </a:rPr>
+              <a:t>':	100000 obs. of  19 variables:</a:t>
+            </a:r>
+          </a:p>
+          <a:p>
+            <a:pPr marL="475794"/>
+            <a:r>
+              <a:rPr lang="en-US" sz="1400" b="0" dirty="0">
+                <a:latin typeface="Courier New" panose="02070309020205020404" pitchFamily="49" charset="0"/>
+                <a:cs typeface="Courier New" panose="02070309020205020404" pitchFamily="49" charset="0"/>
+              </a:rPr>
+              <a:t> $ </a:t>
+            </a:r>
+            <a:r>
+              <a:rPr lang="en-US" sz="1400" b="0" dirty="0" err="1">
+                <a:latin typeface="Courier New" panose="02070309020205020404" pitchFamily="49" charset="0"/>
+                <a:cs typeface="Courier New" panose="02070309020205020404" pitchFamily="49" charset="0"/>
+              </a:rPr>
+              <a:t>case_month</a:t>
+            </a:r>
+            <a:r>
+              <a:rPr lang="en-US" sz="1400" b="0" dirty="0">
+                <a:latin typeface="Courier New" panose="02070309020205020404" pitchFamily="49" charset="0"/>
+                <a:cs typeface="Courier New" panose="02070309020205020404" pitchFamily="49" charset="0"/>
+              </a:rPr>
+              <a:t>              : chr  "2021-10" "2022-02" "2020-09" "2021-10" ...</a:t>
+            </a:r>
+          </a:p>
+          <a:p>
+            <a:pPr marL="475794"/>
+            <a:r>
+              <a:rPr lang="en-US" sz="1400" b="0" dirty="0">
+                <a:latin typeface="Courier New" panose="02070309020205020404" pitchFamily="49" charset="0"/>
+                <a:cs typeface="Courier New" panose="02070309020205020404" pitchFamily="49" charset="0"/>
+              </a:rPr>
+              <a:t> $ </a:t>
+            </a:r>
+            <a:r>
+              <a:rPr lang="en-US" sz="1400" b="0" dirty="0" err="1">
+                <a:latin typeface="Courier New" panose="02070309020205020404" pitchFamily="49" charset="0"/>
+                <a:cs typeface="Courier New" panose="02070309020205020404" pitchFamily="49" charset="0"/>
+              </a:rPr>
+              <a:t>res_state</a:t>
+            </a:r>
+            <a:r>
+              <a:rPr lang="en-US" sz="1400" b="0" dirty="0">
+                <a:latin typeface="Courier New" panose="02070309020205020404" pitchFamily="49" charset="0"/>
+                <a:cs typeface="Courier New" panose="02070309020205020404" pitchFamily="49" charset="0"/>
+              </a:rPr>
+              <a:t>               : chr  "NC" "GA" "MO" "MI" ...</a:t>
+            </a:r>
+          </a:p>
+          <a:p>
+            <a:pPr marL="475794"/>
+            <a:r>
+              <a:rPr lang="en-US" sz="1400" b="0" dirty="0">
+                <a:latin typeface="Courier New" panose="02070309020205020404" pitchFamily="49" charset="0"/>
+                <a:cs typeface="Courier New" panose="02070309020205020404" pitchFamily="49" charset="0"/>
+              </a:rPr>
+              <a:t> $ </a:t>
+            </a:r>
+            <a:r>
+              <a:rPr lang="en-US" sz="1400" b="0" dirty="0" err="1">
+                <a:latin typeface="Courier New" panose="02070309020205020404" pitchFamily="49" charset="0"/>
+                <a:cs typeface="Courier New" panose="02070309020205020404" pitchFamily="49" charset="0"/>
+              </a:rPr>
+              <a:t>state_fips_code</a:t>
+            </a:r>
+            <a:r>
+              <a:rPr lang="en-US" sz="1400" b="0" dirty="0">
+                <a:latin typeface="Courier New" panose="02070309020205020404" pitchFamily="49" charset="0"/>
+                <a:cs typeface="Courier New" panose="02070309020205020404" pitchFamily="49" charset="0"/>
+              </a:rPr>
+              <a:t>         : chr  "37" "13" "29" "26" ...</a:t>
+            </a:r>
+          </a:p>
+          <a:p>
+            <a:pPr marL="475794"/>
+            <a:r>
+              <a:rPr lang="en-US" sz="1400" b="0" dirty="0">
+                <a:latin typeface="Courier New" panose="02070309020205020404" pitchFamily="49" charset="0"/>
+                <a:cs typeface="Courier New" panose="02070309020205020404" pitchFamily="49" charset="0"/>
+              </a:rPr>
+              <a:t> $ </a:t>
+            </a:r>
+            <a:r>
+              <a:rPr lang="en-US" sz="1400" b="0" dirty="0" err="1">
+                <a:latin typeface="Courier New" panose="02070309020205020404" pitchFamily="49" charset="0"/>
+                <a:cs typeface="Courier New" panose="02070309020205020404" pitchFamily="49" charset="0"/>
+              </a:rPr>
+              <a:t>res_county</a:t>
+            </a:r>
+            <a:r>
+              <a:rPr lang="en-US" sz="1400" b="0" dirty="0">
+                <a:latin typeface="Courier New" panose="02070309020205020404" pitchFamily="49" charset="0"/>
+                <a:cs typeface="Courier New" panose="02070309020205020404" pitchFamily="49" charset="0"/>
+              </a:rPr>
+              <a:t>              : chr  "DAVIE" "BULLOCH" "POLK" "SANILAC" ...</a:t>
+            </a:r>
+          </a:p>
+          <a:p>
+            <a:pPr marL="475794"/>
+            <a:r>
+              <a:rPr lang="en-US" sz="1400" b="0" dirty="0">
+                <a:latin typeface="Courier New" panose="02070309020205020404" pitchFamily="49" charset="0"/>
+                <a:cs typeface="Courier New" panose="02070309020205020404" pitchFamily="49" charset="0"/>
+              </a:rPr>
+              <a:t> $ </a:t>
+            </a:r>
+            <a:r>
+              <a:rPr lang="en-US" sz="1400" b="0" dirty="0" err="1">
+                <a:latin typeface="Courier New" panose="02070309020205020404" pitchFamily="49" charset="0"/>
+                <a:cs typeface="Courier New" panose="02070309020205020404" pitchFamily="49" charset="0"/>
+              </a:rPr>
+              <a:t>county_fips_code</a:t>
+            </a:r>
+            <a:r>
+              <a:rPr lang="en-US" sz="1400" b="0" dirty="0">
+                <a:latin typeface="Courier New" panose="02070309020205020404" pitchFamily="49" charset="0"/>
+                <a:cs typeface="Courier New" panose="02070309020205020404" pitchFamily="49" charset="0"/>
+              </a:rPr>
+              <a:t>        : chr  "37059" "13031" "29167" "26151" ...</a:t>
+            </a:r>
+          </a:p>
+          <a:p>
+            <a:pPr marL="475794"/>
+            <a:r>
+              <a:rPr lang="en-US" sz="1400" b="0" dirty="0">
+                <a:latin typeface="Courier New" panose="02070309020205020404" pitchFamily="49" charset="0"/>
+                <a:cs typeface="Courier New" panose="02070309020205020404" pitchFamily="49" charset="0"/>
+              </a:rPr>
+              <a:t> $ </a:t>
+            </a:r>
+            <a:r>
+              <a:rPr lang="en-US" sz="1400" b="0" dirty="0" err="1">
+                <a:latin typeface="Courier New" panose="02070309020205020404" pitchFamily="49" charset="0"/>
+                <a:cs typeface="Courier New" panose="02070309020205020404" pitchFamily="49" charset="0"/>
+              </a:rPr>
+              <a:t>age_group</a:t>
+            </a:r>
+            <a:r>
+              <a:rPr lang="en-US" sz="1400" b="0" dirty="0">
+                <a:latin typeface="Courier New" panose="02070309020205020404" pitchFamily="49" charset="0"/>
+                <a:cs typeface="Courier New" panose="02070309020205020404" pitchFamily="49" charset="0"/>
+              </a:rPr>
+              <a:t>               : chr  "0 - 17 years" "18 to 49 years" "18 to 49 years" "18 to 49 years" ...</a:t>
+            </a:r>
+          </a:p>
+          <a:p>
+            <a:pPr marL="475794"/>
+            <a:r>
+              <a:rPr lang="en-US" sz="1400" b="0" dirty="0">
+                <a:latin typeface="Courier New" panose="02070309020205020404" pitchFamily="49" charset="0"/>
+                <a:cs typeface="Courier New" panose="02070309020205020404" pitchFamily="49" charset="0"/>
+              </a:rPr>
+              <a:t> $ sex                     : chr  "Female" "Female" "Female" "Female" Missing" ...</a:t>
+            </a:r>
+          </a:p>
+          <a:p>
+            <a:pPr marL="475794"/>
+            <a:r>
+              <a:rPr lang="en-US" sz="1400" b="0" dirty="0">
+                <a:latin typeface="Courier New" panose="02070309020205020404" pitchFamily="49" charset="0"/>
+                <a:cs typeface="Courier New" panose="02070309020205020404" pitchFamily="49" charset="0"/>
+              </a:rPr>
+              <a:t> $ </a:t>
+            </a:r>
+            <a:r>
+              <a:rPr lang="en-US" sz="1400" b="0" dirty="0" err="1">
+                <a:latin typeface="Courier New" panose="02070309020205020404" pitchFamily="49" charset="0"/>
+                <a:cs typeface="Courier New" panose="02070309020205020404" pitchFamily="49" charset="0"/>
+              </a:rPr>
+              <a:t>hosp_yn</a:t>
+            </a:r>
+            <a:r>
+              <a:rPr lang="en-US" sz="1400" b="0" dirty="0">
+                <a:latin typeface="Courier New" panose="02070309020205020404" pitchFamily="49" charset="0"/>
+                <a:cs typeface="Courier New" panose="02070309020205020404" pitchFamily="49" charset="0"/>
+              </a:rPr>
+              <a:t>                 : chr  "Unknown" "Missing" "Unknown" "Missing"...</a:t>
+            </a:r>
+          </a:p>
+          <a:p>
+            <a:pPr marL="475794"/>
+            <a:r>
+              <a:rPr lang="en-US" sz="1400" b="0" dirty="0">
+                <a:latin typeface="Courier New" panose="02070309020205020404" pitchFamily="49" charset="0"/>
+                <a:cs typeface="Courier New" panose="02070309020205020404" pitchFamily="49" charset="0"/>
+              </a:rPr>
+              <a:t> $ race                    : chr  "NA" "Unknown" "NA" "NA" ...</a:t>
+            </a:r>
+          </a:p>
+          <a:p>
+            <a:pPr marL="475794"/>
+            <a:r>
+              <a:rPr lang="en-US" sz="1400" b="0" dirty="0">
+                <a:latin typeface="Courier New" panose="02070309020205020404" pitchFamily="49" charset="0"/>
+                <a:cs typeface="Courier New" panose="02070309020205020404" pitchFamily="49" charset="0"/>
+              </a:rPr>
+              <a:t> $ ethnicity               : chr  "NA" "Missing" "NA" "NA" ...</a:t>
+            </a:r>
+          </a:p>
+          <a:p>
+            <a:pPr marL="475794"/>
+            <a:r>
+              <a:rPr lang="en-US" sz="1400" b="0" dirty="0">
+                <a:latin typeface="Courier New" panose="02070309020205020404" pitchFamily="49" charset="0"/>
+                <a:cs typeface="Courier New" panose="02070309020205020404" pitchFamily="49" charset="0"/>
+              </a:rPr>
+              <a:t> $ </a:t>
+            </a:r>
+            <a:r>
+              <a:rPr lang="en-US" sz="1400" b="0" dirty="0" err="1">
+                <a:latin typeface="Courier New" panose="02070309020205020404" pitchFamily="49" charset="0"/>
+                <a:cs typeface="Courier New" panose="02070309020205020404" pitchFamily="49" charset="0"/>
+              </a:rPr>
+              <a:t>case_positive_specimen</a:t>
+            </a:r>
+            <a:r>
+              <a:rPr lang="en-US" sz="1400" b="0" dirty="0">
+                <a:latin typeface="Courier New" panose="02070309020205020404" pitchFamily="49" charset="0"/>
+                <a:cs typeface="Courier New" panose="02070309020205020404" pitchFamily="49" charset="0"/>
+              </a:rPr>
+              <a:t>  : chr  "0.0" NA "0.0" NA ...</a:t>
+            </a:r>
+          </a:p>
+          <a:p>
+            <a:pPr marL="475794"/>
+            <a:r>
+              <a:rPr lang="en-US" sz="1400" b="0" dirty="0">
+                <a:latin typeface="Courier New" panose="02070309020205020404" pitchFamily="49" charset="0"/>
+                <a:cs typeface="Courier New" panose="02070309020205020404" pitchFamily="49" charset="0"/>
+              </a:rPr>
+              <a:t> $ process                 : chr  "Missing" "Missing" "Missing" "Missing" ...</a:t>
+            </a:r>
+          </a:p>
+          <a:p>
+            <a:pPr marL="475794"/>
+            <a:r>
+              <a:rPr lang="en-US" sz="1400" b="0" dirty="0">
+                <a:latin typeface="Courier New" panose="02070309020205020404" pitchFamily="49" charset="0"/>
+                <a:cs typeface="Courier New" panose="02070309020205020404" pitchFamily="49" charset="0"/>
+              </a:rPr>
+              <a:t> $ </a:t>
+            </a:r>
+            <a:r>
+              <a:rPr lang="en-US" sz="1400" b="0" dirty="0" err="1">
+                <a:latin typeface="Courier New" panose="02070309020205020404" pitchFamily="49" charset="0"/>
+                <a:cs typeface="Courier New" panose="02070309020205020404" pitchFamily="49" charset="0"/>
+              </a:rPr>
+              <a:t>exposure_yn</a:t>
+            </a:r>
+            <a:r>
+              <a:rPr lang="en-US" sz="1400" b="0" dirty="0">
+                <a:latin typeface="Courier New" panose="02070309020205020404" pitchFamily="49" charset="0"/>
+                <a:cs typeface="Courier New" panose="02070309020205020404" pitchFamily="49" charset="0"/>
+              </a:rPr>
+              <a:t>             : chr  "Missing" "Missing" "Missing" "Missing" ...</a:t>
+            </a:r>
+          </a:p>
+          <a:p>
+            <a:pPr marL="475794"/>
+            <a:r>
+              <a:rPr lang="en-US" sz="1400" b="0" dirty="0">
+                <a:latin typeface="Courier New" panose="02070309020205020404" pitchFamily="49" charset="0"/>
+                <a:cs typeface="Courier New" panose="02070309020205020404" pitchFamily="49" charset="0"/>
+              </a:rPr>
+              <a:t> $ </a:t>
+            </a:r>
+            <a:r>
+              <a:rPr lang="en-US" sz="1400" b="0" dirty="0" err="1">
+                <a:latin typeface="Courier New" panose="02070309020205020404" pitchFamily="49" charset="0"/>
+                <a:cs typeface="Courier New" panose="02070309020205020404" pitchFamily="49" charset="0"/>
+              </a:rPr>
+              <a:t>current_status</a:t>
+            </a:r>
+            <a:r>
+              <a:rPr lang="en-US" sz="1400" b="0" dirty="0">
+                <a:latin typeface="Courier New" panose="02070309020205020404" pitchFamily="49" charset="0"/>
+                <a:cs typeface="Courier New" panose="02070309020205020404" pitchFamily="49" charset="0"/>
+              </a:rPr>
+              <a:t>          : chr  "Laboratory-confirmed case" "Laboratory-confirmed case" "Laboratory-confirmed case" "Laboratory-confirmed case" ...</a:t>
+            </a:r>
+          </a:p>
+          <a:p>
+            <a:pPr marL="475794"/>
+            <a:r>
+              <a:rPr lang="en-US" sz="1400" b="0" dirty="0">
+                <a:latin typeface="Courier New" panose="02070309020205020404" pitchFamily="49" charset="0"/>
+                <a:cs typeface="Courier New" panose="02070309020205020404" pitchFamily="49" charset="0"/>
+              </a:rPr>
+              <a:t> $ </a:t>
+            </a:r>
+            <a:r>
+              <a:rPr lang="en-US" sz="1400" b="0" dirty="0" err="1">
+                <a:latin typeface="Courier New" panose="02070309020205020404" pitchFamily="49" charset="0"/>
+                <a:cs typeface="Courier New" panose="02070309020205020404" pitchFamily="49" charset="0"/>
+              </a:rPr>
+              <a:t>symptom_status</a:t>
+            </a:r>
+            <a:r>
+              <a:rPr lang="en-US" sz="1400" b="0" dirty="0">
+                <a:latin typeface="Courier New" panose="02070309020205020404" pitchFamily="49" charset="0"/>
+                <a:cs typeface="Courier New" panose="02070309020205020404" pitchFamily="49" charset="0"/>
+              </a:rPr>
+              <a:t>          : chr  "Unknown" "Symptomatic" "Symptomatic" " ...</a:t>
+            </a:r>
+          </a:p>
+          <a:p>
+            <a:pPr marL="475794"/>
+            <a:r>
+              <a:rPr lang="en-US" sz="1400" b="0" dirty="0">
+                <a:latin typeface="Courier New" panose="02070309020205020404" pitchFamily="49" charset="0"/>
+                <a:cs typeface="Courier New" panose="02070309020205020404" pitchFamily="49" charset="0"/>
+              </a:rPr>
+              <a:t> $ </a:t>
+            </a:r>
+            <a:r>
+              <a:rPr lang="en-US" sz="1400" b="0" dirty="0" err="1">
+                <a:latin typeface="Courier New" panose="02070309020205020404" pitchFamily="49" charset="0"/>
+                <a:cs typeface="Courier New" panose="02070309020205020404" pitchFamily="49" charset="0"/>
+              </a:rPr>
+              <a:t>icu_yn</a:t>
+            </a:r>
+            <a:r>
+              <a:rPr lang="en-US" sz="1400" b="0" dirty="0">
+                <a:latin typeface="Courier New" panose="02070309020205020404" pitchFamily="49" charset="0"/>
+                <a:cs typeface="Courier New" panose="02070309020205020404" pitchFamily="49" charset="0"/>
+              </a:rPr>
+              <a:t>                  : chr  "Unknown" "Missing" "Missing" "Missing" ...</a:t>
+            </a:r>
+          </a:p>
+          <a:p>
+            <a:pPr marL="475794"/>
+            <a:r>
+              <a:rPr lang="en-US" sz="1400" b="0" dirty="0">
+                <a:latin typeface="Courier New" panose="02070309020205020404" pitchFamily="49" charset="0"/>
+                <a:cs typeface="Courier New" panose="02070309020205020404" pitchFamily="49" charset="0"/>
+              </a:rPr>
+              <a:t> $ </a:t>
+            </a:r>
+            <a:r>
+              <a:rPr lang="en-US" sz="1400" b="0" dirty="0" err="1">
+                <a:latin typeface="Courier New" panose="02070309020205020404" pitchFamily="49" charset="0"/>
+                <a:cs typeface="Courier New" panose="02070309020205020404" pitchFamily="49" charset="0"/>
+              </a:rPr>
+              <a:t>death_yn</a:t>
+            </a:r>
+            <a:r>
+              <a:rPr lang="en-US" sz="1400" b="0" dirty="0">
+                <a:latin typeface="Courier New" panose="02070309020205020404" pitchFamily="49" charset="0"/>
+                <a:cs typeface="Courier New" panose="02070309020205020404" pitchFamily="49" charset="0"/>
+              </a:rPr>
+              <a:t>                : chr  "No" "Missing" "Unknown" "Unknown" ...</a:t>
+            </a:r>
+          </a:p>
+          <a:p>
+            <a:pPr marL="475794"/>
+            <a:r>
+              <a:rPr lang="en-US" sz="1400" b="0" dirty="0">
+                <a:latin typeface="Courier New" panose="02070309020205020404" pitchFamily="49" charset="0"/>
+                <a:cs typeface="Courier New" panose="02070309020205020404" pitchFamily="49" charset="0"/>
+              </a:rPr>
+              <a:t> $ </a:t>
+            </a:r>
+            <a:r>
+              <a:rPr lang="en-US" sz="1400" b="0" dirty="0" err="1">
+                <a:latin typeface="Courier New" panose="02070309020205020404" pitchFamily="49" charset="0"/>
+                <a:cs typeface="Courier New" panose="02070309020205020404" pitchFamily="49" charset="0"/>
+              </a:rPr>
+              <a:t>case_onset_interval</a:t>
+            </a:r>
+            <a:r>
+              <a:rPr lang="en-US" sz="1400" b="0" dirty="0">
+                <a:latin typeface="Courier New" panose="02070309020205020404" pitchFamily="49" charset="0"/>
+                <a:cs typeface="Courier New" panose="02070309020205020404" pitchFamily="49" charset="0"/>
+              </a:rPr>
+              <a:t>     : chr  NA "0.0" "0.0" NA ...</a:t>
+            </a:r>
+          </a:p>
+          <a:p>
+            <a:pPr marL="475794"/>
+            <a:r>
+              <a:rPr lang="en-US" sz="1400" b="0" dirty="0">
+                <a:latin typeface="Courier New" panose="02070309020205020404" pitchFamily="49" charset="0"/>
+                <a:cs typeface="Courier New" panose="02070309020205020404" pitchFamily="49" charset="0"/>
+              </a:rPr>
+              <a:t> $ </a:t>
+            </a:r>
+            <a:r>
+              <a:rPr lang="en-US" sz="1400" b="0" dirty="0" err="1">
+                <a:latin typeface="Courier New" panose="02070309020205020404" pitchFamily="49" charset="0"/>
+                <a:cs typeface="Courier New" panose="02070309020205020404" pitchFamily="49" charset="0"/>
+              </a:rPr>
+              <a:t>underlying_conditions_yn</a:t>
+            </a:r>
+            <a:r>
+              <a:rPr lang="en-US" sz="1400" b="0" dirty="0">
+                <a:latin typeface="Courier New" panose="02070309020205020404" pitchFamily="49" charset="0"/>
+                <a:cs typeface="Courier New" panose="02070309020205020404" pitchFamily="49" charset="0"/>
+              </a:rPr>
+              <a:t>: chr  NA NA NA NA ...</a:t>
             </a:r>
           </a:p>
         </p:txBody>
@@ -8243,23 +8687,6 @@
 </file>
 
 <file path=customXml/item1.xml><?xml version="1.0" encoding="utf-8"?>
-<?mso-contentType ?>
-<FormTemplates xmlns="http://schemas.microsoft.com/sharepoint/v3/contenttype/forms">
-  <Display>DocumentLibraryForm</Display>
-  <Edit>DocumentLibraryForm</Edit>
-  <New>DocumentLibraryForm</New>
-</FormTemplates>
-</file>
-
-<file path=customXml/item2.xml><?xml version="1.0" encoding="utf-8"?>
-<p:properties xmlns:p="http://schemas.microsoft.com/office/2006/metadata/properties" xmlns:xsi="http://www.w3.org/2001/XMLSchema-instance" xmlns:pc="http://schemas.microsoft.com/office/infopath/2007/PartnerControls">
-  <documentManagement>
-    <_activity xmlns="4f41ae97-5a6c-4458-bb1f-235b5f3b5d68" xsi:nil="true"/>
-  </documentManagement>
-</p:properties>
-</file>
-
-<file path=customXml/item3.xml><?xml version="1.0" encoding="utf-8"?>
 <ct:contentTypeSchema xmlns:ct="http://schemas.microsoft.com/office/2006/metadata/contentType" xmlns:ma="http://schemas.microsoft.com/office/2006/metadata/properties/metaAttributes" ct:_="" ma:_="" ma:contentTypeName="Document" ma:contentTypeID="0x0101009751B041C886E142A4CB6BC50AABCCA6" ma:contentTypeVersion="13" ma:contentTypeDescription="Create a new document." ma:contentTypeScope="" ma:versionID="ae8447eb39958e733236cd72149919b1">
   <xsd:schema xmlns:xsd="http://www.w3.org/2001/XMLSchema" xmlns:xs="http://www.w3.org/2001/XMLSchema" xmlns:p="http://schemas.microsoft.com/office/2006/metadata/properties" xmlns:ns3="4f41ae97-5a6c-4458-bb1f-235b5f3b5d68" xmlns:ns4="8802567b-aa87-48e0-ac05-b6cac22ca2ed" targetNamespace="http://schemas.microsoft.com/office/2006/metadata/properties" ma:root="true" ma:fieldsID="aac98df62b6e875c010c3475f39038b6" ns3:_="" ns4:_="">
     <xsd:import namespace="4f41ae97-5a6c-4458-bb1f-235b5f3b5d68"/>
@@ -8480,10 +8907,38 @@
 </ct:contentTypeSchema>
 </file>
 
+<file path=customXml/item2.xml><?xml version="1.0" encoding="utf-8"?>
+<p:properties xmlns:p="http://schemas.microsoft.com/office/2006/metadata/properties" xmlns:xsi="http://www.w3.org/2001/XMLSchema-instance" xmlns:pc="http://schemas.microsoft.com/office/infopath/2007/PartnerControls">
+  <documentManagement>
+    <_activity xmlns="4f41ae97-5a6c-4458-bb1f-235b5f3b5d68" xsi:nil="true"/>
+  </documentManagement>
+</p:properties>
+</file>
+
+<file path=customXml/item3.xml><?xml version="1.0" encoding="utf-8"?>
+<?mso-contentType ?>
+<FormTemplates xmlns="http://schemas.microsoft.com/sharepoint/v3/contenttype/forms">
+  <Display>DocumentLibraryForm</Display>
+  <Edit>DocumentLibraryForm</Edit>
+  <New>DocumentLibraryForm</New>
+</FormTemplates>
+</file>
+
 <file path=customXml/itemProps1.xml><?xml version="1.0" encoding="utf-8"?>
-<ds:datastoreItem xmlns:ds="http://schemas.openxmlformats.org/officeDocument/2006/customXml" ds:itemID="{6D1ED908-36CA-47DE-9D02-6709ABA06A3B}">
+<ds:datastoreItem xmlns:ds="http://schemas.openxmlformats.org/officeDocument/2006/customXml" ds:itemID="{8774136C-BD9E-4C16-A065-F64F959C2ED0}">
   <ds:schemaRefs>
-    <ds:schemaRef ds:uri="http://schemas.microsoft.com/sharepoint/v3/contenttype/forms"/>
+    <ds:schemaRef ds:uri="http://schemas.microsoft.com/office/2006/metadata/contentType"/>
+    <ds:schemaRef ds:uri="http://schemas.microsoft.com/office/2006/metadata/properties/metaAttributes"/>
+    <ds:schemaRef ds:uri="http://www.w3.org/2001/XMLSchema"/>
+    <ds:schemaRef ds:uri="http://schemas.microsoft.com/office/2006/metadata/properties"/>
+    <ds:schemaRef ds:uri="4f41ae97-5a6c-4458-bb1f-235b5f3b5d68"/>
+    <ds:schemaRef ds:uri="8802567b-aa87-48e0-ac05-b6cac22ca2ed"/>
+    <ds:schemaRef ds:uri="http://schemas.microsoft.com/office/2006/documentManagement/types"/>
+    <ds:schemaRef ds:uri="http://schemas.microsoft.com/office/infopath/2007/PartnerControls"/>
+    <ds:schemaRef ds:uri="http://schemas.openxmlformats.org/package/2006/metadata/core-properties"/>
+    <ds:schemaRef ds:uri="http://purl.org/dc/elements/1.1/"/>
+    <ds:schemaRef ds:uri="http://purl.org/dc/terms/"/>
+    <ds:schemaRef ds:uri="http://schemas.microsoft.com/internal/obd"/>
   </ds:schemaRefs>
 </ds:datastoreItem>
 </file>
@@ -8506,20 +8961,9 @@
 </file>
 
 <file path=customXml/itemProps3.xml><?xml version="1.0" encoding="utf-8"?>
-<ds:datastoreItem xmlns:ds="http://schemas.openxmlformats.org/officeDocument/2006/customXml" ds:itemID="{8774136C-BD9E-4C16-A065-F64F959C2ED0}">
+<ds:datastoreItem xmlns:ds="http://schemas.openxmlformats.org/officeDocument/2006/customXml" ds:itemID="{6D1ED908-36CA-47DE-9D02-6709ABA06A3B}">
   <ds:schemaRefs>
-    <ds:schemaRef ds:uri="http://schemas.microsoft.com/office/2006/metadata/contentType"/>
-    <ds:schemaRef ds:uri="http://schemas.microsoft.com/office/2006/metadata/properties/metaAttributes"/>
-    <ds:schemaRef ds:uri="http://www.w3.org/2001/XMLSchema"/>
-    <ds:schemaRef ds:uri="http://schemas.microsoft.com/office/2006/metadata/properties"/>
-    <ds:schemaRef ds:uri="4f41ae97-5a6c-4458-bb1f-235b5f3b5d68"/>
-    <ds:schemaRef ds:uri="8802567b-aa87-48e0-ac05-b6cac22ca2ed"/>
-    <ds:schemaRef ds:uri="http://schemas.microsoft.com/office/2006/documentManagement/types"/>
-    <ds:schemaRef ds:uri="http://schemas.microsoft.com/office/infopath/2007/PartnerControls"/>
-    <ds:schemaRef ds:uri="http://schemas.openxmlformats.org/package/2006/metadata/core-properties"/>
-    <ds:schemaRef ds:uri="http://purl.org/dc/elements/1.1/"/>
-    <ds:schemaRef ds:uri="http://purl.org/dc/terms/"/>
-    <ds:schemaRef ds:uri="http://schemas.microsoft.com/internal/obd"/>
+    <ds:schemaRef ds:uri="http://schemas.microsoft.com/sharepoint/v3/contenttype/forms"/>
   </ds:schemaRefs>
 </ds:datastoreItem>
 </file>
</xml_diff>

<commit_message>
Added missing row to table
</commit_message>
<xml_diff>
--- a/Bayesian COVID Hospitalizations.pptx
+++ b/Bayesian COVID Hospitalizations.pptx
@@ -376,7 +376,7 @@
       <pc:sldMk xmlns:pc="http://schemas.microsoft.com/office/powerpoint/2013/main/command" cId="0" sldId="256"/>
       <ac:spMk id="10" creationId="{025B411F-C30D-3458-EC06-AD109C00A7A3}"/>
       <ac:txMk cp="75" len="39">
-        <ac:context len="1583" hash="3103544310"/>
+        <ac:context len="115" hash="3813382397"/>
       </ac:txMk>
     </ac:txMkLst>
     <p188:pos x="6895310" y="896434"/>
@@ -525,7 +525,7 @@
             <a:fld id="{311E81F8-90E2-2945-9ED7-A6A90A37CF21}" type="datetimeFigureOut">
               <a:rPr lang="en-US" smtClean="0"/>
               <a:pPr/>
-              <a:t>12/3/2024</a:t>
+              <a:t>12/5/24</a:t>
             </a:fld>
             <a:endParaRPr lang="en-US"/>
           </a:p>
@@ -1094,7 +1094,7 @@
             <a:fld id="{84FD1F27-616A-3542-91BB-C34E14AE38CD}" type="datetimeFigureOut">
               <a:rPr lang="en-US" smtClean="0"/>
               <a:pPr/>
-              <a:t>12/3/2024</a:t>
+              <a:t>12/5/24</a:t>
             </a:fld>
             <a:endParaRPr lang="en-US"/>
           </a:p>
@@ -1266,7 +1266,7 @@
             <a:fld id="{84FD1F27-616A-3542-91BB-C34E14AE38CD}" type="datetimeFigureOut">
               <a:rPr lang="en-US" smtClean="0"/>
               <a:pPr/>
-              <a:t>12/3/2024</a:t>
+              <a:t>12/5/24</a:t>
             </a:fld>
             <a:endParaRPr lang="en-US"/>
           </a:p>
@@ -2132,7 +2132,7 @@
             <a:fld id="{84FD1F27-616A-3542-91BB-C34E14AE38CD}" type="datetimeFigureOut">
               <a:rPr lang="en-US" smtClean="0"/>
               <a:pPr/>
-              <a:t>12/3/2024</a:t>
+              <a:t>12/5/24</a:t>
             </a:fld>
             <a:endParaRPr lang="en-US"/>
           </a:p>
@@ -2556,7 +2556,7 @@
             <a:fld id="{84FD1F27-616A-3542-91BB-C34E14AE38CD}" type="datetimeFigureOut">
               <a:rPr lang="en-US" smtClean="0"/>
               <a:pPr/>
-              <a:t>12/3/2024</a:t>
+              <a:t>12/5/24</a:t>
             </a:fld>
             <a:endParaRPr lang="en-US"/>
           </a:p>
@@ -2676,7 +2676,7 @@
             <a:fld id="{84FD1F27-616A-3542-91BB-C34E14AE38CD}" type="datetimeFigureOut">
               <a:rPr lang="en-US" smtClean="0"/>
               <a:pPr/>
-              <a:t>12/3/2024</a:t>
+              <a:t>12/5/24</a:t>
             </a:fld>
             <a:endParaRPr lang="en-US"/>
           </a:p>
@@ -2773,7 +2773,7 @@
             <a:fld id="{84FD1F27-616A-3542-91BB-C34E14AE38CD}" type="datetimeFigureOut">
               <a:rPr lang="en-US" smtClean="0"/>
               <a:pPr/>
-              <a:t>12/3/2024</a:t>
+              <a:t>12/5/24</a:t>
             </a:fld>
             <a:endParaRPr lang="en-US"/>
           </a:p>
@@ -3052,7 +3052,7 @@
             <a:fld id="{84FD1F27-616A-3542-91BB-C34E14AE38CD}" type="datetimeFigureOut">
               <a:rPr lang="en-US" smtClean="0"/>
               <a:pPr/>
-              <a:t>12/3/2024</a:t>
+              <a:t>12/5/24</a:t>
             </a:fld>
             <a:endParaRPr lang="en-US"/>
           </a:p>
@@ -3311,7 +3311,7 @@
             <a:fld id="{84FD1F27-616A-3542-91BB-C34E14AE38CD}" type="datetimeFigureOut">
               <a:rPr lang="en-US" smtClean="0"/>
               <a:pPr/>
-              <a:t>12/3/2024</a:t>
+              <a:t>12/5/24</a:t>
             </a:fld>
             <a:endParaRPr lang="en-US"/>
           </a:p>
@@ -3522,7 +3522,7 @@
             <a:fld id="{84FD1F27-616A-3542-91BB-C34E14AE38CD}" type="datetimeFigureOut">
               <a:rPr lang="en-US" smtClean="0"/>
               <a:pPr/>
-              <a:t>12/3/2024</a:t>
+              <a:t>12/5/24</a:t>
             </a:fld>
             <a:endParaRPr lang="en-US"/>
           </a:p>
@@ -4052,7 +4052,7 @@
             <a:fld id="{84FD1F27-616A-3542-91BB-C34E14AE38CD}" type="datetimeFigureOut">
               <a:rPr lang="en-US" smtClean="0"/>
               <a:pPr/>
-              <a:t>12/3/2024</a:t>
+              <a:t>12/5/24</a:t>
             </a:fld>
             <a:endParaRPr lang="en-US"/>
           </a:p>
@@ -5797,7 +5797,7 @@
                 <a:effectLst/>
                 <a:latin typeface="+mj-lt"/>
               </a:rPr>
-              <a:t>When we combined the models trained on multiple imputed datasets, they performed poorly, indicating that our model could be overly sensitive to the specific data patterns introduced during imputation. Consequently, the imputed models fail to generalize well to the underlying data structure.</a:t>
+              <a:t>When we combined the imputation models, they performed poorly, indicating that our model could be overly sensitive to the specific data patterns introduced during imputation. Consequently, the imputed models fail to generalize well to the underlying data structure.</a:t>
             </a:r>
             <a:endParaRPr lang="en-US" sz="3000" dirty="0">
               <a:latin typeface="+mj-lt"/>
@@ -6183,430 +6183,6 @@
               <a:t>Data structure (individual case level):</a:t>
             </a:r>
           </a:p>
-          <a:p>
-            <a:pPr marL="475794"/>
-            <a:r>
-              <a:rPr lang="en-US" sz="1400" b="0" dirty="0">
-                <a:latin typeface="Courier New" panose="02070309020205020404" pitchFamily="49" charset="0"/>
-                <a:cs typeface="Courier New" panose="02070309020205020404" pitchFamily="49" charset="0"/>
-              </a:rPr>
-              <a:t>'</a:t>
-            </a:r>
-            <a:r>
-              <a:rPr lang="en-US" sz="1400" b="0" dirty="0" err="1">
-                <a:latin typeface="Courier New" panose="02070309020205020404" pitchFamily="49" charset="0"/>
-                <a:cs typeface="Courier New" panose="02070309020205020404" pitchFamily="49" charset="0"/>
-              </a:rPr>
-              <a:t>data.frame</a:t>
-            </a:r>
-            <a:r>
-              <a:rPr lang="en-US" sz="1400" b="0" dirty="0">
-                <a:latin typeface="Courier New" panose="02070309020205020404" pitchFamily="49" charset="0"/>
-                <a:cs typeface="Courier New" panose="02070309020205020404" pitchFamily="49" charset="0"/>
-              </a:rPr>
-              <a:t>':	100000 obs. of  19 variables:</a:t>
-            </a:r>
-          </a:p>
-          <a:p>
-            <a:pPr marL="475794"/>
-            <a:r>
-              <a:rPr lang="en-US" sz="1400" b="0" dirty="0">
-                <a:latin typeface="Courier New" panose="02070309020205020404" pitchFamily="49" charset="0"/>
-                <a:cs typeface="Courier New" panose="02070309020205020404" pitchFamily="49" charset="0"/>
-              </a:rPr>
-              <a:t> $ </a:t>
-            </a:r>
-            <a:r>
-              <a:rPr lang="en-US" sz="1400" b="0" dirty="0" err="1">
-                <a:latin typeface="Courier New" panose="02070309020205020404" pitchFamily="49" charset="0"/>
-                <a:cs typeface="Courier New" panose="02070309020205020404" pitchFamily="49" charset="0"/>
-              </a:rPr>
-              <a:t>case_month</a:t>
-            </a:r>
-            <a:r>
-              <a:rPr lang="en-US" sz="1400" b="0" dirty="0">
-                <a:latin typeface="Courier New" panose="02070309020205020404" pitchFamily="49" charset="0"/>
-                <a:cs typeface="Courier New" panose="02070309020205020404" pitchFamily="49" charset="0"/>
-              </a:rPr>
-              <a:t>              : chr  "2021-10" "2022-02" "2020-09" "2021-10" ...</a:t>
-            </a:r>
-          </a:p>
-          <a:p>
-            <a:pPr marL="475794"/>
-            <a:r>
-              <a:rPr lang="en-US" sz="1400" b="0" dirty="0">
-                <a:latin typeface="Courier New" panose="02070309020205020404" pitchFamily="49" charset="0"/>
-                <a:cs typeface="Courier New" panose="02070309020205020404" pitchFamily="49" charset="0"/>
-              </a:rPr>
-              <a:t> $ </a:t>
-            </a:r>
-            <a:r>
-              <a:rPr lang="en-US" sz="1400" b="0" dirty="0" err="1">
-                <a:latin typeface="Courier New" panose="02070309020205020404" pitchFamily="49" charset="0"/>
-                <a:cs typeface="Courier New" panose="02070309020205020404" pitchFamily="49" charset="0"/>
-              </a:rPr>
-              <a:t>res_state</a:t>
-            </a:r>
-            <a:r>
-              <a:rPr lang="en-US" sz="1400" b="0" dirty="0">
-                <a:latin typeface="Courier New" panose="02070309020205020404" pitchFamily="49" charset="0"/>
-                <a:cs typeface="Courier New" panose="02070309020205020404" pitchFamily="49" charset="0"/>
-              </a:rPr>
-              <a:t>               : chr  "NC" "GA" "MO" "MI" ...</a:t>
-            </a:r>
-          </a:p>
-          <a:p>
-            <a:pPr marL="475794"/>
-            <a:r>
-              <a:rPr lang="en-US" sz="1400" b="0" dirty="0">
-                <a:latin typeface="Courier New" panose="02070309020205020404" pitchFamily="49" charset="0"/>
-                <a:cs typeface="Courier New" panose="02070309020205020404" pitchFamily="49" charset="0"/>
-              </a:rPr>
-              <a:t> $ </a:t>
-            </a:r>
-            <a:r>
-              <a:rPr lang="en-US" sz="1400" b="0" dirty="0" err="1">
-                <a:latin typeface="Courier New" panose="02070309020205020404" pitchFamily="49" charset="0"/>
-                <a:cs typeface="Courier New" panose="02070309020205020404" pitchFamily="49" charset="0"/>
-              </a:rPr>
-              <a:t>state_fips_code</a:t>
-            </a:r>
-            <a:r>
-              <a:rPr lang="en-US" sz="1400" b="0" dirty="0">
-                <a:latin typeface="Courier New" panose="02070309020205020404" pitchFamily="49" charset="0"/>
-                <a:cs typeface="Courier New" panose="02070309020205020404" pitchFamily="49" charset="0"/>
-              </a:rPr>
-              <a:t>         : chr  "37" "13" "29" "26" ...</a:t>
-            </a:r>
-          </a:p>
-          <a:p>
-            <a:pPr marL="475794"/>
-            <a:r>
-              <a:rPr lang="en-US" sz="1400" b="0" dirty="0">
-                <a:latin typeface="Courier New" panose="02070309020205020404" pitchFamily="49" charset="0"/>
-                <a:cs typeface="Courier New" panose="02070309020205020404" pitchFamily="49" charset="0"/>
-              </a:rPr>
-              <a:t> $ </a:t>
-            </a:r>
-            <a:r>
-              <a:rPr lang="en-US" sz="1400" b="0" dirty="0" err="1">
-                <a:latin typeface="Courier New" panose="02070309020205020404" pitchFamily="49" charset="0"/>
-                <a:cs typeface="Courier New" panose="02070309020205020404" pitchFamily="49" charset="0"/>
-              </a:rPr>
-              <a:t>res_county</a:t>
-            </a:r>
-            <a:r>
-              <a:rPr lang="en-US" sz="1400" b="0" dirty="0">
-                <a:latin typeface="Courier New" panose="02070309020205020404" pitchFamily="49" charset="0"/>
-                <a:cs typeface="Courier New" panose="02070309020205020404" pitchFamily="49" charset="0"/>
-              </a:rPr>
-              <a:t>              : chr  "DAVIE" "BULLOCH" "POLK" "SANILAC" ...</a:t>
-            </a:r>
-          </a:p>
-          <a:p>
-            <a:pPr marL="475794"/>
-            <a:r>
-              <a:rPr lang="en-US" sz="1400" b="0" dirty="0">
-                <a:latin typeface="Courier New" panose="02070309020205020404" pitchFamily="49" charset="0"/>
-                <a:cs typeface="Courier New" panose="02070309020205020404" pitchFamily="49" charset="0"/>
-              </a:rPr>
-              <a:t> $ </a:t>
-            </a:r>
-            <a:r>
-              <a:rPr lang="en-US" sz="1400" b="0" dirty="0" err="1">
-                <a:latin typeface="Courier New" panose="02070309020205020404" pitchFamily="49" charset="0"/>
-                <a:cs typeface="Courier New" panose="02070309020205020404" pitchFamily="49" charset="0"/>
-              </a:rPr>
-              <a:t>county_fips_code</a:t>
-            </a:r>
-            <a:r>
-              <a:rPr lang="en-US" sz="1400" b="0" dirty="0">
-                <a:latin typeface="Courier New" panose="02070309020205020404" pitchFamily="49" charset="0"/>
-                <a:cs typeface="Courier New" panose="02070309020205020404" pitchFamily="49" charset="0"/>
-              </a:rPr>
-              <a:t>        : chr  "37059" "13031" "29167" "26151" ...</a:t>
-            </a:r>
-          </a:p>
-          <a:p>
-            <a:pPr marL="475794"/>
-            <a:r>
-              <a:rPr lang="en-US" sz="1400" b="0" dirty="0">
-                <a:latin typeface="Courier New" panose="02070309020205020404" pitchFamily="49" charset="0"/>
-                <a:cs typeface="Courier New" panose="02070309020205020404" pitchFamily="49" charset="0"/>
-              </a:rPr>
-              <a:t> $ </a:t>
-            </a:r>
-            <a:r>
-              <a:rPr lang="en-US" sz="1400" b="0" dirty="0" err="1">
-                <a:latin typeface="Courier New" panose="02070309020205020404" pitchFamily="49" charset="0"/>
-                <a:cs typeface="Courier New" panose="02070309020205020404" pitchFamily="49" charset="0"/>
-              </a:rPr>
-              <a:t>age_group</a:t>
-            </a:r>
-            <a:r>
-              <a:rPr lang="en-US" sz="1400" b="0" dirty="0">
-                <a:latin typeface="Courier New" panose="02070309020205020404" pitchFamily="49" charset="0"/>
-                <a:cs typeface="Courier New" panose="02070309020205020404" pitchFamily="49" charset="0"/>
-              </a:rPr>
-              <a:t>               : chr  "0 - 17 years" "18 to 49 years" "18 to 49 years" "18 to 49 years" ...</a:t>
-            </a:r>
-          </a:p>
-          <a:p>
-            <a:pPr marL="475794"/>
-            <a:r>
-              <a:rPr lang="en-US" sz="1400" b="0" dirty="0">
-                <a:latin typeface="Courier New" panose="02070309020205020404" pitchFamily="49" charset="0"/>
-                <a:cs typeface="Courier New" panose="02070309020205020404" pitchFamily="49" charset="0"/>
-              </a:rPr>
-              <a:t> $ sex                     : chr  "Female" "Female" "Female" "Female" Missing" ...</a:t>
-            </a:r>
-          </a:p>
-          <a:p>
-            <a:pPr marL="475794"/>
-            <a:r>
-              <a:rPr lang="en-US" sz="1400" b="0" dirty="0">
-                <a:latin typeface="Courier New" panose="02070309020205020404" pitchFamily="49" charset="0"/>
-                <a:cs typeface="Courier New" panose="02070309020205020404" pitchFamily="49" charset="0"/>
-              </a:rPr>
-              <a:t> $ </a:t>
-            </a:r>
-            <a:r>
-              <a:rPr lang="en-US" sz="1400" b="0" dirty="0" err="1">
-                <a:latin typeface="Courier New" panose="02070309020205020404" pitchFamily="49" charset="0"/>
-                <a:cs typeface="Courier New" panose="02070309020205020404" pitchFamily="49" charset="0"/>
-              </a:rPr>
-              <a:t>hosp_yn</a:t>
-            </a:r>
-            <a:r>
-              <a:rPr lang="en-US" sz="1400" b="0" dirty="0">
-                <a:latin typeface="Courier New" panose="02070309020205020404" pitchFamily="49" charset="0"/>
-                <a:cs typeface="Courier New" panose="02070309020205020404" pitchFamily="49" charset="0"/>
-              </a:rPr>
-              <a:t>                 : chr  "Unknown" "Missing" "Unknown" "Missing"...</a:t>
-            </a:r>
-          </a:p>
-          <a:p>
-            <a:pPr marL="475794"/>
-            <a:r>
-              <a:rPr lang="en-US" sz="1400" b="0" dirty="0">
-                <a:latin typeface="Courier New" panose="02070309020205020404" pitchFamily="49" charset="0"/>
-                <a:cs typeface="Courier New" panose="02070309020205020404" pitchFamily="49" charset="0"/>
-              </a:rPr>
-              <a:t> $ race                    : chr  "NA" "Unknown" "NA" "NA" ...</a:t>
-            </a:r>
-          </a:p>
-          <a:p>
-            <a:pPr marL="475794"/>
-            <a:r>
-              <a:rPr lang="en-US" sz="1400" b="0" dirty="0">
-                <a:latin typeface="Courier New" panose="02070309020205020404" pitchFamily="49" charset="0"/>
-                <a:cs typeface="Courier New" panose="02070309020205020404" pitchFamily="49" charset="0"/>
-              </a:rPr>
-              <a:t> $ ethnicity               : chr  "NA" "Missing" "NA" "NA" ...</a:t>
-            </a:r>
-          </a:p>
-          <a:p>
-            <a:pPr marL="475794"/>
-            <a:r>
-              <a:rPr lang="en-US" sz="1400" b="0" dirty="0">
-                <a:latin typeface="Courier New" panose="02070309020205020404" pitchFamily="49" charset="0"/>
-                <a:cs typeface="Courier New" panose="02070309020205020404" pitchFamily="49" charset="0"/>
-              </a:rPr>
-              <a:t> $ </a:t>
-            </a:r>
-            <a:r>
-              <a:rPr lang="en-US" sz="1400" b="0" dirty="0" err="1">
-                <a:latin typeface="Courier New" panose="02070309020205020404" pitchFamily="49" charset="0"/>
-                <a:cs typeface="Courier New" panose="02070309020205020404" pitchFamily="49" charset="0"/>
-              </a:rPr>
-              <a:t>case_positive_specimen</a:t>
-            </a:r>
-            <a:r>
-              <a:rPr lang="en-US" sz="1400" b="0" dirty="0">
-                <a:latin typeface="Courier New" panose="02070309020205020404" pitchFamily="49" charset="0"/>
-                <a:cs typeface="Courier New" panose="02070309020205020404" pitchFamily="49" charset="0"/>
-              </a:rPr>
-              <a:t>  : chr  "0.0" NA "0.0" NA ...</a:t>
-            </a:r>
-          </a:p>
-          <a:p>
-            <a:pPr marL="475794"/>
-            <a:r>
-              <a:rPr lang="en-US" sz="1400" b="0" dirty="0">
-                <a:latin typeface="Courier New" panose="02070309020205020404" pitchFamily="49" charset="0"/>
-                <a:cs typeface="Courier New" panose="02070309020205020404" pitchFamily="49" charset="0"/>
-              </a:rPr>
-              <a:t> $ process                 : chr  "Missing" "Missing" "Missing" "Missing" ...</a:t>
-            </a:r>
-          </a:p>
-          <a:p>
-            <a:pPr marL="475794"/>
-            <a:r>
-              <a:rPr lang="en-US" sz="1400" b="0" dirty="0">
-                <a:latin typeface="Courier New" panose="02070309020205020404" pitchFamily="49" charset="0"/>
-                <a:cs typeface="Courier New" panose="02070309020205020404" pitchFamily="49" charset="0"/>
-              </a:rPr>
-              <a:t> $ </a:t>
-            </a:r>
-            <a:r>
-              <a:rPr lang="en-US" sz="1400" b="0" dirty="0" err="1">
-                <a:latin typeface="Courier New" panose="02070309020205020404" pitchFamily="49" charset="0"/>
-                <a:cs typeface="Courier New" panose="02070309020205020404" pitchFamily="49" charset="0"/>
-              </a:rPr>
-              <a:t>exposure_yn</a:t>
-            </a:r>
-            <a:r>
-              <a:rPr lang="en-US" sz="1400" b="0" dirty="0">
-                <a:latin typeface="Courier New" panose="02070309020205020404" pitchFamily="49" charset="0"/>
-                <a:cs typeface="Courier New" panose="02070309020205020404" pitchFamily="49" charset="0"/>
-              </a:rPr>
-              <a:t>             : chr  "Missing" "Missing" "Missing" "Missing" ...</a:t>
-            </a:r>
-          </a:p>
-          <a:p>
-            <a:pPr marL="475794"/>
-            <a:r>
-              <a:rPr lang="en-US" sz="1400" b="0" dirty="0">
-                <a:latin typeface="Courier New" panose="02070309020205020404" pitchFamily="49" charset="0"/>
-                <a:cs typeface="Courier New" panose="02070309020205020404" pitchFamily="49" charset="0"/>
-              </a:rPr>
-              <a:t> $ </a:t>
-            </a:r>
-            <a:r>
-              <a:rPr lang="en-US" sz="1400" b="0" dirty="0" err="1">
-                <a:latin typeface="Courier New" panose="02070309020205020404" pitchFamily="49" charset="0"/>
-                <a:cs typeface="Courier New" panose="02070309020205020404" pitchFamily="49" charset="0"/>
-              </a:rPr>
-              <a:t>current_status</a:t>
-            </a:r>
-            <a:r>
-              <a:rPr lang="en-US" sz="1400" b="0" dirty="0">
-                <a:latin typeface="Courier New" panose="02070309020205020404" pitchFamily="49" charset="0"/>
-                <a:cs typeface="Courier New" panose="02070309020205020404" pitchFamily="49" charset="0"/>
-              </a:rPr>
-              <a:t>          : chr  "Laboratory-confirmed case" "Laboratory-confirmed case" "Laboratory-confirmed case" "Laboratory-confirmed case" ...</a:t>
-            </a:r>
-          </a:p>
-          <a:p>
-            <a:pPr marL="475794"/>
-            <a:r>
-              <a:rPr lang="en-US" sz="1400" b="0" dirty="0">
-                <a:latin typeface="Courier New" panose="02070309020205020404" pitchFamily="49" charset="0"/>
-                <a:cs typeface="Courier New" panose="02070309020205020404" pitchFamily="49" charset="0"/>
-              </a:rPr>
-              <a:t> $ </a:t>
-            </a:r>
-            <a:r>
-              <a:rPr lang="en-US" sz="1400" b="0" dirty="0" err="1">
-                <a:latin typeface="Courier New" panose="02070309020205020404" pitchFamily="49" charset="0"/>
-                <a:cs typeface="Courier New" panose="02070309020205020404" pitchFamily="49" charset="0"/>
-              </a:rPr>
-              <a:t>symptom_status</a:t>
-            </a:r>
-            <a:r>
-              <a:rPr lang="en-US" sz="1400" b="0" dirty="0">
-                <a:latin typeface="Courier New" panose="02070309020205020404" pitchFamily="49" charset="0"/>
-                <a:cs typeface="Courier New" panose="02070309020205020404" pitchFamily="49" charset="0"/>
-              </a:rPr>
-              <a:t>          : chr  "Unknown" "Symptomatic" "Symptomatic" " ...</a:t>
-            </a:r>
-          </a:p>
-          <a:p>
-            <a:pPr marL="475794"/>
-            <a:r>
-              <a:rPr lang="en-US" sz="1400" b="0" dirty="0">
-                <a:latin typeface="Courier New" panose="02070309020205020404" pitchFamily="49" charset="0"/>
-                <a:cs typeface="Courier New" panose="02070309020205020404" pitchFamily="49" charset="0"/>
-              </a:rPr>
-              <a:t> $ </a:t>
-            </a:r>
-            <a:r>
-              <a:rPr lang="en-US" sz="1400" b="0" dirty="0" err="1">
-                <a:latin typeface="Courier New" panose="02070309020205020404" pitchFamily="49" charset="0"/>
-                <a:cs typeface="Courier New" panose="02070309020205020404" pitchFamily="49" charset="0"/>
-              </a:rPr>
-              <a:t>icu_yn</a:t>
-            </a:r>
-            <a:r>
-              <a:rPr lang="en-US" sz="1400" b="0" dirty="0">
-                <a:latin typeface="Courier New" panose="02070309020205020404" pitchFamily="49" charset="0"/>
-                <a:cs typeface="Courier New" panose="02070309020205020404" pitchFamily="49" charset="0"/>
-              </a:rPr>
-              <a:t>                  : chr  "Unknown" "Missing" "Missing" "Missing" ...</a:t>
-            </a:r>
-          </a:p>
-          <a:p>
-            <a:pPr marL="475794"/>
-            <a:r>
-              <a:rPr lang="en-US" sz="1400" b="0" dirty="0">
-                <a:latin typeface="Courier New" panose="02070309020205020404" pitchFamily="49" charset="0"/>
-                <a:cs typeface="Courier New" panose="02070309020205020404" pitchFamily="49" charset="0"/>
-              </a:rPr>
-              <a:t> $ </a:t>
-            </a:r>
-            <a:r>
-              <a:rPr lang="en-US" sz="1400" b="0" dirty="0" err="1">
-                <a:latin typeface="Courier New" panose="02070309020205020404" pitchFamily="49" charset="0"/>
-                <a:cs typeface="Courier New" panose="02070309020205020404" pitchFamily="49" charset="0"/>
-              </a:rPr>
-              <a:t>death_yn</a:t>
-            </a:r>
-            <a:r>
-              <a:rPr lang="en-US" sz="1400" b="0" dirty="0">
-                <a:latin typeface="Courier New" panose="02070309020205020404" pitchFamily="49" charset="0"/>
-                <a:cs typeface="Courier New" panose="02070309020205020404" pitchFamily="49" charset="0"/>
-              </a:rPr>
-              <a:t>                : chr  "No" "Missing" "Unknown" "Unknown" ...</a:t>
-            </a:r>
-          </a:p>
-          <a:p>
-            <a:pPr marL="475794"/>
-            <a:r>
-              <a:rPr lang="en-US" sz="1400" b="0" dirty="0">
-                <a:latin typeface="Courier New" panose="02070309020205020404" pitchFamily="49" charset="0"/>
-                <a:cs typeface="Courier New" panose="02070309020205020404" pitchFamily="49" charset="0"/>
-              </a:rPr>
-              <a:t> $ </a:t>
-            </a:r>
-            <a:r>
-              <a:rPr lang="en-US" sz="1400" b="0" dirty="0" err="1">
-                <a:latin typeface="Courier New" panose="02070309020205020404" pitchFamily="49" charset="0"/>
-                <a:cs typeface="Courier New" panose="02070309020205020404" pitchFamily="49" charset="0"/>
-              </a:rPr>
-              <a:t>case_onset_interval</a:t>
-            </a:r>
-            <a:r>
-              <a:rPr lang="en-US" sz="1400" b="0" dirty="0">
-                <a:latin typeface="Courier New" panose="02070309020205020404" pitchFamily="49" charset="0"/>
-                <a:cs typeface="Courier New" panose="02070309020205020404" pitchFamily="49" charset="0"/>
-              </a:rPr>
-              <a:t>     : chr  NA "0.0" "0.0" NA ...</a:t>
-            </a:r>
-          </a:p>
-          <a:p>
-            <a:pPr marL="475794"/>
-            <a:r>
-              <a:rPr lang="en-US" sz="1400" b="0" dirty="0">
-                <a:latin typeface="Courier New" panose="02070309020205020404" pitchFamily="49" charset="0"/>
-                <a:cs typeface="Courier New" panose="02070309020205020404" pitchFamily="49" charset="0"/>
-              </a:rPr>
-              <a:t> $ </a:t>
-            </a:r>
-            <a:r>
-              <a:rPr lang="en-US" sz="1400" b="0" dirty="0" err="1">
-                <a:latin typeface="Courier New" panose="02070309020205020404" pitchFamily="49" charset="0"/>
-                <a:cs typeface="Courier New" panose="02070309020205020404" pitchFamily="49" charset="0"/>
-              </a:rPr>
-              <a:t>underlying_conditions_yn</a:t>
-            </a:r>
-            <a:r>
-              <a:rPr lang="en-US" sz="1400" b="0" dirty="0">
-                <a:latin typeface="Courier New" panose="02070309020205020404" pitchFamily="49" charset="0"/>
-                <a:cs typeface="Courier New" panose="02070309020205020404" pitchFamily="49" charset="0"/>
-              </a:rPr>
-              <a:t>: chr  NA NA NA NA ...</a:t>
-            </a:r>
-          </a:p>
         </p:txBody>
       </p:sp>
       <p:sp>
@@ -8056,6 +7632,36 @@
           <a:xfrm>
             <a:off x="19188149" y="8060370"/>
             <a:ext cx="6989231" cy="4313354"/>
+          </a:xfrm>
+          <a:prstGeom prst="rect">
+            <a:avLst/>
+          </a:prstGeom>
+        </p:spPr>
+      </p:pic>
+      <p:pic>
+        <p:nvPicPr>
+          <p:cNvPr id="11" name="Picture 10" descr="A screenshot of a cell phone&#10;&#10;Description automatically generated">
+            <a:extLst>
+              <a:ext uri="{FF2B5EF4-FFF2-40B4-BE49-F238E27FC236}">
+                <a16:creationId xmlns:a16="http://schemas.microsoft.com/office/drawing/2014/main" id="{9A767080-2D0C-2C60-D8D2-9DD7EFD1513A}"/>
+              </a:ext>
+            </a:extLst>
+          </p:cNvPr>
+          <p:cNvPicPr>
+            <a:picLocks noChangeAspect="1"/>
+          </p:cNvPicPr>
+          <p:nvPr/>
+        </p:nvPicPr>
+        <p:blipFill>
+          <a:blip r:embed="rId27"/>
+          <a:stretch>
+            <a:fillRect/>
+          </a:stretch>
+        </p:blipFill>
+        <p:spPr>
+          <a:xfrm>
+            <a:off x="19528806" y="23604555"/>
+            <a:ext cx="5266872" cy="690142"/>
           </a:xfrm>
           <a:prstGeom prst="rect">
             <a:avLst/>
@@ -8687,6 +8293,23 @@
 </file>
 
 <file path=customXml/item1.xml><?xml version="1.0" encoding="utf-8"?>
+<?mso-contentType ?>
+<FormTemplates xmlns="http://schemas.microsoft.com/sharepoint/v3/contenttype/forms">
+  <Display>DocumentLibraryForm</Display>
+  <Edit>DocumentLibraryForm</Edit>
+  <New>DocumentLibraryForm</New>
+</FormTemplates>
+</file>
+
+<file path=customXml/item2.xml><?xml version="1.0" encoding="utf-8"?>
+<p:properties xmlns:p="http://schemas.microsoft.com/office/2006/metadata/properties" xmlns:xsi="http://www.w3.org/2001/XMLSchema-instance" xmlns:pc="http://schemas.microsoft.com/office/infopath/2007/PartnerControls">
+  <documentManagement>
+    <_activity xmlns="4f41ae97-5a6c-4458-bb1f-235b5f3b5d68" xsi:nil="true"/>
+  </documentManagement>
+</p:properties>
+</file>
+
+<file path=customXml/item3.xml><?xml version="1.0" encoding="utf-8"?>
 <ct:contentTypeSchema xmlns:ct="http://schemas.microsoft.com/office/2006/metadata/contentType" xmlns:ma="http://schemas.microsoft.com/office/2006/metadata/properties/metaAttributes" ct:_="" ma:_="" ma:contentTypeName="Document" ma:contentTypeID="0x0101009751B041C886E142A4CB6BC50AABCCA6" ma:contentTypeVersion="13" ma:contentTypeDescription="Create a new document." ma:contentTypeScope="" ma:versionID="ae8447eb39958e733236cd72149919b1">
   <xsd:schema xmlns:xsd="http://www.w3.org/2001/XMLSchema" xmlns:xs="http://www.w3.org/2001/XMLSchema" xmlns:p="http://schemas.microsoft.com/office/2006/metadata/properties" xmlns:ns3="4f41ae97-5a6c-4458-bb1f-235b5f3b5d68" xmlns:ns4="8802567b-aa87-48e0-ac05-b6cac22ca2ed" targetNamespace="http://schemas.microsoft.com/office/2006/metadata/properties" ma:root="true" ma:fieldsID="aac98df62b6e875c010c3475f39038b6" ns3:_="" ns4:_="">
     <xsd:import namespace="4f41ae97-5a6c-4458-bb1f-235b5f3b5d68"/>
@@ -8907,38 +8530,10 @@
 </ct:contentTypeSchema>
 </file>
 
-<file path=customXml/item2.xml><?xml version="1.0" encoding="utf-8"?>
-<p:properties xmlns:p="http://schemas.microsoft.com/office/2006/metadata/properties" xmlns:xsi="http://www.w3.org/2001/XMLSchema-instance" xmlns:pc="http://schemas.microsoft.com/office/infopath/2007/PartnerControls">
-  <documentManagement>
-    <_activity xmlns="4f41ae97-5a6c-4458-bb1f-235b5f3b5d68" xsi:nil="true"/>
-  </documentManagement>
-</p:properties>
-</file>
-
-<file path=customXml/item3.xml><?xml version="1.0" encoding="utf-8"?>
-<?mso-contentType ?>
-<FormTemplates xmlns="http://schemas.microsoft.com/sharepoint/v3/contenttype/forms">
-  <Display>DocumentLibraryForm</Display>
-  <Edit>DocumentLibraryForm</Edit>
-  <New>DocumentLibraryForm</New>
-</FormTemplates>
-</file>
-
 <file path=customXml/itemProps1.xml><?xml version="1.0" encoding="utf-8"?>
-<ds:datastoreItem xmlns:ds="http://schemas.openxmlformats.org/officeDocument/2006/customXml" ds:itemID="{8774136C-BD9E-4C16-A065-F64F959C2ED0}">
+<ds:datastoreItem xmlns:ds="http://schemas.openxmlformats.org/officeDocument/2006/customXml" ds:itemID="{6D1ED908-36CA-47DE-9D02-6709ABA06A3B}">
   <ds:schemaRefs>
-    <ds:schemaRef ds:uri="http://schemas.microsoft.com/office/2006/metadata/contentType"/>
-    <ds:schemaRef ds:uri="http://schemas.microsoft.com/office/2006/metadata/properties/metaAttributes"/>
-    <ds:schemaRef ds:uri="http://www.w3.org/2001/XMLSchema"/>
-    <ds:schemaRef ds:uri="http://schemas.microsoft.com/office/2006/metadata/properties"/>
-    <ds:schemaRef ds:uri="4f41ae97-5a6c-4458-bb1f-235b5f3b5d68"/>
-    <ds:schemaRef ds:uri="8802567b-aa87-48e0-ac05-b6cac22ca2ed"/>
-    <ds:schemaRef ds:uri="http://schemas.microsoft.com/office/2006/documentManagement/types"/>
-    <ds:schemaRef ds:uri="http://schemas.microsoft.com/office/infopath/2007/PartnerControls"/>
-    <ds:schemaRef ds:uri="http://schemas.openxmlformats.org/package/2006/metadata/core-properties"/>
-    <ds:schemaRef ds:uri="http://purl.org/dc/elements/1.1/"/>
-    <ds:schemaRef ds:uri="http://purl.org/dc/terms/"/>
-    <ds:schemaRef ds:uri="http://schemas.microsoft.com/internal/obd"/>
+    <ds:schemaRef ds:uri="http://schemas.microsoft.com/sharepoint/v3/contenttype/forms"/>
   </ds:schemaRefs>
 </ds:datastoreItem>
 </file>
@@ -8961,9 +8556,20 @@
 </file>
 
 <file path=customXml/itemProps3.xml><?xml version="1.0" encoding="utf-8"?>
-<ds:datastoreItem xmlns:ds="http://schemas.openxmlformats.org/officeDocument/2006/customXml" ds:itemID="{6D1ED908-36CA-47DE-9D02-6709ABA06A3B}">
+<ds:datastoreItem xmlns:ds="http://schemas.openxmlformats.org/officeDocument/2006/customXml" ds:itemID="{8774136C-BD9E-4C16-A065-F64F959C2ED0}">
   <ds:schemaRefs>
-    <ds:schemaRef ds:uri="http://schemas.microsoft.com/sharepoint/v3/contenttype/forms"/>
+    <ds:schemaRef ds:uri="http://schemas.microsoft.com/office/2006/metadata/contentType"/>
+    <ds:schemaRef ds:uri="http://schemas.microsoft.com/office/2006/metadata/properties/metaAttributes"/>
+    <ds:schemaRef ds:uri="http://www.w3.org/2001/XMLSchema"/>
+    <ds:schemaRef ds:uri="http://schemas.microsoft.com/office/2006/metadata/properties"/>
+    <ds:schemaRef ds:uri="4f41ae97-5a6c-4458-bb1f-235b5f3b5d68"/>
+    <ds:schemaRef ds:uri="8802567b-aa87-48e0-ac05-b6cac22ca2ed"/>
+    <ds:schemaRef ds:uri="http://schemas.microsoft.com/office/2006/documentManagement/types"/>
+    <ds:schemaRef ds:uri="http://schemas.microsoft.com/office/infopath/2007/PartnerControls"/>
+    <ds:schemaRef ds:uri="http://schemas.openxmlformats.org/package/2006/metadata/core-properties"/>
+    <ds:schemaRef ds:uri="http://purl.org/dc/elements/1.1/"/>
+    <ds:schemaRef ds:uri="http://purl.org/dc/terms/"/>
+    <ds:schemaRef ds:uri="http://schemas.microsoft.com/internal/obd"/>
   </ds:schemaRefs>
 </ds:datastoreItem>
 </file>
</xml_diff>

<commit_message>
replaced p's with pis and fixed model definitions
</commit_message>
<xml_diff>
--- a/Bayesian COVID Hospitalizations.pptx
+++ b/Bayesian COVID Hospitalizations.pptx
@@ -170,8 +170,8 @@
       <pc:docMk xmlns:pc="http://schemas.microsoft.com/office/powerpoint/2013/main/command"/>
       <pc:sldMk xmlns:pc="http://schemas.microsoft.com/office/powerpoint/2013/main/command" cId="0" sldId="256"/>
       <ac:spMk id="50" creationId="{00000000-0000-0000-0000-000000000000}"/>
-      <ac:txMk cp="58" len="322">
-        <ac:context len="485" hash="4221436145"/>
+      <ac:txMk cp="90" len="322">
+        <ac:context len="517" hash="3313128920"/>
       </ac:txMk>
     </ac:txMkLst>
     <p188:pos x="15025949" y="5293895"/>
@@ -4483,8 +4483,8 @@
         </p:nvSpPr>
         <p:spPr>
           <a:xfrm>
-            <a:off x="18473346" y="25212865"/>
-            <a:ext cx="14720346" cy="2439129"/>
+            <a:off x="18463924" y="24930163"/>
+            <a:ext cx="14720346" cy="2908489"/>
           </a:xfrm>
           <a:prstGeom prst="rect">
             <a:avLst/>
@@ -4507,6 +4507,15 @@
               </a:rPr>
               <a:t>Final predictors: </a:t>
             </a:r>
+          </a:p>
+          <a:p>
+            <a:pPr marL="932994" indent="-457200">
+              <a:buFont typeface="Arial" panose="020B0604020202020204" pitchFamily="34" charset="0"/>
+              <a:buChar char="•"/>
+            </a:pPr>
+            <a:endParaRPr lang="en-US" sz="3050" b="0" dirty="0">
+              <a:latin typeface="+mn-lt"/>
+            </a:endParaRPr>
           </a:p>
           <a:p>
             <a:pPr marL="932994" indent="-457200">
@@ -5226,7 +5235,7 @@
         </p:nvSpPr>
         <p:spPr>
           <a:xfrm>
-            <a:off x="2236815" y="20780360"/>
+            <a:off x="2236815" y="17215855"/>
             <a:ext cx="14838218" cy="9077565"/>
           </a:xfrm>
         </p:spPr>
@@ -5244,7 +5253,7 @@
               <a:rPr lang="en-US" sz="3000" dirty="0">
                 <a:latin typeface="+mn-lt"/>
               </a:rPr>
-              <a:t>Outcome variable:</a:t>
+              <a:t>Outcome variable:		                        where:</a:t>
             </a:r>
           </a:p>
           <a:p>
@@ -5949,7 +5958,7 @@
         </p:nvSpPr>
         <p:spPr>
           <a:xfrm>
-            <a:off x="3207327" y="19699762"/>
+            <a:off x="3191469" y="16146899"/>
             <a:ext cx="12928910" cy="528816"/>
           </a:xfrm>
           <a:prstGeom prst="rect">
@@ -6921,7 +6930,7 @@
         </p:blipFill>
         <p:spPr>
           <a:xfrm>
-            <a:off x="6236431" y="20248514"/>
+            <a:off x="6133938" y="16735816"/>
             <a:ext cx="7307816" cy="1429790"/>
           </a:xfrm>
           <a:prstGeom prst="rect">
@@ -6951,98 +6960,8 @@
         </p:blipFill>
         <p:spPr>
           <a:xfrm>
-            <a:off x="6236431" y="21762545"/>
+            <a:off x="6211652" y="18183394"/>
             <a:ext cx="4871975" cy="1963897"/>
-          </a:xfrm>
-          <a:prstGeom prst="rect">
-            <a:avLst/>
-          </a:prstGeom>
-        </p:spPr>
-      </p:pic>
-      <p:pic>
-        <p:nvPicPr>
-          <p:cNvPr id="40" name="Picture 39">
-            <a:extLst>
-              <a:ext uri="{FF2B5EF4-FFF2-40B4-BE49-F238E27FC236}">
-                <a16:creationId xmlns:a16="http://schemas.microsoft.com/office/drawing/2014/main" id="{561C5FE4-9249-2A41-BA37-044223A59553}"/>
-              </a:ext>
-            </a:extLst>
-          </p:cNvPr>
-          <p:cNvPicPr>
-            <a:picLocks noChangeAspect="1"/>
-          </p:cNvPicPr>
-          <p:nvPr/>
-        </p:nvPicPr>
-        <p:blipFill>
-          <a:blip r:embed="rId12"/>
-          <a:stretch>
-            <a:fillRect/>
-          </a:stretch>
-        </p:blipFill>
-        <p:spPr>
-          <a:xfrm>
-            <a:off x="5729836" y="23687905"/>
-            <a:ext cx="12240150" cy="1224015"/>
-          </a:xfrm>
-          <a:prstGeom prst="rect">
-            <a:avLst/>
-          </a:prstGeom>
-        </p:spPr>
-      </p:pic>
-      <p:pic>
-        <p:nvPicPr>
-          <p:cNvPr id="46" name="Picture 45" descr="A close-up of a sign&#10;&#10;Description automatically generated">
-            <a:extLst>
-              <a:ext uri="{FF2B5EF4-FFF2-40B4-BE49-F238E27FC236}">
-                <a16:creationId xmlns:a16="http://schemas.microsoft.com/office/drawing/2014/main" id="{347A5C05-6D0D-4C91-4004-8A9B47776A65}"/>
-              </a:ext>
-            </a:extLst>
-          </p:cNvPr>
-          <p:cNvPicPr>
-            <a:picLocks noChangeAspect="1"/>
-          </p:cNvPicPr>
-          <p:nvPr/>
-        </p:nvPicPr>
-        <p:blipFill>
-          <a:blip r:embed="rId13"/>
-          <a:stretch>
-            <a:fillRect/>
-          </a:stretch>
-        </p:blipFill>
-        <p:spPr>
-          <a:xfrm>
-            <a:off x="22388997" y="25319142"/>
-            <a:ext cx="4213855" cy="1517319"/>
-          </a:xfrm>
-          <a:prstGeom prst="rect">
-            <a:avLst/>
-          </a:prstGeom>
-        </p:spPr>
-      </p:pic>
-      <p:pic>
-        <p:nvPicPr>
-          <p:cNvPr id="55" name="Picture 54">
-            <a:extLst>
-              <a:ext uri="{FF2B5EF4-FFF2-40B4-BE49-F238E27FC236}">
-                <a16:creationId xmlns:a16="http://schemas.microsoft.com/office/drawing/2014/main" id="{6B5E7224-EDDA-1134-23DC-69FF0ED4CC0D}"/>
-              </a:ext>
-            </a:extLst>
-          </p:cNvPr>
-          <p:cNvPicPr>
-            <a:picLocks noChangeAspect="1"/>
-          </p:cNvPicPr>
-          <p:nvPr/>
-        </p:nvPicPr>
-        <p:blipFill>
-          <a:blip r:embed="rId14"/>
-          <a:stretch>
-            <a:fillRect/>
-          </a:stretch>
-        </p:blipFill>
-        <p:spPr>
-          <a:xfrm>
-            <a:off x="21433156" y="26671507"/>
-            <a:ext cx="12074928" cy="1454348"/>
           </a:xfrm>
           <a:prstGeom prst="rect">
             <a:avLst/>
@@ -7063,7 +6982,7 @@
         </p:nvSpPr>
         <p:spPr>
           <a:xfrm>
-            <a:off x="11482860" y="21207799"/>
+            <a:off x="11493627" y="13670793"/>
             <a:ext cx="7179122" cy="2908489"/>
           </a:xfrm>
           <a:prstGeom prst="rect">
@@ -7134,14 +7053,14 @@
           <p:nvPr/>
         </p:nvPicPr>
         <p:blipFill>
-          <a:blip r:embed="rId15"/>
+          <a:blip r:embed="rId12"/>
           <a:stretch>
             <a:fillRect/>
           </a:stretch>
         </p:blipFill>
         <p:spPr>
           <a:xfrm>
-            <a:off x="2701124" y="29732376"/>
+            <a:off x="2961647" y="25859771"/>
             <a:ext cx="6368364" cy="3918993"/>
           </a:xfrm>
           <a:prstGeom prst="rect">
@@ -7164,14 +7083,14 @@
           <p:nvPr/>
         </p:nvPicPr>
         <p:blipFill>
-          <a:blip r:embed="rId16"/>
+          <a:blip r:embed="rId13"/>
           <a:stretch>
             <a:fillRect/>
           </a:stretch>
         </p:blipFill>
         <p:spPr>
           <a:xfrm>
-            <a:off x="9450317" y="29723308"/>
+            <a:off x="9710840" y="25850703"/>
             <a:ext cx="6368365" cy="3908165"/>
           </a:xfrm>
           <a:prstGeom prst="rect">
@@ -7194,7 +7113,7 @@
           <p:nvPr/>
         </p:nvPicPr>
         <p:blipFill>
-          <a:blip r:embed="rId17"/>
+          <a:blip r:embed="rId14"/>
           <a:stretch>
             <a:fillRect/>
           </a:stretch>
@@ -7259,7 +7178,7 @@
           <p:nvPr/>
         </p:nvPicPr>
         <p:blipFill>
-          <a:blip r:embed="rId18"/>
+          <a:blip r:embed="rId15"/>
           <a:stretch>
             <a:fillRect/>
           </a:stretch>
@@ -7340,7 +7259,7 @@
           <p:nvPr/>
         </p:nvPicPr>
         <p:blipFill>
-          <a:blip r:embed="rId19"/>
+          <a:blip r:embed="rId16"/>
           <a:stretch>
             <a:fillRect/>
           </a:stretch>
@@ -7370,7 +7289,7 @@
           <p:nvPr/>
         </p:nvPicPr>
         <p:blipFill>
-          <a:blip r:embed="rId20"/>
+          <a:blip r:embed="rId17"/>
           <a:stretch>
             <a:fillRect/>
           </a:stretch>
@@ -7400,7 +7319,7 @@
           <p:nvPr/>
         </p:nvPicPr>
         <p:blipFill>
-          <a:blip r:embed="rId21"/>
+          <a:blip r:embed="rId18"/>
           <a:stretch>
             <a:fillRect/>
           </a:stretch>
@@ -7430,7 +7349,7 @@
           <p:nvPr/>
         </p:nvPicPr>
         <p:blipFill>
-          <a:blip r:embed="rId22"/>
+          <a:blip r:embed="rId19"/>
           <a:stretch>
             <a:fillRect/>
           </a:stretch>
@@ -7460,44 +7379,14 @@
           <p:nvPr/>
         </p:nvPicPr>
         <p:blipFill>
-          <a:blip r:embed="rId23"/>
+          <a:blip r:embed="rId20"/>
           <a:stretch>
             <a:fillRect/>
           </a:stretch>
         </p:blipFill>
         <p:spPr>
           <a:xfrm>
-            <a:off x="13401090" y="20379958"/>
-            <a:ext cx="2765554" cy="853566"/>
-          </a:xfrm>
-          <a:prstGeom prst="rect">
-            <a:avLst/>
-          </a:prstGeom>
-        </p:spPr>
-      </p:pic>
-      <p:pic>
-        <p:nvPicPr>
-          <p:cNvPr id="58" name="Picture 57">
-            <a:extLst>
-              <a:ext uri="{FF2B5EF4-FFF2-40B4-BE49-F238E27FC236}">
-                <a16:creationId xmlns:a16="http://schemas.microsoft.com/office/drawing/2014/main" id="{5B0F9A5A-602F-0862-F00F-F1E573F0618F}"/>
-              </a:ext>
-            </a:extLst>
-          </p:cNvPr>
-          <p:cNvPicPr>
-            <a:picLocks noChangeAspect="1"/>
-          </p:cNvPicPr>
-          <p:nvPr/>
-        </p:nvPicPr>
-        <p:blipFill>
-          <a:blip r:embed="rId23"/>
-          <a:stretch>
-            <a:fillRect/>
-          </a:stretch>
-        </p:blipFill>
-        <p:spPr>
-          <a:xfrm>
-            <a:off x="27372381" y="25229343"/>
+            <a:off x="14573323" y="17091883"/>
             <a:ext cx="2765554" cy="853566"/>
           </a:xfrm>
           <a:prstGeom prst="rect">
@@ -7520,7 +7409,7 @@
           <p:nvPr/>
         </p:nvPicPr>
         <p:blipFill>
-          <a:blip r:embed="rId24"/>
+          <a:blip r:embed="rId21"/>
           <a:stretch>
             <a:fillRect/>
           </a:stretch>
@@ -7550,7 +7439,7 @@
           <p:nvPr/>
         </p:nvPicPr>
         <p:blipFill>
-          <a:blip r:embed="rId25"/>
+          <a:blip r:embed="rId22"/>
           <a:stretch>
             <a:fillRect/>
           </a:stretch>
@@ -7623,7 +7512,7 @@
           <p:nvPr/>
         </p:nvPicPr>
         <p:blipFill>
-          <a:blip r:embed="rId26"/>
+          <a:blip r:embed="rId23"/>
           <a:stretch>
             <a:fillRect/>
           </a:stretch>
@@ -7653,6 +7542,96 @@
           <p:nvPr/>
         </p:nvPicPr>
         <p:blipFill>
+          <a:blip r:embed="rId24"/>
+          <a:stretch>
+            <a:fillRect/>
+          </a:stretch>
+        </p:blipFill>
+        <p:spPr>
+          <a:xfrm>
+            <a:off x="19528806" y="23604555"/>
+            <a:ext cx="5266872" cy="690142"/>
+          </a:xfrm>
+          <a:prstGeom prst="rect">
+            <a:avLst/>
+          </a:prstGeom>
+        </p:spPr>
+      </p:pic>
+      <p:pic>
+        <p:nvPicPr>
+          <p:cNvPr id="29" name="Picture 28">
+            <a:extLst>
+              <a:ext uri="{FF2B5EF4-FFF2-40B4-BE49-F238E27FC236}">
+                <a16:creationId xmlns:a16="http://schemas.microsoft.com/office/drawing/2014/main" id="{7554192E-4DFC-B235-ECC3-5F4FAABCCFFE}"/>
+              </a:ext>
+            </a:extLst>
+          </p:cNvPr>
+          <p:cNvPicPr>
+            <a:picLocks noChangeAspect="1"/>
+          </p:cNvPicPr>
+          <p:nvPr/>
+        </p:nvPicPr>
+        <p:blipFill>
+          <a:blip r:embed="rId25"/>
+          <a:stretch>
+            <a:fillRect/>
+          </a:stretch>
+        </p:blipFill>
+        <p:spPr>
+          <a:xfrm>
+            <a:off x="5305156" y="20105603"/>
+            <a:ext cx="13367593" cy="1253211"/>
+          </a:xfrm>
+          <a:prstGeom prst="rect">
+            <a:avLst/>
+          </a:prstGeom>
+        </p:spPr>
+      </p:pic>
+      <p:pic>
+        <p:nvPicPr>
+          <p:cNvPr id="66" name="Picture 65" descr="A group of black text&#10;&#10;Description automatically generated">
+            <a:extLst>
+              <a:ext uri="{FF2B5EF4-FFF2-40B4-BE49-F238E27FC236}">
+                <a16:creationId xmlns:a16="http://schemas.microsoft.com/office/drawing/2014/main" id="{998B9B53-8D2F-6D5C-CBDD-1EA9BDF46830}"/>
+              </a:ext>
+            </a:extLst>
+          </p:cNvPr>
+          <p:cNvPicPr>
+            <a:picLocks noChangeAspect="1"/>
+          </p:cNvPicPr>
+          <p:nvPr/>
+        </p:nvPicPr>
+        <p:blipFill>
+          <a:blip r:embed="rId26"/>
+          <a:stretch>
+            <a:fillRect/>
+          </a:stretch>
+        </p:blipFill>
+        <p:spPr>
+          <a:xfrm>
+            <a:off x="22180001" y="25038744"/>
+            <a:ext cx="5312563" cy="1878998"/>
+          </a:xfrm>
+          <a:prstGeom prst="rect">
+            <a:avLst/>
+          </a:prstGeom>
+        </p:spPr>
+      </p:pic>
+      <p:pic>
+        <p:nvPicPr>
+          <p:cNvPr id="71" name="Picture 70">
+            <a:extLst>
+              <a:ext uri="{FF2B5EF4-FFF2-40B4-BE49-F238E27FC236}">
+                <a16:creationId xmlns:a16="http://schemas.microsoft.com/office/drawing/2014/main" id="{3D75F8CE-704D-BCB2-1CD1-940C7B4B5B69}"/>
+              </a:ext>
+            </a:extLst>
+          </p:cNvPr>
+          <p:cNvPicPr>
+            <a:picLocks noChangeAspect="1"/>
+          </p:cNvPicPr>
+          <p:nvPr/>
+        </p:nvPicPr>
+        <p:blipFill>
           <a:blip r:embed="rId27"/>
           <a:stretch>
             <a:fillRect/>
@@ -7660,8 +7639,8 @@
         </p:blipFill>
         <p:spPr>
           <a:xfrm>
-            <a:off x="19528806" y="23604555"/>
-            <a:ext cx="5266872" cy="690142"/>
+            <a:off x="21593602" y="27019712"/>
+            <a:ext cx="11701904" cy="1001047"/>
           </a:xfrm>
           <a:prstGeom prst="rect">
             <a:avLst/>

</xml_diff>

<commit_message>
added equation for predicted hospitalization probabilities
</commit_message>
<xml_diff>
--- a/Bayesian COVID Hospitalizations.pptx
+++ b/Bayesian COVID Hospitalizations.pptx
@@ -149,8 +149,8 @@
       <pc:docMk xmlns:pc="http://schemas.microsoft.com/office/powerpoint/2013/main/command"/>
       <pc:sldMk xmlns:pc="http://schemas.microsoft.com/office/powerpoint/2013/main/command" cId="0" sldId="256"/>
       <ac:spMk id="60" creationId="{613C2190-55DE-4ECE-ACBA-8B99338B994D}"/>
-      <ac:txMk cp="79" len="113">
-        <ac:context len="288" hash="1038424143"/>
+      <ac:txMk cp="60" len="113">
+        <ac:context len="190" hash="3832306614"/>
       </ac:txMk>
     </ac:txMkLst>
     <p188:pos x="6726763" y="1905518"/>
@@ -170,8 +170,8 @@
       <pc:docMk xmlns:pc="http://schemas.microsoft.com/office/powerpoint/2013/main/command"/>
       <pc:sldMk xmlns:pc="http://schemas.microsoft.com/office/powerpoint/2013/main/command" cId="0" sldId="256"/>
       <ac:spMk id="50" creationId="{00000000-0000-0000-0000-000000000000}"/>
-      <ac:txMk cp="90" len="322">
-        <ac:context len="517" hash="3313128920"/>
+      <ac:txMk cp="58" len="322">
+        <ac:context len="485" hash="4221436145"/>
       </ac:txMk>
     </ac:txMkLst>
     <p188:pos x="15025949" y="5293895"/>
@@ -191,7 +191,7 @@
       </a:p>
     </p188:txBody>
   </p188:cm>
-  <p188:cm id="{4AC287C7-097F-C34A-888F-3FA81F10F5FB}" authorId="{74906A6B-110F-D067-7BFC-521FF3E147DB}" status="resolved" created="2024-12-03T16:52:12.878" complete="100000">
+  <p188:cm id="{4AC287C7-097F-C34A-888F-3FA81F10F5FB}" authorId="{74906A6B-110F-D067-7BFC-521FF3E147DB}" created="2024-12-03T16:52:12.878">
     <ac:deMkLst xmlns:ac="http://schemas.microsoft.com/office/drawing/2013/main/command">
       <pc:docMk xmlns:pc="http://schemas.microsoft.com/office/powerpoint/2013/main/command"/>
       <pc:sldMk xmlns:pc="http://schemas.microsoft.com/office/powerpoint/2013/main/command" cId="0" sldId="256"/>
@@ -233,7 +233,7 @@
       </a:p>
     </p188:txBody>
   </p188:cm>
-  <p188:cm id="{3374288E-4A2B-6842-BCFF-01516A549761}" authorId="{74906A6B-110F-D067-7BFC-521FF3E147DB}" status="resolved" created="2024-12-03T17:10:29.511" complete="100000">
+  <p188:cm id="{3374288E-4A2B-6842-BCFF-01516A549761}" authorId="{74906A6B-110F-D067-7BFC-521FF3E147DB}" created="2024-12-03T17:10:29.511">
     <ac:deMkLst xmlns:ac="http://schemas.microsoft.com/office/drawing/2013/main/command">
       <pc:docMk xmlns:pc="http://schemas.microsoft.com/office/powerpoint/2013/main/command"/>
       <pc:sldMk xmlns:pc="http://schemas.microsoft.com/office/powerpoint/2013/main/command" cId="0" sldId="256"/>
@@ -250,7 +250,7 @@
       </a:p>
     </p188:txBody>
   </p188:cm>
-  <p188:cm id="{D76E18BE-3337-C446-BE97-ED0BBBD484DE}" authorId="{74906A6B-110F-D067-7BFC-521FF3E147DB}" status="resolved" created="2024-12-03T17:10:44.078" complete="100000">
+  <p188:cm id="{D76E18BE-3337-C446-BE97-ED0BBBD484DE}" authorId="{74906A6B-110F-D067-7BFC-521FF3E147DB}" created="2024-12-03T17:10:44.078">
     <ac:deMkLst xmlns:ac="http://schemas.microsoft.com/office/drawing/2013/main/command">
       <pc:docMk xmlns:pc="http://schemas.microsoft.com/office/powerpoint/2013/main/command"/>
       <pc:sldMk xmlns:pc="http://schemas.microsoft.com/office/powerpoint/2013/main/command" cId="0" sldId="256"/>
@@ -267,7 +267,7 @@
       </a:p>
     </p188:txBody>
   </p188:cm>
-  <p188:cm id="{BC131E90-891A-7843-A1F5-8D78F40473A0}" authorId="{74906A6B-110F-D067-7BFC-521FF3E147DB}" status="resolved" created="2024-12-03T17:12:07.513" complete="100000">
+  <p188:cm id="{BC131E90-891A-7843-A1F5-8D78F40473A0}" authorId="{74906A6B-110F-D067-7BFC-521FF3E147DB}" created="2024-12-03T17:12:07.513">
     <ac:deMkLst xmlns:ac="http://schemas.microsoft.com/office/drawing/2013/main/command">
       <pc:docMk xmlns:pc="http://schemas.microsoft.com/office/powerpoint/2013/main/command"/>
       <pc:sldMk xmlns:pc="http://schemas.microsoft.com/office/powerpoint/2013/main/command" cId="0" sldId="256"/>
@@ -284,7 +284,7 @@
       </a:p>
     </p188:txBody>
   </p188:cm>
-  <p188:cm id="{3B8925F3-09E5-B54D-BDE9-B3E822DF1C91}" authorId="{74906A6B-110F-D067-7BFC-521FF3E147DB}" status="resolved" created="2024-12-03T17:12:58.962" complete="100000">
+  <p188:cm id="{3B8925F3-09E5-B54D-BDE9-B3E822DF1C91}" authorId="{74906A6B-110F-D067-7BFC-521FF3E147DB}" created="2024-12-03T17:12:58.962">
     <ac:deMkLst xmlns:ac="http://schemas.microsoft.com/office/drawing/2013/main/command">
       <pc:docMk xmlns:pc="http://schemas.microsoft.com/office/powerpoint/2013/main/command"/>
       <pc:sldMk xmlns:pc="http://schemas.microsoft.com/office/powerpoint/2013/main/command" cId="0" sldId="256"/>
@@ -315,7 +315,7 @@
       </a:p>
     </p188:txBody>
   </p188:cm>
-  <p188:cm id="{46F6AFB6-5C0F-CD4A-854B-DB7DB899A10A}" authorId="{74906A6B-110F-D067-7BFC-521FF3E147DB}" status="resolved" created="2024-12-03T17:18:42.135" complete="100000">
+  <p188:cm id="{46F6AFB6-5C0F-CD4A-854B-DB7DB899A10A}" authorId="{74906A6B-110F-D067-7BFC-521FF3E147DB}" created="2024-12-03T17:18:42.135">
     <ac:txMkLst xmlns:ac="http://schemas.microsoft.com/office/drawing/2013/main/command">
       <pc:docMk xmlns:pc="http://schemas.microsoft.com/office/powerpoint/2013/main/command"/>
       <pc:sldMk xmlns:pc="http://schemas.microsoft.com/office/powerpoint/2013/main/command" cId="0" sldId="256"/>
@@ -376,7 +376,7 @@
       <pc:sldMk xmlns:pc="http://schemas.microsoft.com/office/powerpoint/2013/main/command" cId="0" sldId="256"/>
       <ac:spMk id="10" creationId="{025B411F-C30D-3458-EC06-AD109C00A7A3}"/>
       <ac:txMk cp="75" len="39">
-        <ac:context len="115" hash="3813382397"/>
+        <ac:context len="1583" hash="3103544310"/>
       </ac:txMk>
     </ac:txMkLst>
     <p188:pos x="6895310" y="896434"/>
@@ -525,7 +525,7 @@
             <a:fld id="{311E81F8-90E2-2945-9ED7-A6A90A37CF21}" type="datetimeFigureOut">
               <a:rPr lang="en-US" smtClean="0"/>
               <a:pPr/>
-              <a:t>12/5/24</a:t>
+              <a:t>12/3/2024</a:t>
             </a:fld>
             <a:endParaRPr lang="en-US"/>
           </a:p>
@@ -1094,7 +1094,7 @@
             <a:fld id="{84FD1F27-616A-3542-91BB-C34E14AE38CD}" type="datetimeFigureOut">
               <a:rPr lang="en-US" smtClean="0"/>
               <a:pPr/>
-              <a:t>12/5/24</a:t>
+              <a:t>12/3/2024</a:t>
             </a:fld>
             <a:endParaRPr lang="en-US"/>
           </a:p>
@@ -1266,7 +1266,7 @@
             <a:fld id="{84FD1F27-616A-3542-91BB-C34E14AE38CD}" type="datetimeFigureOut">
               <a:rPr lang="en-US" smtClean="0"/>
               <a:pPr/>
-              <a:t>12/5/24</a:t>
+              <a:t>12/3/2024</a:t>
             </a:fld>
             <a:endParaRPr lang="en-US"/>
           </a:p>
@@ -2132,7 +2132,7 @@
             <a:fld id="{84FD1F27-616A-3542-91BB-C34E14AE38CD}" type="datetimeFigureOut">
               <a:rPr lang="en-US" smtClean="0"/>
               <a:pPr/>
-              <a:t>12/5/24</a:t>
+              <a:t>12/3/2024</a:t>
             </a:fld>
             <a:endParaRPr lang="en-US"/>
           </a:p>
@@ -2556,7 +2556,7 @@
             <a:fld id="{84FD1F27-616A-3542-91BB-C34E14AE38CD}" type="datetimeFigureOut">
               <a:rPr lang="en-US" smtClean="0"/>
               <a:pPr/>
-              <a:t>12/5/24</a:t>
+              <a:t>12/3/2024</a:t>
             </a:fld>
             <a:endParaRPr lang="en-US"/>
           </a:p>
@@ -2676,7 +2676,7 @@
             <a:fld id="{84FD1F27-616A-3542-91BB-C34E14AE38CD}" type="datetimeFigureOut">
               <a:rPr lang="en-US" smtClean="0"/>
               <a:pPr/>
-              <a:t>12/5/24</a:t>
+              <a:t>12/3/2024</a:t>
             </a:fld>
             <a:endParaRPr lang="en-US"/>
           </a:p>
@@ -2773,7 +2773,7 @@
             <a:fld id="{84FD1F27-616A-3542-91BB-C34E14AE38CD}" type="datetimeFigureOut">
               <a:rPr lang="en-US" smtClean="0"/>
               <a:pPr/>
-              <a:t>12/5/24</a:t>
+              <a:t>12/3/2024</a:t>
             </a:fld>
             <a:endParaRPr lang="en-US"/>
           </a:p>
@@ -3052,7 +3052,7 @@
             <a:fld id="{84FD1F27-616A-3542-91BB-C34E14AE38CD}" type="datetimeFigureOut">
               <a:rPr lang="en-US" smtClean="0"/>
               <a:pPr/>
-              <a:t>12/5/24</a:t>
+              <a:t>12/3/2024</a:t>
             </a:fld>
             <a:endParaRPr lang="en-US"/>
           </a:p>
@@ -3311,7 +3311,7 @@
             <a:fld id="{84FD1F27-616A-3542-91BB-C34E14AE38CD}" type="datetimeFigureOut">
               <a:rPr lang="en-US" smtClean="0"/>
               <a:pPr/>
-              <a:t>12/5/24</a:t>
+              <a:t>12/3/2024</a:t>
             </a:fld>
             <a:endParaRPr lang="en-US"/>
           </a:p>
@@ -3522,7 +3522,7 @@
             <a:fld id="{84FD1F27-616A-3542-91BB-C34E14AE38CD}" type="datetimeFigureOut">
               <a:rPr lang="en-US" smtClean="0"/>
               <a:pPr/>
-              <a:t>12/5/24</a:t>
+              <a:t>12/3/2024</a:t>
             </a:fld>
             <a:endParaRPr lang="en-US"/>
           </a:p>
@@ -4052,7 +4052,7 @@
             <a:fld id="{84FD1F27-616A-3542-91BB-C34E14AE38CD}" type="datetimeFigureOut">
               <a:rPr lang="en-US" smtClean="0"/>
               <a:pPr/>
-              <a:t>12/5/24</a:t>
+              <a:t>12/3/2024</a:t>
             </a:fld>
             <a:endParaRPr lang="en-US"/>
           </a:p>
@@ -4483,8 +4483,8 @@
         </p:nvSpPr>
         <p:spPr>
           <a:xfrm>
-            <a:off x="18463924" y="24930163"/>
-            <a:ext cx="14720346" cy="2908489"/>
+            <a:off x="18473346" y="25212865"/>
+            <a:ext cx="14720346" cy="2439129"/>
           </a:xfrm>
           <a:prstGeom prst="rect">
             <a:avLst/>
@@ -4507,15 +4507,6 @@
               </a:rPr>
               <a:t>Final predictors: </a:t>
             </a:r>
-          </a:p>
-          <a:p>
-            <a:pPr marL="932994" indent="-457200">
-              <a:buFont typeface="Arial" panose="020B0604020202020204" pitchFamily="34" charset="0"/>
-              <a:buChar char="•"/>
-            </a:pPr>
-            <a:endParaRPr lang="en-US" sz="3050" b="0" dirty="0">
-              <a:latin typeface="+mn-lt"/>
-            </a:endParaRPr>
           </a:p>
           <a:p>
             <a:pPr marL="932994" indent="-457200">
@@ -5235,8 +5226,8 @@
         </p:nvSpPr>
         <p:spPr>
           <a:xfrm>
-            <a:off x="2236815" y="17215855"/>
-            <a:ext cx="14838218" cy="10240664"/>
+            <a:off x="2236815" y="20780360"/>
+            <a:ext cx="14838218" cy="9077565"/>
           </a:xfrm>
         </p:spPr>
         <p:txBody>
@@ -5253,7 +5244,7 @@
               <a:rPr lang="en-US" sz="3000" dirty="0">
                 <a:latin typeface="+mn-lt"/>
               </a:rPr>
-              <a:t>Outcome variable:		                        where:</a:t>
+              <a:t>Outcome variable:</a:t>
             </a:r>
           </a:p>
           <a:p>
@@ -5326,11 +5317,7 @@
             </a:endParaRPr>
           </a:p>
           <a:p>
-            <a:pPr marL="475794">
-              <a:lnSpc>
-                <a:spcPct val="150000"/>
-              </a:lnSpc>
-            </a:pPr>
+            <a:pPr marL="475794"/>
             <a:r>
               <a:rPr lang="en-US" sz="3000" dirty="0">
                 <a:latin typeface="+mn-lt"/>
@@ -5340,9 +5327,6 @@
           </a:p>
           <a:p>
             <a:pPr marL="932994" indent="-457200">
-              <a:lnSpc>
-                <a:spcPct val="150000"/>
-              </a:lnSpc>
               <a:buFont typeface="Arial" panose="020B0604020202020204" pitchFamily="34" charset="0"/>
               <a:buChar char="•"/>
             </a:pPr>
@@ -5353,9 +5337,6 @@
           </a:p>
           <a:p>
             <a:pPr marL="932994" indent="-457200">
-              <a:lnSpc>
-                <a:spcPct val="150000"/>
-              </a:lnSpc>
               <a:buFont typeface="Arial" panose="020B0604020202020204" pitchFamily="34" charset="0"/>
               <a:buChar char="•"/>
             </a:pPr>
@@ -5366,9 +5347,6 @@
           </a:p>
           <a:p>
             <a:pPr marL="932994" indent="-457200">
-              <a:lnSpc>
-                <a:spcPct val="150000"/>
-              </a:lnSpc>
               <a:buFont typeface="Arial" panose="020B0604020202020204" pitchFamily="34" charset="0"/>
               <a:buChar char="•"/>
             </a:pPr>
@@ -5378,11 +5356,7 @@
             </a:r>
           </a:p>
           <a:p>
-            <a:pPr marL="475794">
-              <a:lnSpc>
-                <a:spcPct val="150000"/>
-              </a:lnSpc>
-            </a:pPr>
+            <a:pPr marL="475794"/>
             <a:r>
               <a:rPr lang="en-US" sz="3000" dirty="0">
                 <a:latin typeface="+mn-lt"/>
@@ -5392,9 +5366,6 @@
           </a:p>
           <a:p>
             <a:pPr marL="932994" indent="-457200">
-              <a:lnSpc>
-                <a:spcPct val="150000"/>
-              </a:lnSpc>
               <a:buFont typeface="Arial" panose="020B0604020202020204" pitchFamily="34" charset="0"/>
               <a:buChar char="•"/>
             </a:pPr>
@@ -5826,7 +5797,7 @@
                 <a:effectLst/>
                 <a:latin typeface="+mj-lt"/>
               </a:rPr>
-              <a:t>When we combined the imputation models, they performed poorly, indicating that our model could be overly sensitive to the specific data patterns introduced during imputation. Consequently, the imputed models fail to generalize well to the underlying data structure.</a:t>
+              <a:t>When we combined the models trained on multiple imputed datasets, they performed poorly, indicating that our model could be overly sensitive to the specific data patterns introduced during imputation. Consequently, the imputed models fail to generalize well to the underlying data structure.</a:t>
             </a:r>
             <a:endParaRPr lang="en-US" sz="3000" dirty="0">
               <a:latin typeface="+mj-lt"/>
@@ -5978,7 +5949,7 @@
         </p:nvSpPr>
         <p:spPr>
           <a:xfrm>
-            <a:off x="3191469" y="16146899"/>
+            <a:off x="3207327" y="19699762"/>
             <a:ext cx="12928910" cy="528816"/>
           </a:xfrm>
           <a:prstGeom prst="rect">
@@ -6210,6 +6181,430 @@
                 <a:latin typeface="+mn-lt"/>
               </a:rPr>
               <a:t>Data structure (individual case level):</a:t>
+            </a:r>
+          </a:p>
+          <a:p>
+            <a:pPr marL="475794"/>
+            <a:r>
+              <a:rPr lang="en-US" sz="1400" b="0" dirty="0">
+                <a:latin typeface="Courier New" panose="02070309020205020404" pitchFamily="49" charset="0"/>
+                <a:cs typeface="Courier New" panose="02070309020205020404" pitchFamily="49" charset="0"/>
+              </a:rPr>
+              <a:t>'</a:t>
+            </a:r>
+            <a:r>
+              <a:rPr lang="en-US" sz="1400" b="0" dirty="0" err="1">
+                <a:latin typeface="Courier New" panose="02070309020205020404" pitchFamily="49" charset="0"/>
+                <a:cs typeface="Courier New" panose="02070309020205020404" pitchFamily="49" charset="0"/>
+              </a:rPr>
+              <a:t>data.frame</a:t>
+            </a:r>
+            <a:r>
+              <a:rPr lang="en-US" sz="1400" b="0" dirty="0">
+                <a:latin typeface="Courier New" panose="02070309020205020404" pitchFamily="49" charset="0"/>
+                <a:cs typeface="Courier New" panose="02070309020205020404" pitchFamily="49" charset="0"/>
+              </a:rPr>
+              <a:t>':	100000 obs. of  19 variables:</a:t>
+            </a:r>
+          </a:p>
+          <a:p>
+            <a:pPr marL="475794"/>
+            <a:r>
+              <a:rPr lang="en-US" sz="1400" b="0" dirty="0">
+                <a:latin typeface="Courier New" panose="02070309020205020404" pitchFamily="49" charset="0"/>
+                <a:cs typeface="Courier New" panose="02070309020205020404" pitchFamily="49" charset="0"/>
+              </a:rPr>
+              <a:t> $ </a:t>
+            </a:r>
+            <a:r>
+              <a:rPr lang="en-US" sz="1400" b="0" dirty="0" err="1">
+                <a:latin typeface="Courier New" panose="02070309020205020404" pitchFamily="49" charset="0"/>
+                <a:cs typeface="Courier New" panose="02070309020205020404" pitchFamily="49" charset="0"/>
+              </a:rPr>
+              <a:t>case_month</a:t>
+            </a:r>
+            <a:r>
+              <a:rPr lang="en-US" sz="1400" b="0" dirty="0">
+                <a:latin typeface="Courier New" panose="02070309020205020404" pitchFamily="49" charset="0"/>
+                <a:cs typeface="Courier New" panose="02070309020205020404" pitchFamily="49" charset="0"/>
+              </a:rPr>
+              <a:t>              : chr  "2021-10" "2022-02" "2020-09" "2021-10" ...</a:t>
+            </a:r>
+          </a:p>
+          <a:p>
+            <a:pPr marL="475794"/>
+            <a:r>
+              <a:rPr lang="en-US" sz="1400" b="0" dirty="0">
+                <a:latin typeface="Courier New" panose="02070309020205020404" pitchFamily="49" charset="0"/>
+                <a:cs typeface="Courier New" panose="02070309020205020404" pitchFamily="49" charset="0"/>
+              </a:rPr>
+              <a:t> $ </a:t>
+            </a:r>
+            <a:r>
+              <a:rPr lang="en-US" sz="1400" b="0" dirty="0" err="1">
+                <a:latin typeface="Courier New" panose="02070309020205020404" pitchFamily="49" charset="0"/>
+                <a:cs typeface="Courier New" panose="02070309020205020404" pitchFamily="49" charset="0"/>
+              </a:rPr>
+              <a:t>res_state</a:t>
+            </a:r>
+            <a:r>
+              <a:rPr lang="en-US" sz="1400" b="0" dirty="0">
+                <a:latin typeface="Courier New" panose="02070309020205020404" pitchFamily="49" charset="0"/>
+                <a:cs typeface="Courier New" panose="02070309020205020404" pitchFamily="49" charset="0"/>
+              </a:rPr>
+              <a:t>               : chr  "NC" "GA" "MO" "MI" ...</a:t>
+            </a:r>
+          </a:p>
+          <a:p>
+            <a:pPr marL="475794"/>
+            <a:r>
+              <a:rPr lang="en-US" sz="1400" b="0" dirty="0">
+                <a:latin typeface="Courier New" panose="02070309020205020404" pitchFamily="49" charset="0"/>
+                <a:cs typeface="Courier New" panose="02070309020205020404" pitchFamily="49" charset="0"/>
+              </a:rPr>
+              <a:t> $ </a:t>
+            </a:r>
+            <a:r>
+              <a:rPr lang="en-US" sz="1400" b="0" dirty="0" err="1">
+                <a:latin typeface="Courier New" panose="02070309020205020404" pitchFamily="49" charset="0"/>
+                <a:cs typeface="Courier New" panose="02070309020205020404" pitchFamily="49" charset="0"/>
+              </a:rPr>
+              <a:t>state_fips_code</a:t>
+            </a:r>
+            <a:r>
+              <a:rPr lang="en-US" sz="1400" b="0" dirty="0">
+                <a:latin typeface="Courier New" panose="02070309020205020404" pitchFamily="49" charset="0"/>
+                <a:cs typeface="Courier New" panose="02070309020205020404" pitchFamily="49" charset="0"/>
+              </a:rPr>
+              <a:t>         : chr  "37" "13" "29" "26" ...</a:t>
+            </a:r>
+          </a:p>
+          <a:p>
+            <a:pPr marL="475794"/>
+            <a:r>
+              <a:rPr lang="en-US" sz="1400" b="0" dirty="0">
+                <a:latin typeface="Courier New" panose="02070309020205020404" pitchFamily="49" charset="0"/>
+                <a:cs typeface="Courier New" panose="02070309020205020404" pitchFamily="49" charset="0"/>
+              </a:rPr>
+              <a:t> $ </a:t>
+            </a:r>
+            <a:r>
+              <a:rPr lang="en-US" sz="1400" b="0" dirty="0" err="1">
+                <a:latin typeface="Courier New" panose="02070309020205020404" pitchFamily="49" charset="0"/>
+                <a:cs typeface="Courier New" panose="02070309020205020404" pitchFamily="49" charset="0"/>
+              </a:rPr>
+              <a:t>res_county</a:t>
+            </a:r>
+            <a:r>
+              <a:rPr lang="en-US" sz="1400" b="0" dirty="0">
+                <a:latin typeface="Courier New" panose="02070309020205020404" pitchFamily="49" charset="0"/>
+                <a:cs typeface="Courier New" panose="02070309020205020404" pitchFamily="49" charset="0"/>
+              </a:rPr>
+              <a:t>              : chr  "DAVIE" "BULLOCH" "POLK" "SANILAC" ...</a:t>
+            </a:r>
+          </a:p>
+          <a:p>
+            <a:pPr marL="475794"/>
+            <a:r>
+              <a:rPr lang="en-US" sz="1400" b="0" dirty="0">
+                <a:latin typeface="Courier New" panose="02070309020205020404" pitchFamily="49" charset="0"/>
+                <a:cs typeface="Courier New" panose="02070309020205020404" pitchFamily="49" charset="0"/>
+              </a:rPr>
+              <a:t> $ </a:t>
+            </a:r>
+            <a:r>
+              <a:rPr lang="en-US" sz="1400" b="0" dirty="0" err="1">
+                <a:latin typeface="Courier New" panose="02070309020205020404" pitchFamily="49" charset="0"/>
+                <a:cs typeface="Courier New" panose="02070309020205020404" pitchFamily="49" charset="0"/>
+              </a:rPr>
+              <a:t>county_fips_code</a:t>
+            </a:r>
+            <a:r>
+              <a:rPr lang="en-US" sz="1400" b="0" dirty="0">
+                <a:latin typeface="Courier New" panose="02070309020205020404" pitchFamily="49" charset="0"/>
+                <a:cs typeface="Courier New" panose="02070309020205020404" pitchFamily="49" charset="0"/>
+              </a:rPr>
+              <a:t>        : chr  "37059" "13031" "29167" "26151" ...</a:t>
+            </a:r>
+          </a:p>
+          <a:p>
+            <a:pPr marL="475794"/>
+            <a:r>
+              <a:rPr lang="en-US" sz="1400" b="0" dirty="0">
+                <a:latin typeface="Courier New" panose="02070309020205020404" pitchFamily="49" charset="0"/>
+                <a:cs typeface="Courier New" panose="02070309020205020404" pitchFamily="49" charset="0"/>
+              </a:rPr>
+              <a:t> $ </a:t>
+            </a:r>
+            <a:r>
+              <a:rPr lang="en-US" sz="1400" b="0" dirty="0" err="1">
+                <a:latin typeface="Courier New" panose="02070309020205020404" pitchFamily="49" charset="0"/>
+                <a:cs typeface="Courier New" panose="02070309020205020404" pitchFamily="49" charset="0"/>
+              </a:rPr>
+              <a:t>age_group</a:t>
+            </a:r>
+            <a:r>
+              <a:rPr lang="en-US" sz="1400" b="0" dirty="0">
+                <a:latin typeface="Courier New" panose="02070309020205020404" pitchFamily="49" charset="0"/>
+                <a:cs typeface="Courier New" panose="02070309020205020404" pitchFamily="49" charset="0"/>
+              </a:rPr>
+              <a:t>               : chr  "0 - 17 years" "18 to 49 years" "18 to 49 years" "18 to 49 years" ...</a:t>
+            </a:r>
+          </a:p>
+          <a:p>
+            <a:pPr marL="475794"/>
+            <a:r>
+              <a:rPr lang="en-US" sz="1400" b="0" dirty="0">
+                <a:latin typeface="Courier New" panose="02070309020205020404" pitchFamily="49" charset="0"/>
+                <a:cs typeface="Courier New" panose="02070309020205020404" pitchFamily="49" charset="0"/>
+              </a:rPr>
+              <a:t> $ sex                     : chr  "Female" "Female" "Female" "Female" Missing" ...</a:t>
+            </a:r>
+          </a:p>
+          <a:p>
+            <a:pPr marL="475794"/>
+            <a:r>
+              <a:rPr lang="en-US" sz="1400" b="0" dirty="0">
+                <a:latin typeface="Courier New" panose="02070309020205020404" pitchFamily="49" charset="0"/>
+                <a:cs typeface="Courier New" panose="02070309020205020404" pitchFamily="49" charset="0"/>
+              </a:rPr>
+              <a:t> $ </a:t>
+            </a:r>
+            <a:r>
+              <a:rPr lang="en-US" sz="1400" b="0" dirty="0" err="1">
+                <a:latin typeface="Courier New" panose="02070309020205020404" pitchFamily="49" charset="0"/>
+                <a:cs typeface="Courier New" panose="02070309020205020404" pitchFamily="49" charset="0"/>
+              </a:rPr>
+              <a:t>hosp_yn</a:t>
+            </a:r>
+            <a:r>
+              <a:rPr lang="en-US" sz="1400" b="0" dirty="0">
+                <a:latin typeface="Courier New" panose="02070309020205020404" pitchFamily="49" charset="0"/>
+                <a:cs typeface="Courier New" panose="02070309020205020404" pitchFamily="49" charset="0"/>
+              </a:rPr>
+              <a:t>                 : chr  "Unknown" "Missing" "Unknown" "Missing"...</a:t>
+            </a:r>
+          </a:p>
+          <a:p>
+            <a:pPr marL="475794"/>
+            <a:r>
+              <a:rPr lang="en-US" sz="1400" b="0" dirty="0">
+                <a:latin typeface="Courier New" panose="02070309020205020404" pitchFamily="49" charset="0"/>
+                <a:cs typeface="Courier New" panose="02070309020205020404" pitchFamily="49" charset="0"/>
+              </a:rPr>
+              <a:t> $ race                    : chr  "NA" "Unknown" "NA" "NA" ...</a:t>
+            </a:r>
+          </a:p>
+          <a:p>
+            <a:pPr marL="475794"/>
+            <a:r>
+              <a:rPr lang="en-US" sz="1400" b="0" dirty="0">
+                <a:latin typeface="Courier New" panose="02070309020205020404" pitchFamily="49" charset="0"/>
+                <a:cs typeface="Courier New" panose="02070309020205020404" pitchFamily="49" charset="0"/>
+              </a:rPr>
+              <a:t> $ ethnicity               : chr  "NA" "Missing" "NA" "NA" ...</a:t>
+            </a:r>
+          </a:p>
+          <a:p>
+            <a:pPr marL="475794"/>
+            <a:r>
+              <a:rPr lang="en-US" sz="1400" b="0" dirty="0">
+                <a:latin typeface="Courier New" panose="02070309020205020404" pitchFamily="49" charset="0"/>
+                <a:cs typeface="Courier New" panose="02070309020205020404" pitchFamily="49" charset="0"/>
+              </a:rPr>
+              <a:t> $ </a:t>
+            </a:r>
+            <a:r>
+              <a:rPr lang="en-US" sz="1400" b="0" dirty="0" err="1">
+                <a:latin typeface="Courier New" panose="02070309020205020404" pitchFamily="49" charset="0"/>
+                <a:cs typeface="Courier New" panose="02070309020205020404" pitchFamily="49" charset="0"/>
+              </a:rPr>
+              <a:t>case_positive_specimen</a:t>
+            </a:r>
+            <a:r>
+              <a:rPr lang="en-US" sz="1400" b="0" dirty="0">
+                <a:latin typeface="Courier New" panose="02070309020205020404" pitchFamily="49" charset="0"/>
+                <a:cs typeface="Courier New" panose="02070309020205020404" pitchFamily="49" charset="0"/>
+              </a:rPr>
+              <a:t>  : chr  "0.0" NA "0.0" NA ...</a:t>
+            </a:r>
+          </a:p>
+          <a:p>
+            <a:pPr marL="475794"/>
+            <a:r>
+              <a:rPr lang="en-US" sz="1400" b="0" dirty="0">
+                <a:latin typeface="Courier New" panose="02070309020205020404" pitchFamily="49" charset="0"/>
+                <a:cs typeface="Courier New" panose="02070309020205020404" pitchFamily="49" charset="0"/>
+              </a:rPr>
+              <a:t> $ process                 : chr  "Missing" "Missing" "Missing" "Missing" ...</a:t>
+            </a:r>
+          </a:p>
+          <a:p>
+            <a:pPr marL="475794"/>
+            <a:r>
+              <a:rPr lang="en-US" sz="1400" b="0" dirty="0">
+                <a:latin typeface="Courier New" panose="02070309020205020404" pitchFamily="49" charset="0"/>
+                <a:cs typeface="Courier New" panose="02070309020205020404" pitchFamily="49" charset="0"/>
+              </a:rPr>
+              <a:t> $ </a:t>
+            </a:r>
+            <a:r>
+              <a:rPr lang="en-US" sz="1400" b="0" dirty="0" err="1">
+                <a:latin typeface="Courier New" panose="02070309020205020404" pitchFamily="49" charset="0"/>
+                <a:cs typeface="Courier New" panose="02070309020205020404" pitchFamily="49" charset="0"/>
+              </a:rPr>
+              <a:t>exposure_yn</a:t>
+            </a:r>
+            <a:r>
+              <a:rPr lang="en-US" sz="1400" b="0" dirty="0">
+                <a:latin typeface="Courier New" panose="02070309020205020404" pitchFamily="49" charset="0"/>
+                <a:cs typeface="Courier New" panose="02070309020205020404" pitchFamily="49" charset="0"/>
+              </a:rPr>
+              <a:t>             : chr  "Missing" "Missing" "Missing" "Missing" ...</a:t>
+            </a:r>
+          </a:p>
+          <a:p>
+            <a:pPr marL="475794"/>
+            <a:r>
+              <a:rPr lang="en-US" sz="1400" b="0" dirty="0">
+                <a:latin typeface="Courier New" panose="02070309020205020404" pitchFamily="49" charset="0"/>
+                <a:cs typeface="Courier New" panose="02070309020205020404" pitchFamily="49" charset="0"/>
+              </a:rPr>
+              <a:t> $ </a:t>
+            </a:r>
+            <a:r>
+              <a:rPr lang="en-US" sz="1400" b="0" dirty="0" err="1">
+                <a:latin typeface="Courier New" panose="02070309020205020404" pitchFamily="49" charset="0"/>
+                <a:cs typeface="Courier New" panose="02070309020205020404" pitchFamily="49" charset="0"/>
+              </a:rPr>
+              <a:t>current_status</a:t>
+            </a:r>
+            <a:r>
+              <a:rPr lang="en-US" sz="1400" b="0" dirty="0">
+                <a:latin typeface="Courier New" panose="02070309020205020404" pitchFamily="49" charset="0"/>
+                <a:cs typeface="Courier New" panose="02070309020205020404" pitchFamily="49" charset="0"/>
+              </a:rPr>
+              <a:t>          : chr  "Laboratory-confirmed case" "Laboratory-confirmed case" "Laboratory-confirmed case" "Laboratory-confirmed case" ...</a:t>
+            </a:r>
+          </a:p>
+          <a:p>
+            <a:pPr marL="475794"/>
+            <a:r>
+              <a:rPr lang="en-US" sz="1400" b="0" dirty="0">
+                <a:latin typeface="Courier New" panose="02070309020205020404" pitchFamily="49" charset="0"/>
+                <a:cs typeface="Courier New" panose="02070309020205020404" pitchFamily="49" charset="0"/>
+              </a:rPr>
+              <a:t> $ </a:t>
+            </a:r>
+            <a:r>
+              <a:rPr lang="en-US" sz="1400" b="0" dirty="0" err="1">
+                <a:latin typeface="Courier New" panose="02070309020205020404" pitchFamily="49" charset="0"/>
+                <a:cs typeface="Courier New" panose="02070309020205020404" pitchFamily="49" charset="0"/>
+              </a:rPr>
+              <a:t>symptom_status</a:t>
+            </a:r>
+            <a:r>
+              <a:rPr lang="en-US" sz="1400" b="0" dirty="0">
+                <a:latin typeface="Courier New" panose="02070309020205020404" pitchFamily="49" charset="0"/>
+                <a:cs typeface="Courier New" panose="02070309020205020404" pitchFamily="49" charset="0"/>
+              </a:rPr>
+              <a:t>          : chr  "Unknown" "Symptomatic" "Symptomatic" " ...</a:t>
+            </a:r>
+          </a:p>
+          <a:p>
+            <a:pPr marL="475794"/>
+            <a:r>
+              <a:rPr lang="en-US" sz="1400" b="0" dirty="0">
+                <a:latin typeface="Courier New" panose="02070309020205020404" pitchFamily="49" charset="0"/>
+                <a:cs typeface="Courier New" panose="02070309020205020404" pitchFamily="49" charset="0"/>
+              </a:rPr>
+              <a:t> $ </a:t>
+            </a:r>
+            <a:r>
+              <a:rPr lang="en-US" sz="1400" b="0" dirty="0" err="1">
+                <a:latin typeface="Courier New" panose="02070309020205020404" pitchFamily="49" charset="0"/>
+                <a:cs typeface="Courier New" panose="02070309020205020404" pitchFamily="49" charset="0"/>
+              </a:rPr>
+              <a:t>icu_yn</a:t>
+            </a:r>
+            <a:r>
+              <a:rPr lang="en-US" sz="1400" b="0" dirty="0">
+                <a:latin typeface="Courier New" panose="02070309020205020404" pitchFamily="49" charset="0"/>
+                <a:cs typeface="Courier New" panose="02070309020205020404" pitchFamily="49" charset="0"/>
+              </a:rPr>
+              <a:t>                  : chr  "Unknown" "Missing" "Missing" "Missing" ...</a:t>
+            </a:r>
+          </a:p>
+          <a:p>
+            <a:pPr marL="475794"/>
+            <a:r>
+              <a:rPr lang="en-US" sz="1400" b="0" dirty="0">
+                <a:latin typeface="Courier New" panose="02070309020205020404" pitchFamily="49" charset="0"/>
+                <a:cs typeface="Courier New" panose="02070309020205020404" pitchFamily="49" charset="0"/>
+              </a:rPr>
+              <a:t> $ </a:t>
+            </a:r>
+            <a:r>
+              <a:rPr lang="en-US" sz="1400" b="0" dirty="0" err="1">
+                <a:latin typeface="Courier New" panose="02070309020205020404" pitchFamily="49" charset="0"/>
+                <a:cs typeface="Courier New" panose="02070309020205020404" pitchFamily="49" charset="0"/>
+              </a:rPr>
+              <a:t>death_yn</a:t>
+            </a:r>
+            <a:r>
+              <a:rPr lang="en-US" sz="1400" b="0" dirty="0">
+                <a:latin typeface="Courier New" panose="02070309020205020404" pitchFamily="49" charset="0"/>
+                <a:cs typeface="Courier New" panose="02070309020205020404" pitchFamily="49" charset="0"/>
+              </a:rPr>
+              <a:t>                : chr  "No" "Missing" "Unknown" "Unknown" ...</a:t>
+            </a:r>
+          </a:p>
+          <a:p>
+            <a:pPr marL="475794"/>
+            <a:r>
+              <a:rPr lang="en-US" sz="1400" b="0" dirty="0">
+                <a:latin typeface="Courier New" panose="02070309020205020404" pitchFamily="49" charset="0"/>
+                <a:cs typeface="Courier New" panose="02070309020205020404" pitchFamily="49" charset="0"/>
+              </a:rPr>
+              <a:t> $ </a:t>
+            </a:r>
+            <a:r>
+              <a:rPr lang="en-US" sz="1400" b="0" dirty="0" err="1">
+                <a:latin typeface="Courier New" panose="02070309020205020404" pitchFamily="49" charset="0"/>
+                <a:cs typeface="Courier New" panose="02070309020205020404" pitchFamily="49" charset="0"/>
+              </a:rPr>
+              <a:t>case_onset_interval</a:t>
+            </a:r>
+            <a:r>
+              <a:rPr lang="en-US" sz="1400" b="0" dirty="0">
+                <a:latin typeface="Courier New" panose="02070309020205020404" pitchFamily="49" charset="0"/>
+                <a:cs typeface="Courier New" panose="02070309020205020404" pitchFamily="49" charset="0"/>
+              </a:rPr>
+              <a:t>     : chr  NA "0.0" "0.0" NA ...</a:t>
+            </a:r>
+          </a:p>
+          <a:p>
+            <a:pPr marL="475794"/>
+            <a:r>
+              <a:rPr lang="en-US" sz="1400" b="0" dirty="0">
+                <a:latin typeface="Courier New" panose="02070309020205020404" pitchFamily="49" charset="0"/>
+                <a:cs typeface="Courier New" panose="02070309020205020404" pitchFamily="49" charset="0"/>
+              </a:rPr>
+              <a:t> $ </a:t>
+            </a:r>
+            <a:r>
+              <a:rPr lang="en-US" sz="1400" b="0" dirty="0" err="1">
+                <a:latin typeface="Courier New" panose="02070309020205020404" pitchFamily="49" charset="0"/>
+                <a:cs typeface="Courier New" panose="02070309020205020404" pitchFamily="49" charset="0"/>
+              </a:rPr>
+              <a:t>underlying_conditions_yn</a:t>
+            </a:r>
+            <a:r>
+              <a:rPr lang="en-US" sz="1400" b="0" dirty="0">
+                <a:latin typeface="Courier New" panose="02070309020205020404" pitchFamily="49" charset="0"/>
+                <a:cs typeface="Courier New" panose="02070309020205020404" pitchFamily="49" charset="0"/>
+              </a:rPr>
+              <a:t>: chr  NA NA NA NA ...</a:t>
             </a:r>
           </a:p>
         </p:txBody>
@@ -6950,7 +7345,7 @@
         </p:blipFill>
         <p:spPr>
           <a:xfrm>
-            <a:off x="6133938" y="16735816"/>
+            <a:off x="6236431" y="20248514"/>
             <a:ext cx="7307816" cy="1429790"/>
           </a:xfrm>
           <a:prstGeom prst="rect">
@@ -6980,8 +7375,98 @@
         </p:blipFill>
         <p:spPr>
           <a:xfrm>
-            <a:off x="6211652" y="18183394"/>
+            <a:off x="6236431" y="21762545"/>
             <a:ext cx="4871975" cy="1963897"/>
+          </a:xfrm>
+          <a:prstGeom prst="rect">
+            <a:avLst/>
+          </a:prstGeom>
+        </p:spPr>
+      </p:pic>
+      <p:pic>
+        <p:nvPicPr>
+          <p:cNvPr id="40" name="Picture 39">
+            <a:extLst>
+              <a:ext uri="{FF2B5EF4-FFF2-40B4-BE49-F238E27FC236}">
+                <a16:creationId xmlns:a16="http://schemas.microsoft.com/office/drawing/2014/main" id="{561C5FE4-9249-2A41-BA37-044223A59553}"/>
+              </a:ext>
+            </a:extLst>
+          </p:cNvPr>
+          <p:cNvPicPr>
+            <a:picLocks noChangeAspect="1"/>
+          </p:cNvPicPr>
+          <p:nvPr/>
+        </p:nvPicPr>
+        <p:blipFill>
+          <a:blip r:embed="rId12"/>
+          <a:stretch>
+            <a:fillRect/>
+          </a:stretch>
+        </p:blipFill>
+        <p:spPr>
+          <a:xfrm>
+            <a:off x="5729836" y="23687905"/>
+            <a:ext cx="12240150" cy="1224015"/>
+          </a:xfrm>
+          <a:prstGeom prst="rect">
+            <a:avLst/>
+          </a:prstGeom>
+        </p:spPr>
+      </p:pic>
+      <p:pic>
+        <p:nvPicPr>
+          <p:cNvPr id="46" name="Picture 45" descr="A close-up of a sign&#10;&#10;Description automatically generated">
+            <a:extLst>
+              <a:ext uri="{FF2B5EF4-FFF2-40B4-BE49-F238E27FC236}">
+                <a16:creationId xmlns:a16="http://schemas.microsoft.com/office/drawing/2014/main" id="{347A5C05-6D0D-4C91-4004-8A9B47776A65}"/>
+              </a:ext>
+            </a:extLst>
+          </p:cNvPr>
+          <p:cNvPicPr>
+            <a:picLocks noChangeAspect="1"/>
+          </p:cNvPicPr>
+          <p:nvPr/>
+        </p:nvPicPr>
+        <p:blipFill>
+          <a:blip r:embed="rId13"/>
+          <a:stretch>
+            <a:fillRect/>
+          </a:stretch>
+        </p:blipFill>
+        <p:spPr>
+          <a:xfrm>
+            <a:off x="22388997" y="25319142"/>
+            <a:ext cx="4213855" cy="1517319"/>
+          </a:xfrm>
+          <a:prstGeom prst="rect">
+            <a:avLst/>
+          </a:prstGeom>
+        </p:spPr>
+      </p:pic>
+      <p:pic>
+        <p:nvPicPr>
+          <p:cNvPr id="55" name="Picture 54">
+            <a:extLst>
+              <a:ext uri="{FF2B5EF4-FFF2-40B4-BE49-F238E27FC236}">
+                <a16:creationId xmlns:a16="http://schemas.microsoft.com/office/drawing/2014/main" id="{6B5E7224-EDDA-1134-23DC-69FF0ED4CC0D}"/>
+              </a:ext>
+            </a:extLst>
+          </p:cNvPr>
+          <p:cNvPicPr>
+            <a:picLocks noChangeAspect="1"/>
+          </p:cNvPicPr>
+          <p:nvPr/>
+        </p:nvPicPr>
+        <p:blipFill>
+          <a:blip r:embed="rId14"/>
+          <a:stretch>
+            <a:fillRect/>
+          </a:stretch>
+        </p:blipFill>
+        <p:spPr>
+          <a:xfrm>
+            <a:off x="21433156" y="26671507"/>
+            <a:ext cx="12074928" cy="1454348"/>
           </a:xfrm>
           <a:prstGeom prst="rect">
             <a:avLst/>
@@ -7002,8 +7487,8 @@
         </p:nvSpPr>
         <p:spPr>
           <a:xfrm>
-            <a:off x="2766566" y="31577745"/>
-            <a:ext cx="13367988" cy="2439129"/>
+            <a:off x="11482860" y="21207799"/>
+            <a:ext cx="7179122" cy="2908489"/>
           </a:xfrm>
           <a:prstGeom prst="rect">
             <a:avLst/>
@@ -7016,12 +7501,6 @@
           </a:bodyPr>
           <a:lstStyle/>
           <a:p>
-            <a:r>
-              <a:rPr lang="en-US" sz="3050" b="1" dirty="0"/>
-              <a:t>Variable Selection</a:t>
-            </a:r>
-          </a:p>
-          <a:p>
             <a:pPr marL="457200" indent="-457200">
               <a:buFont typeface="Arial" panose="020B0604020202020204" pitchFamily="34" charset="0"/>
               <a:buChar char="•"/>
@@ -7060,16 +7539,7 @@
               <a:rPr lang="en-US" sz="3050" b="1" dirty="0"/>
               <a:t>(need citation)</a:t>
             </a:r>
-          </a:p>
-          <a:p>
-            <a:pPr marL="457200" indent="-457200">
-              <a:buFont typeface="Arial" panose="020B0604020202020204" pitchFamily="34" charset="0"/>
-              <a:buChar char="•"/>
-            </a:pPr>
-            <a:r>
-              <a:rPr lang="en-US" sz="3050" dirty="0"/>
-              <a:t>Added a state level effect predictor, to account for between state variability</a:t>
-            </a:r>
+            <a:endParaRPr lang="en-US" sz="3050" dirty="0"/>
           </a:p>
         </p:txBody>
       </p:sp>
@@ -7088,14 +7558,14 @@
           <p:nvPr/>
         </p:nvPicPr>
         <p:blipFill>
-          <a:blip r:embed="rId12"/>
+          <a:blip r:embed="rId15"/>
           <a:stretch>
             <a:fillRect/>
           </a:stretch>
         </p:blipFill>
         <p:spPr>
           <a:xfrm>
-            <a:off x="3016996" y="27532022"/>
+            <a:off x="2701124" y="29732376"/>
             <a:ext cx="6368364" cy="3918993"/>
           </a:xfrm>
           <a:prstGeom prst="rect">
@@ -7118,14 +7588,14 @@
           <p:nvPr/>
         </p:nvPicPr>
         <p:blipFill>
-          <a:blip r:embed="rId13"/>
+          <a:blip r:embed="rId16"/>
           <a:stretch>
             <a:fillRect/>
           </a:stretch>
         </p:blipFill>
         <p:spPr>
           <a:xfrm>
-            <a:off x="9766189" y="27522954"/>
+            <a:off x="9450317" y="29723308"/>
             <a:ext cx="6368365" cy="3908165"/>
           </a:xfrm>
           <a:prstGeom prst="rect">
@@ -7148,7 +7618,7 @@
           <p:nvPr/>
         </p:nvPicPr>
         <p:blipFill>
-          <a:blip r:embed="rId14"/>
+          <a:blip r:embed="rId17"/>
           <a:stretch>
             <a:fillRect/>
           </a:stretch>
@@ -7213,7 +7683,7 @@
           <p:nvPr/>
         </p:nvPicPr>
         <p:blipFill>
-          <a:blip r:embed="rId15"/>
+          <a:blip r:embed="rId18"/>
           <a:stretch>
             <a:fillRect/>
           </a:stretch>
@@ -7294,7 +7764,7 @@
           <p:nvPr/>
         </p:nvPicPr>
         <p:blipFill>
-          <a:blip r:embed="rId16"/>
+          <a:blip r:embed="rId19"/>
           <a:stretch>
             <a:fillRect/>
           </a:stretch>
@@ -7324,7 +7794,7 @@
           <p:nvPr/>
         </p:nvPicPr>
         <p:blipFill>
-          <a:blip r:embed="rId17"/>
+          <a:blip r:embed="rId20"/>
           <a:stretch>
             <a:fillRect/>
           </a:stretch>
@@ -7354,14 +7824,14 @@
           <p:nvPr/>
         </p:nvPicPr>
         <p:blipFill>
-          <a:blip r:embed="rId18"/>
+          <a:blip r:embed="rId21"/>
           <a:stretch>
             <a:fillRect/>
           </a:stretch>
         </p:blipFill>
         <p:spPr>
           <a:xfrm>
-            <a:off x="33822475" y="26691862"/>
+            <a:off x="33822475" y="26552800"/>
             <a:ext cx="10647966" cy="4743888"/>
           </a:xfrm>
           <a:prstGeom prst="rect">
@@ -7384,7 +7854,7 @@
           <p:nvPr/>
         </p:nvPicPr>
         <p:blipFill>
-          <a:blip r:embed="rId19"/>
+          <a:blip r:embed="rId22"/>
           <a:stretch>
             <a:fillRect/>
           </a:stretch>
@@ -7414,14 +7884,44 @@
           <p:nvPr/>
         </p:nvPicPr>
         <p:blipFill>
-          <a:blip r:embed="rId20"/>
+          <a:blip r:embed="rId23"/>
           <a:stretch>
             <a:fillRect/>
           </a:stretch>
         </p:blipFill>
         <p:spPr>
           <a:xfrm>
-            <a:off x="14573323" y="17091883"/>
+            <a:off x="13401090" y="20379958"/>
+            <a:ext cx="2765554" cy="853566"/>
+          </a:xfrm>
+          <a:prstGeom prst="rect">
+            <a:avLst/>
+          </a:prstGeom>
+        </p:spPr>
+      </p:pic>
+      <p:pic>
+        <p:nvPicPr>
+          <p:cNvPr id="58" name="Picture 57">
+            <a:extLst>
+              <a:ext uri="{FF2B5EF4-FFF2-40B4-BE49-F238E27FC236}">
+                <a16:creationId xmlns:a16="http://schemas.microsoft.com/office/drawing/2014/main" id="{5B0F9A5A-602F-0862-F00F-F1E573F0618F}"/>
+              </a:ext>
+            </a:extLst>
+          </p:cNvPr>
+          <p:cNvPicPr>
+            <a:picLocks noChangeAspect="1"/>
+          </p:cNvPicPr>
+          <p:nvPr/>
+        </p:nvPicPr>
+        <p:blipFill>
+          <a:blip r:embed="rId23"/>
+          <a:stretch>
+            <a:fillRect/>
+          </a:stretch>
+        </p:blipFill>
+        <p:spPr>
+          <a:xfrm>
+            <a:off x="27372381" y="25229343"/>
             <a:ext cx="2765554" cy="853566"/>
           </a:xfrm>
           <a:prstGeom prst="rect">
@@ -7444,7 +7944,7 @@
           <p:nvPr/>
         </p:nvPicPr>
         <p:blipFill>
-          <a:blip r:embed="rId21"/>
+          <a:blip r:embed="rId24"/>
           <a:stretch>
             <a:fillRect/>
           </a:stretch>
@@ -7474,7 +7974,7 @@
           <p:nvPr/>
         </p:nvPicPr>
         <p:blipFill>
-          <a:blip r:embed="rId22"/>
+          <a:blip r:embed="rId25"/>
           <a:stretch>
             <a:fillRect/>
           </a:stretch>
@@ -7547,96 +8047,6 @@
           <p:nvPr/>
         </p:nvPicPr>
         <p:blipFill>
-          <a:blip r:embed="rId23"/>
-          <a:stretch>
-            <a:fillRect/>
-          </a:stretch>
-        </p:blipFill>
-        <p:spPr>
-          <a:xfrm>
-            <a:off x="19188149" y="8060370"/>
-            <a:ext cx="6989231" cy="4313354"/>
-          </a:xfrm>
-          <a:prstGeom prst="rect">
-            <a:avLst/>
-          </a:prstGeom>
-        </p:spPr>
-      </p:pic>
-      <p:pic>
-        <p:nvPicPr>
-          <p:cNvPr id="11" name="Picture 10" descr="A screenshot of a cell phone&#10;&#10;Description automatically generated">
-            <a:extLst>
-              <a:ext uri="{FF2B5EF4-FFF2-40B4-BE49-F238E27FC236}">
-                <a16:creationId xmlns:a16="http://schemas.microsoft.com/office/drawing/2014/main" id="{9A767080-2D0C-2C60-D8D2-9DD7EFD1513A}"/>
-              </a:ext>
-            </a:extLst>
-          </p:cNvPr>
-          <p:cNvPicPr>
-            <a:picLocks noChangeAspect="1"/>
-          </p:cNvPicPr>
-          <p:nvPr/>
-        </p:nvPicPr>
-        <p:blipFill>
-          <a:blip r:embed="rId24"/>
-          <a:stretch>
-            <a:fillRect/>
-          </a:stretch>
-        </p:blipFill>
-        <p:spPr>
-          <a:xfrm>
-            <a:off x="19528806" y="23604555"/>
-            <a:ext cx="5266872" cy="690142"/>
-          </a:xfrm>
-          <a:prstGeom prst="rect">
-            <a:avLst/>
-          </a:prstGeom>
-        </p:spPr>
-      </p:pic>
-      <p:pic>
-        <p:nvPicPr>
-          <p:cNvPr id="29" name="Picture 28">
-            <a:extLst>
-              <a:ext uri="{FF2B5EF4-FFF2-40B4-BE49-F238E27FC236}">
-                <a16:creationId xmlns:a16="http://schemas.microsoft.com/office/drawing/2014/main" id="{7554192E-4DFC-B235-ECC3-5F4FAABCCFFE}"/>
-              </a:ext>
-            </a:extLst>
-          </p:cNvPr>
-          <p:cNvPicPr>
-            <a:picLocks noChangeAspect="1"/>
-          </p:cNvPicPr>
-          <p:nvPr/>
-        </p:nvPicPr>
-        <p:blipFill>
-          <a:blip r:embed="rId25"/>
-          <a:stretch>
-            <a:fillRect/>
-          </a:stretch>
-        </p:blipFill>
-        <p:spPr>
-          <a:xfrm>
-            <a:off x="5305156" y="20105603"/>
-            <a:ext cx="13367593" cy="1253211"/>
-          </a:xfrm>
-          <a:prstGeom prst="rect">
-            <a:avLst/>
-          </a:prstGeom>
-        </p:spPr>
-      </p:pic>
-      <p:pic>
-        <p:nvPicPr>
-          <p:cNvPr id="66" name="Picture 65" descr="A group of black text&#10;&#10;Description automatically generated">
-            <a:extLst>
-              <a:ext uri="{FF2B5EF4-FFF2-40B4-BE49-F238E27FC236}">
-                <a16:creationId xmlns:a16="http://schemas.microsoft.com/office/drawing/2014/main" id="{998B9B53-8D2F-6D5C-CBDD-1EA9BDF46830}"/>
-              </a:ext>
-            </a:extLst>
-          </p:cNvPr>
-          <p:cNvPicPr>
-            <a:picLocks noChangeAspect="1"/>
-          </p:cNvPicPr>
-          <p:nvPr/>
-        </p:nvPicPr>
-        <p:blipFill>
           <a:blip r:embed="rId26"/>
           <a:stretch>
             <a:fillRect/>
@@ -7644,8 +8054,8 @@
         </p:blipFill>
         <p:spPr>
           <a:xfrm>
-            <a:off x="22180001" y="25038744"/>
-            <a:ext cx="5312563" cy="1878998"/>
+            <a:off x="19188149" y="8060370"/>
+            <a:ext cx="6989231" cy="4313354"/>
           </a:xfrm>
           <a:prstGeom prst="rect">
             <a:avLst/>
@@ -7654,10 +8064,10 @@
       </p:pic>
       <p:pic>
         <p:nvPicPr>
-          <p:cNvPr id="71" name="Picture 70">
+          <p:cNvPr id="72" name="Picture 71">
             <a:extLst>
               <a:ext uri="{FF2B5EF4-FFF2-40B4-BE49-F238E27FC236}">
-                <a16:creationId xmlns:a16="http://schemas.microsoft.com/office/drawing/2014/main" id="{3D75F8CE-704D-BCB2-1CD1-940C7B4B5B69}"/>
+                <a16:creationId xmlns:a16="http://schemas.microsoft.com/office/drawing/2014/main" id="{6637D13A-9834-5049-B5D9-6ED5AB3C557C}"/>
               </a:ext>
             </a:extLst>
           </p:cNvPr>
@@ -7674,14 +8084,49 @@
         </p:blipFill>
         <p:spPr>
           <a:xfrm>
-            <a:off x="21593602" y="27019712"/>
-            <a:ext cx="11701904" cy="1001047"/>
+            <a:off x="41851716" y="31158837"/>
+            <a:ext cx="8548219" cy="1112625"/>
           </a:xfrm>
           <a:prstGeom prst="rect">
             <a:avLst/>
           </a:prstGeom>
         </p:spPr>
       </p:pic>
+      <p:sp>
+        <p:nvSpPr>
+          <p:cNvPr id="73" name="TextBox 72">
+            <a:extLst>
+              <a:ext uri="{FF2B5EF4-FFF2-40B4-BE49-F238E27FC236}">
+                <a16:creationId xmlns:a16="http://schemas.microsoft.com/office/drawing/2014/main" id="{DFD5DACD-D723-BFA9-DB18-7C0D73E43CF7}"/>
+              </a:ext>
+            </a:extLst>
+          </p:cNvPr>
+          <p:cNvSpPr txBox="1"/>
+          <p:nvPr/>
+        </p:nvSpPr>
+        <p:spPr>
+          <a:xfrm>
+            <a:off x="35546659" y="31543480"/>
+            <a:ext cx="7188235" cy="553998"/>
+          </a:xfrm>
+          <a:prstGeom prst="rect">
+            <a:avLst/>
+          </a:prstGeom>
+          <a:noFill/>
+        </p:spPr>
+        <p:txBody>
+          <a:bodyPr wrap="square" rtlCol="0">
+            <a:spAutoFit/>
+          </a:bodyPr>
+          <a:lstStyle/>
+          <a:p>
+            <a:r>
+              <a:rPr lang="en-US" sz="3000" dirty="0"/>
+              <a:t>Predicted hospitalization probabilities:</a:t>
+            </a:r>
+          </a:p>
+        </p:txBody>
+      </p:sp>
     </p:spTree>
   </p:cSld>
   <p:clrMapOvr>
@@ -8307,23 +8752,6 @@
 </file>
 
 <file path=customXml/item1.xml><?xml version="1.0" encoding="utf-8"?>
-<?mso-contentType ?>
-<FormTemplates xmlns="http://schemas.microsoft.com/sharepoint/v3/contenttype/forms">
-  <Display>DocumentLibraryForm</Display>
-  <Edit>DocumentLibraryForm</Edit>
-  <New>DocumentLibraryForm</New>
-</FormTemplates>
-</file>
-
-<file path=customXml/item2.xml><?xml version="1.0" encoding="utf-8"?>
-<p:properties xmlns:p="http://schemas.microsoft.com/office/2006/metadata/properties" xmlns:xsi="http://www.w3.org/2001/XMLSchema-instance" xmlns:pc="http://schemas.microsoft.com/office/infopath/2007/PartnerControls">
-  <documentManagement>
-    <_activity xmlns="4f41ae97-5a6c-4458-bb1f-235b5f3b5d68" xsi:nil="true"/>
-  </documentManagement>
-</p:properties>
-</file>
-
-<file path=customXml/item3.xml><?xml version="1.0" encoding="utf-8"?>
 <ct:contentTypeSchema xmlns:ct="http://schemas.microsoft.com/office/2006/metadata/contentType" xmlns:ma="http://schemas.microsoft.com/office/2006/metadata/properties/metaAttributes" ct:_="" ma:_="" ma:contentTypeName="Document" ma:contentTypeID="0x0101009751B041C886E142A4CB6BC50AABCCA6" ma:contentTypeVersion="13" ma:contentTypeDescription="Create a new document." ma:contentTypeScope="" ma:versionID="ae8447eb39958e733236cd72149919b1">
   <xsd:schema xmlns:xsd="http://www.w3.org/2001/XMLSchema" xmlns:xs="http://www.w3.org/2001/XMLSchema" xmlns:p="http://schemas.microsoft.com/office/2006/metadata/properties" xmlns:ns3="4f41ae97-5a6c-4458-bb1f-235b5f3b5d68" xmlns:ns4="8802567b-aa87-48e0-ac05-b6cac22ca2ed" targetNamespace="http://schemas.microsoft.com/office/2006/metadata/properties" ma:root="true" ma:fieldsID="aac98df62b6e875c010c3475f39038b6" ns3:_="" ns4:_="">
     <xsd:import namespace="4f41ae97-5a6c-4458-bb1f-235b5f3b5d68"/>
@@ -8544,10 +8972,38 @@
 </ct:contentTypeSchema>
 </file>
 
+<file path=customXml/item2.xml><?xml version="1.0" encoding="utf-8"?>
+<p:properties xmlns:p="http://schemas.microsoft.com/office/2006/metadata/properties" xmlns:xsi="http://www.w3.org/2001/XMLSchema-instance" xmlns:pc="http://schemas.microsoft.com/office/infopath/2007/PartnerControls">
+  <documentManagement>
+    <_activity xmlns="4f41ae97-5a6c-4458-bb1f-235b5f3b5d68" xsi:nil="true"/>
+  </documentManagement>
+</p:properties>
+</file>
+
+<file path=customXml/item3.xml><?xml version="1.0" encoding="utf-8"?>
+<?mso-contentType ?>
+<FormTemplates xmlns="http://schemas.microsoft.com/sharepoint/v3/contenttype/forms">
+  <Display>DocumentLibraryForm</Display>
+  <Edit>DocumentLibraryForm</Edit>
+  <New>DocumentLibraryForm</New>
+</FormTemplates>
+</file>
+
 <file path=customXml/itemProps1.xml><?xml version="1.0" encoding="utf-8"?>
-<ds:datastoreItem xmlns:ds="http://schemas.openxmlformats.org/officeDocument/2006/customXml" ds:itemID="{6D1ED908-36CA-47DE-9D02-6709ABA06A3B}">
+<ds:datastoreItem xmlns:ds="http://schemas.openxmlformats.org/officeDocument/2006/customXml" ds:itemID="{8774136C-BD9E-4C16-A065-F64F959C2ED0}">
   <ds:schemaRefs>
-    <ds:schemaRef ds:uri="http://schemas.microsoft.com/sharepoint/v3/contenttype/forms"/>
+    <ds:schemaRef ds:uri="http://schemas.microsoft.com/office/2006/metadata/contentType"/>
+    <ds:schemaRef ds:uri="http://schemas.microsoft.com/office/2006/metadata/properties/metaAttributes"/>
+    <ds:schemaRef ds:uri="http://www.w3.org/2001/XMLSchema"/>
+    <ds:schemaRef ds:uri="http://schemas.microsoft.com/office/2006/metadata/properties"/>
+    <ds:schemaRef ds:uri="4f41ae97-5a6c-4458-bb1f-235b5f3b5d68"/>
+    <ds:schemaRef ds:uri="8802567b-aa87-48e0-ac05-b6cac22ca2ed"/>
+    <ds:schemaRef ds:uri="http://schemas.microsoft.com/office/2006/documentManagement/types"/>
+    <ds:schemaRef ds:uri="http://schemas.microsoft.com/office/infopath/2007/PartnerControls"/>
+    <ds:schemaRef ds:uri="http://schemas.openxmlformats.org/package/2006/metadata/core-properties"/>
+    <ds:schemaRef ds:uri="http://purl.org/dc/elements/1.1/"/>
+    <ds:schemaRef ds:uri="http://purl.org/dc/terms/"/>
+    <ds:schemaRef ds:uri="http://schemas.microsoft.com/internal/obd"/>
   </ds:schemaRefs>
 </ds:datastoreItem>
 </file>
@@ -8570,20 +9026,9 @@
 </file>
 
 <file path=customXml/itemProps3.xml><?xml version="1.0" encoding="utf-8"?>
-<ds:datastoreItem xmlns:ds="http://schemas.openxmlformats.org/officeDocument/2006/customXml" ds:itemID="{8774136C-BD9E-4C16-A065-F64F959C2ED0}">
+<ds:datastoreItem xmlns:ds="http://schemas.openxmlformats.org/officeDocument/2006/customXml" ds:itemID="{6D1ED908-36CA-47DE-9D02-6709ABA06A3B}">
   <ds:schemaRefs>
-    <ds:schemaRef ds:uri="http://schemas.microsoft.com/office/2006/metadata/contentType"/>
-    <ds:schemaRef ds:uri="http://schemas.microsoft.com/office/2006/metadata/properties/metaAttributes"/>
-    <ds:schemaRef ds:uri="http://www.w3.org/2001/XMLSchema"/>
-    <ds:schemaRef ds:uri="http://schemas.microsoft.com/office/2006/metadata/properties"/>
-    <ds:schemaRef ds:uri="4f41ae97-5a6c-4458-bb1f-235b5f3b5d68"/>
-    <ds:schemaRef ds:uri="8802567b-aa87-48e0-ac05-b6cac22ca2ed"/>
-    <ds:schemaRef ds:uri="http://schemas.microsoft.com/office/2006/documentManagement/types"/>
-    <ds:schemaRef ds:uri="http://schemas.microsoft.com/office/infopath/2007/PartnerControls"/>
-    <ds:schemaRef ds:uri="http://schemas.openxmlformats.org/package/2006/metadata/core-properties"/>
-    <ds:schemaRef ds:uri="http://purl.org/dc/elements/1.1/"/>
-    <ds:schemaRef ds:uri="http://purl.org/dc/terms/"/>
-    <ds:schemaRef ds:uri="http://schemas.microsoft.com/internal/obd"/>
+    <ds:schemaRef ds:uri="http://schemas.microsoft.com/sharepoint/v3/contenttype/forms"/>
   </ds:schemaRefs>
 </ds:datastoreItem>
 </file>
</xml_diff>